<commit_message>
3 Final ppts made
</commit_message>
<xml_diff>
--- a/ISD_Management_of_Judicial_System_UseCase.pptx
+++ b/ISD_Management_of_Judicial_System_UseCase.pptx
@@ -5,7 +5,7 @@
     <p:sldMasterId id="2147483696" r:id="rId1"/>
   </p:sldMasterIdLst>
   <p:notesMasterIdLst>
-    <p:notesMasterId r:id="rId25"/>
+    <p:notesMasterId r:id="rId26"/>
   </p:notesMasterIdLst>
   <p:sldIdLst>
     <p:sldId id="256" r:id="rId2"/>
@@ -14,23 +14,24 @@
     <p:sldId id="259" r:id="rId5"/>
     <p:sldId id="261" r:id="rId6"/>
     <p:sldId id="267" r:id="rId7"/>
-    <p:sldId id="277" r:id="rId8"/>
-    <p:sldId id="272" r:id="rId9"/>
-    <p:sldId id="268" r:id="rId10"/>
-    <p:sldId id="262" r:id="rId11"/>
-    <p:sldId id="278" r:id="rId12"/>
-    <p:sldId id="273" r:id="rId13"/>
-    <p:sldId id="274" r:id="rId14"/>
-    <p:sldId id="263" r:id="rId15"/>
-    <p:sldId id="269" r:id="rId16"/>
-    <p:sldId id="276" r:id="rId17"/>
-    <p:sldId id="264" r:id="rId18"/>
-    <p:sldId id="270" r:id="rId19"/>
-    <p:sldId id="265" r:id="rId20"/>
-    <p:sldId id="271" r:id="rId21"/>
-    <p:sldId id="275" r:id="rId22"/>
-    <p:sldId id="279" r:id="rId23"/>
-    <p:sldId id="280" r:id="rId24"/>
+    <p:sldId id="281" r:id="rId8"/>
+    <p:sldId id="277" r:id="rId9"/>
+    <p:sldId id="272" r:id="rId10"/>
+    <p:sldId id="268" r:id="rId11"/>
+    <p:sldId id="262" r:id="rId12"/>
+    <p:sldId id="278" r:id="rId13"/>
+    <p:sldId id="273" r:id="rId14"/>
+    <p:sldId id="274" r:id="rId15"/>
+    <p:sldId id="263" r:id="rId16"/>
+    <p:sldId id="269" r:id="rId17"/>
+    <p:sldId id="276" r:id="rId18"/>
+    <p:sldId id="264" r:id="rId19"/>
+    <p:sldId id="270" r:id="rId20"/>
+    <p:sldId id="265" r:id="rId21"/>
+    <p:sldId id="271" r:id="rId22"/>
+    <p:sldId id="275" r:id="rId23"/>
+    <p:sldId id="279" r:id="rId24"/>
+    <p:sldId id="280" r:id="rId25"/>
   </p:sldIdLst>
   <p:sldSz cx="9144000" cy="6858000" type="screen4x3"/>
   <p:notesSz cx="6858000" cy="9144000"/>
@@ -2505,27 +2506,27 @@
     </dgm:pt>
   </dgm:ptLst>
   <dgm:cxnLst>
+    <dgm:cxn modelId="{9B0B27A0-1DA9-4693-AA9F-16A6EA3ACF03}" type="presOf" srcId="{76A4D70C-F319-4BDC-BCF9-41AF8B5EA78C}" destId="{B3E6B7DD-E5B9-4520-9CF0-9412C478314E}" srcOrd="0" destOrd="0" presId="urn:microsoft.com/office/officeart/2005/8/layout/vList5"/>
+    <dgm:cxn modelId="{1EEA52A1-9CF7-4307-83BB-EF750B6E0BD9}" srcId="{76A4D70C-F319-4BDC-BCF9-41AF8B5EA78C}" destId="{BF746235-D33C-44B5-B274-A7F4D2143A54}" srcOrd="0" destOrd="0" parTransId="{9B2107E1-71D2-4859-BB22-6D1E57AD25EB}" sibTransId="{A91B91F6-DA9C-48F7-9B66-802B49E59AF0}"/>
+    <dgm:cxn modelId="{8E46639E-D7BC-4FB0-8B33-21430C48A3AC}" type="presOf" srcId="{5ADB7CA6-5887-459F-879A-19038229DD54}" destId="{15FA724B-FE1E-4ACE-9404-01F575B70E32}" srcOrd="0" destOrd="0" presId="urn:microsoft.com/office/officeart/2005/8/layout/vList5"/>
+    <dgm:cxn modelId="{EC6949F8-9492-4E8A-966A-7028A38D1DA3}" type="presOf" srcId="{812C1D57-048C-49C8-A1ED-67B2C6964FA2}" destId="{4B7EF53A-416B-46FD-86FC-6E8689F25875}" srcOrd="0" destOrd="0" presId="urn:microsoft.com/office/officeart/2005/8/layout/vList5"/>
+    <dgm:cxn modelId="{8797BD8A-9BEF-4F05-A2B0-23DF1EC8A6AC}" srcId="{BF746235-D33C-44B5-B274-A7F4D2143A54}" destId="{F6A1390F-42B9-44DC-8047-CE54CF94AF2E}" srcOrd="0" destOrd="0" parTransId="{D2CE8FBD-92C9-4B58-8300-C3DE361F9E67}" sibTransId="{1065A70C-0FAC-402B-B366-249E3C571607}"/>
     <dgm:cxn modelId="{3BA12C12-E0B4-44CA-BB05-623200EEFCE9}" type="presOf" srcId="{A6BF34F0-9343-4ED8-A328-4E49262C7D25}" destId="{BFD244CB-2636-4EDE-838C-10CBE3123A09}" srcOrd="0" destOrd="0" presId="urn:microsoft.com/office/officeart/2005/8/layout/vList5"/>
-    <dgm:cxn modelId="{148CC7A8-7DE8-48AB-9FA9-3B78C5B1A43F}" srcId="{1F860C62-3AFA-486E-A846-9662B091B87C}" destId="{812C1D57-048C-49C8-A1ED-67B2C6964FA2}" srcOrd="0" destOrd="0" parTransId="{A415C863-DA8B-433C-BBEC-A69671BB2442}" sibTransId="{D0D7B122-B2C4-4270-BF15-57495C121E8D}"/>
-    <dgm:cxn modelId="{9B0B27A0-1DA9-4693-AA9F-16A6EA3ACF03}" type="presOf" srcId="{76A4D70C-F319-4BDC-BCF9-41AF8B5EA78C}" destId="{B3E6B7DD-E5B9-4520-9CF0-9412C478314E}" srcOrd="0" destOrd="0" presId="urn:microsoft.com/office/officeart/2005/8/layout/vList5"/>
-    <dgm:cxn modelId="{16FD74F8-58C7-4A69-829A-8FB1094C3524}" type="presOf" srcId="{F6A1390F-42B9-44DC-8047-CE54CF94AF2E}" destId="{D3B120B6-7C22-48D1-9AB0-31B972C5DE3B}" srcOrd="0" destOrd="0" presId="urn:microsoft.com/office/officeart/2005/8/layout/vList5"/>
-    <dgm:cxn modelId="{8797BD8A-9BEF-4F05-A2B0-23DF1EC8A6AC}" srcId="{BF746235-D33C-44B5-B274-A7F4D2143A54}" destId="{F6A1390F-42B9-44DC-8047-CE54CF94AF2E}" srcOrd="0" destOrd="0" parTransId="{D2CE8FBD-92C9-4B58-8300-C3DE361F9E67}" sibTransId="{1065A70C-0FAC-402B-B366-249E3C571607}"/>
+    <dgm:cxn modelId="{E4985E2F-8302-486F-9998-1F7D6DE52EA1}" type="presOf" srcId="{2C0ADF64-AA54-4716-99AB-B5522FC3EE7F}" destId="{83435198-56C5-4121-8012-E946B19C1494}" srcOrd="0" destOrd="0" presId="urn:microsoft.com/office/officeart/2005/8/layout/vList5"/>
+    <dgm:cxn modelId="{A2DF72E2-A5EF-4969-9E9C-1803405D6E5B}" type="presOf" srcId="{8295D529-82E3-4F85-8D30-123043AB8579}" destId="{9B19824A-0CD6-4763-8827-043705CA5DB9}" srcOrd="0" destOrd="0" presId="urn:microsoft.com/office/officeart/2005/8/layout/vList5"/>
     <dgm:cxn modelId="{62FA2206-6B71-4074-B10B-316AB4B2DF5C}" type="presOf" srcId="{1F860C62-3AFA-486E-A846-9662B091B87C}" destId="{AFB7725F-1F1A-4E5E-8D63-724631E65E05}" srcOrd="0" destOrd="0" presId="urn:microsoft.com/office/officeart/2005/8/layout/vList5"/>
-    <dgm:cxn modelId="{3ED7B479-A345-4079-A74F-F45602BE0AA4}" srcId="{76A4D70C-F319-4BDC-BCF9-41AF8B5EA78C}" destId="{8295D529-82E3-4F85-8D30-123043AB8579}" srcOrd="1" destOrd="0" parTransId="{09367ADD-ADB7-49A0-A804-BECAF1AE2B6C}" sibTransId="{5F7E8458-177D-47DF-93F9-A191E5EC6EB9}"/>
-    <dgm:cxn modelId="{E4985E2F-8302-486F-9998-1F7D6DE52EA1}" type="presOf" srcId="{2C0ADF64-AA54-4716-99AB-B5522FC3EE7F}" destId="{83435198-56C5-4121-8012-E946B19C1494}" srcOrd="0" destOrd="0" presId="urn:microsoft.com/office/officeart/2005/8/layout/vList5"/>
-    <dgm:cxn modelId="{AED4FF13-48D4-4CAC-90A4-6E35D000B95A}" srcId="{A6BF34F0-9343-4ED8-A328-4E49262C7D25}" destId="{5ADB7CA6-5887-459F-879A-19038229DD54}" srcOrd="0" destOrd="0" parTransId="{F72A3ED6-09FB-4835-96A9-F543122FBFA0}" sibTransId="{72023B9D-EB27-4667-B1C3-CBD69EFCA4F7}"/>
-    <dgm:cxn modelId="{8E46639E-D7BC-4FB0-8B33-21430C48A3AC}" type="presOf" srcId="{5ADB7CA6-5887-459F-879A-19038229DD54}" destId="{15FA724B-FE1E-4ACE-9404-01F575B70E32}" srcOrd="0" destOrd="0" presId="urn:microsoft.com/office/officeart/2005/8/layout/vList5"/>
-    <dgm:cxn modelId="{8948C16E-E4B1-4624-93DC-81EA2B72A6C9}" type="presOf" srcId="{BF746235-D33C-44B5-B274-A7F4D2143A54}" destId="{4399E272-7FF9-47EA-90AD-6AEE27D0F2C5}" srcOrd="0" destOrd="0" presId="urn:microsoft.com/office/officeart/2005/8/layout/vList5"/>
+    <dgm:cxn modelId="{634A89EE-CA99-419B-8893-56DFF0E45118}" type="presOf" srcId="{AA9947B1-4F0E-469D-A4D4-C8AE3C3F5595}" destId="{56431427-AA36-4743-A40C-2DB7C84D998D}" srcOrd="0" destOrd="0" presId="urn:microsoft.com/office/officeart/2005/8/layout/vList5"/>
     <dgm:cxn modelId="{C8F2D9EA-019E-4FDB-873B-04975873C22B}" srcId="{76A4D70C-F319-4BDC-BCF9-41AF8B5EA78C}" destId="{A6BF34F0-9343-4ED8-A328-4E49262C7D25}" srcOrd="4" destOrd="0" parTransId="{CC588283-2B2C-4A05-8A77-8D080A0D81F9}" sibTransId="{E9FF8E27-0C7B-42A3-A7EE-2DE86A64744B}"/>
-    <dgm:cxn modelId="{634A89EE-CA99-419B-8893-56DFF0E45118}" type="presOf" srcId="{AA9947B1-4F0E-469D-A4D4-C8AE3C3F5595}" destId="{56431427-AA36-4743-A40C-2DB7C84D998D}" srcOrd="0" destOrd="0" presId="urn:microsoft.com/office/officeart/2005/8/layout/vList5"/>
-    <dgm:cxn modelId="{A2DF72E2-A5EF-4969-9E9C-1803405D6E5B}" type="presOf" srcId="{8295D529-82E3-4F85-8D30-123043AB8579}" destId="{9B19824A-0CD6-4763-8827-043705CA5DB9}" srcOrd="0" destOrd="0" presId="urn:microsoft.com/office/officeart/2005/8/layout/vList5"/>
     <dgm:cxn modelId="{7E416043-B1DF-4DE0-9DBA-E9692D786DEE}" srcId="{8295D529-82E3-4F85-8D30-123043AB8579}" destId="{2C0ADF64-AA54-4716-99AB-B5522FC3EE7F}" srcOrd="0" destOrd="0" parTransId="{89037AE9-4295-4603-A4DA-73051AB97642}" sibTransId="{FE40D044-89B9-4A90-B7F7-099E86A1FD6E}"/>
     <dgm:cxn modelId="{1E1E0FB5-E07E-4B97-900E-18391C7F6A74}" srcId="{76A4D70C-F319-4BDC-BCF9-41AF8B5EA78C}" destId="{AA9947B1-4F0E-469D-A4D4-C8AE3C3F5595}" srcOrd="2" destOrd="0" parTransId="{304E5D36-011F-4AF7-8271-29175466F3E3}" sibTransId="{2F6CAF81-451A-4DAE-B3D9-12266D48868E}"/>
-    <dgm:cxn modelId="{EC6949F8-9492-4E8A-966A-7028A38D1DA3}" type="presOf" srcId="{812C1D57-048C-49C8-A1ED-67B2C6964FA2}" destId="{4B7EF53A-416B-46FD-86FC-6E8689F25875}" srcOrd="0" destOrd="0" presId="urn:microsoft.com/office/officeart/2005/8/layout/vList5"/>
-    <dgm:cxn modelId="{1EEA52A1-9CF7-4307-83BB-EF750B6E0BD9}" srcId="{76A4D70C-F319-4BDC-BCF9-41AF8B5EA78C}" destId="{BF746235-D33C-44B5-B274-A7F4D2143A54}" srcOrd="0" destOrd="0" parTransId="{9B2107E1-71D2-4859-BB22-6D1E57AD25EB}" sibTransId="{A91B91F6-DA9C-48F7-9B66-802B49E59AF0}"/>
     <dgm:cxn modelId="{28127E66-C936-4F98-B653-AB40779F7045}" type="presOf" srcId="{8D690FB6-BEAB-40BD-B95B-999E2148DF52}" destId="{1244BB96-CA08-47A4-AAE7-F4384F93CCDB}" srcOrd="0" destOrd="0" presId="urn:microsoft.com/office/officeart/2005/8/layout/vList5"/>
+    <dgm:cxn modelId="{8948C16E-E4B1-4624-93DC-81EA2B72A6C9}" type="presOf" srcId="{BF746235-D33C-44B5-B274-A7F4D2143A54}" destId="{4399E272-7FF9-47EA-90AD-6AEE27D0F2C5}" srcOrd="0" destOrd="0" presId="urn:microsoft.com/office/officeart/2005/8/layout/vList5"/>
+    <dgm:cxn modelId="{16FD74F8-58C7-4A69-829A-8FB1094C3524}" type="presOf" srcId="{F6A1390F-42B9-44DC-8047-CE54CF94AF2E}" destId="{D3B120B6-7C22-48D1-9AB0-31B972C5DE3B}" srcOrd="0" destOrd="0" presId="urn:microsoft.com/office/officeart/2005/8/layout/vList5"/>
+    <dgm:cxn modelId="{E1C4B3F8-1C16-41FE-95B1-36F4E9AF022B}" srcId="{AA9947B1-4F0E-469D-A4D4-C8AE3C3F5595}" destId="{8D690FB6-BEAB-40BD-B95B-999E2148DF52}" srcOrd="0" destOrd="0" parTransId="{84A76C8C-AE12-46CC-BC6E-739396ECE676}" sibTransId="{A4D1D250-8864-4483-9B02-8750C3A2C078}"/>
     <dgm:cxn modelId="{E89F17E5-8D78-4332-AE86-521665D0D036}" srcId="{76A4D70C-F319-4BDC-BCF9-41AF8B5EA78C}" destId="{1F860C62-3AFA-486E-A846-9662B091B87C}" srcOrd="3" destOrd="0" parTransId="{3F7F2580-D453-4C50-B91B-366FF884D841}" sibTransId="{153DCF8E-E465-4364-8E57-796DDF41C76B}"/>
-    <dgm:cxn modelId="{E1C4B3F8-1C16-41FE-95B1-36F4E9AF022B}" srcId="{AA9947B1-4F0E-469D-A4D4-C8AE3C3F5595}" destId="{8D690FB6-BEAB-40BD-B95B-999E2148DF52}" srcOrd="0" destOrd="0" parTransId="{84A76C8C-AE12-46CC-BC6E-739396ECE676}" sibTransId="{A4D1D250-8864-4483-9B02-8750C3A2C078}"/>
+    <dgm:cxn modelId="{3ED7B479-A345-4079-A74F-F45602BE0AA4}" srcId="{76A4D70C-F319-4BDC-BCF9-41AF8B5EA78C}" destId="{8295D529-82E3-4F85-8D30-123043AB8579}" srcOrd="1" destOrd="0" parTransId="{09367ADD-ADB7-49A0-A804-BECAF1AE2B6C}" sibTransId="{5F7E8458-177D-47DF-93F9-A191E5EC6EB9}"/>
+    <dgm:cxn modelId="{AED4FF13-48D4-4CAC-90A4-6E35D000B95A}" srcId="{A6BF34F0-9343-4ED8-A328-4E49262C7D25}" destId="{5ADB7CA6-5887-459F-879A-19038229DD54}" srcOrd="0" destOrd="0" parTransId="{F72A3ED6-09FB-4835-96A9-F543122FBFA0}" sibTransId="{72023B9D-EB27-4667-B1C3-CBD69EFCA4F7}"/>
+    <dgm:cxn modelId="{148CC7A8-7DE8-48AB-9FA9-3B78C5B1A43F}" srcId="{1F860C62-3AFA-486E-A846-9662B091B87C}" destId="{812C1D57-048C-49C8-A1ED-67B2C6964FA2}" srcOrd="0" destOrd="0" parTransId="{A415C863-DA8B-433C-BBEC-A69671BB2442}" sibTransId="{D0D7B122-B2C4-4270-BF15-57495C121E8D}"/>
     <dgm:cxn modelId="{0E1CBB60-36DC-4501-AAF6-C66FEB20A288}" type="presParOf" srcId="{B3E6B7DD-E5B9-4520-9CF0-9412C478314E}" destId="{0F7DABE5-0CFC-4F70-913B-67BB18416DE1}" srcOrd="0" destOrd="0" presId="urn:microsoft.com/office/officeart/2005/8/layout/vList5"/>
     <dgm:cxn modelId="{9AA04CE1-6143-4CBB-8724-071F657C1168}" type="presParOf" srcId="{0F7DABE5-0CFC-4F70-913B-67BB18416DE1}" destId="{4399E272-7FF9-47EA-90AD-6AEE27D0F2C5}" srcOrd="0" destOrd="0" presId="urn:microsoft.com/office/officeart/2005/8/layout/vList5"/>
     <dgm:cxn modelId="{4967E365-F7AF-4F41-AA98-E61E15BAA4EF}" type="presParOf" srcId="{0F7DABE5-0CFC-4F70-913B-67BB18416DE1}" destId="{D3B120B6-7C22-48D1-9AB0-31B972C5DE3B}" srcOrd="1" destOrd="0" presId="urn:microsoft.com/office/officeart/2005/8/layout/vList5"/>
@@ -10020,7 +10021,7 @@
           <a:p>
             <a:fld id="{03A67B94-5FDF-4B5F-8F24-C64E3793142E}" type="datetimeFigureOut">
               <a:rPr lang="en-US" smtClean="0"/>
-              <a:t>2/22/2014</a:t>
+              <a:t>3/22/2014</a:t>
             </a:fld>
             <a:endParaRPr lang="en-US"/>
           </a:p>
@@ -10416,6 +10417,174 @@
           <a:bodyPr/>
           <a:lstStyle/>
           <a:p>
+            <a:endParaRPr lang="en-US" dirty="0"/>
+          </a:p>
+        </p:txBody>
+      </p:sp>
+      <p:sp>
+        <p:nvSpPr>
+          <p:cNvPr id="4" name="Slide Number Placeholder 3"/>
+          <p:cNvSpPr>
+            <a:spLocks noGrp="1"/>
+          </p:cNvSpPr>
+          <p:nvPr>
+            <p:ph type="sldNum" sz="quarter" idx="10"/>
+          </p:nvPr>
+        </p:nvSpPr>
+        <p:spPr/>
+        <p:txBody>
+          <a:bodyPr/>
+          <a:lstStyle/>
+          <a:p>
+            <a:fld id="{D6FC1D5B-70D3-4197-920E-67D2822F42E8}" type="slidenum">
+              <a:rPr lang="en-US" smtClean="0"/>
+              <a:t>6</a:t>
+            </a:fld>
+            <a:endParaRPr lang="en-US"/>
+          </a:p>
+        </p:txBody>
+      </p:sp>
+    </p:spTree>
+    <p:extLst>
+      <p:ext uri="{BB962C8B-B14F-4D97-AF65-F5344CB8AC3E}">
+        <p14:creationId xmlns:p14="http://schemas.microsoft.com/office/powerpoint/2010/main" val="880430970"/>
+      </p:ext>
+    </p:extLst>
+  </p:cSld>
+  <p:clrMapOvr>
+    <a:masterClrMapping/>
+  </p:clrMapOvr>
+</p:notes>
+</file>
+
+<file path=ppt/notesSlides/notesSlide3.xml><?xml version="1.0" encoding="utf-8"?>
+<p:notes xmlns:a="http://schemas.openxmlformats.org/drawingml/2006/main" xmlns:r="http://schemas.openxmlformats.org/officeDocument/2006/relationships" xmlns:p="http://schemas.openxmlformats.org/presentationml/2006/main">
+  <p:cSld>
+    <p:spTree>
+      <p:nvGrpSpPr>
+        <p:cNvPr id="1" name=""/>
+        <p:cNvGrpSpPr/>
+        <p:nvPr/>
+      </p:nvGrpSpPr>
+      <p:grpSpPr>
+        <a:xfrm>
+          <a:off x="0" y="0"/>
+          <a:ext cx="0" cy="0"/>
+          <a:chOff x="0" y="0"/>
+          <a:chExt cx="0" cy="0"/>
+        </a:xfrm>
+      </p:grpSpPr>
+      <p:sp>
+        <p:nvSpPr>
+          <p:cNvPr id="2" name="Slide Image Placeholder 1"/>
+          <p:cNvSpPr>
+            <a:spLocks noGrp="1" noRot="1" noChangeAspect="1"/>
+          </p:cNvSpPr>
+          <p:nvPr>
+            <p:ph type="sldImg"/>
+          </p:nvPr>
+        </p:nvSpPr>
+        <p:spPr/>
+      </p:sp>
+      <p:sp>
+        <p:nvSpPr>
+          <p:cNvPr id="3" name="Notes Placeholder 2"/>
+          <p:cNvSpPr>
+            <a:spLocks noGrp="1"/>
+          </p:cNvSpPr>
+          <p:nvPr>
+            <p:ph type="body" idx="1"/>
+          </p:nvPr>
+        </p:nvSpPr>
+        <p:spPr/>
+        <p:txBody>
+          <a:bodyPr/>
+          <a:lstStyle/>
+          <a:p>
+            <a:endParaRPr lang="en-US" dirty="0"/>
+          </a:p>
+        </p:txBody>
+      </p:sp>
+      <p:sp>
+        <p:nvSpPr>
+          <p:cNvPr id="4" name="Slide Number Placeholder 3"/>
+          <p:cNvSpPr>
+            <a:spLocks noGrp="1"/>
+          </p:cNvSpPr>
+          <p:nvPr>
+            <p:ph type="sldNum" sz="quarter" idx="10"/>
+          </p:nvPr>
+        </p:nvSpPr>
+        <p:spPr/>
+        <p:txBody>
+          <a:bodyPr/>
+          <a:lstStyle/>
+          <a:p>
+            <a:fld id="{D6FC1D5B-70D3-4197-920E-67D2822F42E8}" type="slidenum">
+              <a:rPr lang="en-US" smtClean="0"/>
+              <a:t>7</a:t>
+            </a:fld>
+            <a:endParaRPr lang="en-US"/>
+          </a:p>
+        </p:txBody>
+      </p:sp>
+    </p:spTree>
+    <p:extLst>
+      <p:ext uri="{BB962C8B-B14F-4D97-AF65-F5344CB8AC3E}">
+        <p14:creationId xmlns:p14="http://schemas.microsoft.com/office/powerpoint/2010/main" val="880430970"/>
+      </p:ext>
+    </p:extLst>
+  </p:cSld>
+  <p:clrMapOvr>
+    <a:masterClrMapping/>
+  </p:clrMapOvr>
+</p:notes>
+</file>
+
+<file path=ppt/notesSlides/notesSlide4.xml><?xml version="1.0" encoding="utf-8"?>
+<p:notes xmlns:a="http://schemas.openxmlformats.org/drawingml/2006/main" xmlns:r="http://schemas.openxmlformats.org/officeDocument/2006/relationships" xmlns:p="http://schemas.openxmlformats.org/presentationml/2006/main">
+  <p:cSld>
+    <p:spTree>
+      <p:nvGrpSpPr>
+        <p:cNvPr id="1" name=""/>
+        <p:cNvGrpSpPr/>
+        <p:nvPr/>
+      </p:nvGrpSpPr>
+      <p:grpSpPr>
+        <a:xfrm>
+          <a:off x="0" y="0"/>
+          <a:ext cx="0" cy="0"/>
+          <a:chOff x="0" y="0"/>
+          <a:chExt cx="0" cy="0"/>
+        </a:xfrm>
+      </p:grpSpPr>
+      <p:sp>
+        <p:nvSpPr>
+          <p:cNvPr id="2" name="Slide Image Placeholder 1"/>
+          <p:cNvSpPr>
+            <a:spLocks noGrp="1" noRot="1" noChangeAspect="1"/>
+          </p:cNvSpPr>
+          <p:nvPr>
+            <p:ph type="sldImg"/>
+          </p:nvPr>
+        </p:nvSpPr>
+        <p:spPr/>
+      </p:sp>
+      <p:sp>
+        <p:nvSpPr>
+          <p:cNvPr id="3" name="Notes Placeholder 2"/>
+          <p:cNvSpPr>
+            <a:spLocks noGrp="1"/>
+          </p:cNvSpPr>
+          <p:nvPr>
+            <p:ph type="body" idx="1"/>
+          </p:nvPr>
+        </p:nvSpPr>
+        <p:spPr/>
+        <p:txBody>
+          <a:bodyPr/>
+          <a:lstStyle/>
+          <a:p>
             <a:r>
               <a:rPr lang="en-US" b="1" dirty="0" smtClean="0"/>
               <a:t>Nothing to notify PEOPLE here … REMEMBER</a:t>
@@ -10449,7 +10618,7 @@
           <a:p>
             <a:fld id="{D6FC1D5B-70D3-4197-920E-67D2822F42E8}" type="slidenum">
               <a:rPr lang="en-US" smtClean="0"/>
-              <a:t>14</a:t>
+              <a:t>15</a:t>
             </a:fld>
             <a:endParaRPr lang="en-US"/>
           </a:p>
@@ -10891,7 +11060,7 @@
             <a:fld id="{1D8BD707-D9CF-40AE-B4C6-C98DA3205C09}" type="datetimeFigureOut">
               <a:rPr lang="en-US" smtClean="0"/>
               <a:pPr/>
-              <a:t>2/22/2014</a:t>
+              <a:t>3/22/2014</a:t>
             </a:fld>
             <a:endParaRPr lang="en-US"/>
           </a:p>
@@ -11105,7 +11274,7 @@
             <a:fld id="{1D8BD707-D9CF-40AE-B4C6-C98DA3205C09}" type="datetimeFigureOut">
               <a:rPr lang="en-US" smtClean="0"/>
               <a:pPr/>
-              <a:t>2/22/2014</a:t>
+              <a:t>3/22/2014</a:t>
             </a:fld>
             <a:endParaRPr lang="en-US"/>
           </a:p>
@@ -11294,7 +11463,7 @@
             <a:fld id="{1D8BD707-D9CF-40AE-B4C6-C98DA3205C09}" type="datetimeFigureOut">
               <a:rPr lang="en-US" smtClean="0"/>
               <a:pPr/>
-              <a:t>2/22/2014</a:t>
+              <a:t>3/22/2014</a:t>
             </a:fld>
             <a:endParaRPr lang="en-US"/>
           </a:p>
@@ -11393,7 +11562,7 @@
             <a:fld id="{1D8BD707-D9CF-40AE-B4C6-C98DA3205C09}" type="datetimeFigureOut">
               <a:rPr lang="en-US" smtClean="0"/>
               <a:pPr/>
-              <a:t>2/22/2014</a:t>
+              <a:t>3/22/2014</a:t>
             </a:fld>
             <a:endParaRPr lang="en-US"/>
           </a:p>
@@ -11991,7 +12160,7 @@
             <a:fld id="{1D8BD707-D9CF-40AE-B4C6-C98DA3205C09}" type="datetimeFigureOut">
               <a:rPr lang="en-US" smtClean="0"/>
               <a:pPr/>
-              <a:t>2/22/2014</a:t>
+              <a:t>3/22/2014</a:t>
             </a:fld>
             <a:endParaRPr lang="en-US"/>
           </a:p>
@@ -12090,7 +12259,7 @@
             <a:fld id="{1D8BD707-D9CF-40AE-B4C6-C98DA3205C09}" type="datetimeFigureOut">
               <a:rPr lang="en-US" smtClean="0"/>
               <a:pPr/>
-              <a:t>2/22/2014</a:t>
+              <a:t>3/22/2014</a:t>
             </a:fld>
             <a:endParaRPr lang="en-US"/>
           </a:p>
@@ -12697,7 +12866,7 @@
             <a:fld id="{1D8BD707-D9CF-40AE-B4C6-C98DA3205C09}" type="datetimeFigureOut">
               <a:rPr lang="en-US" smtClean="0"/>
               <a:pPr/>
-              <a:t>2/22/2014</a:t>
+              <a:t>3/22/2014</a:t>
             </a:fld>
             <a:endParaRPr lang="en-US"/>
           </a:p>
@@ -12842,7 +13011,7 @@
             <a:fld id="{1D8BD707-D9CF-40AE-B4C6-C98DA3205C09}" type="datetimeFigureOut">
               <a:rPr lang="en-US" smtClean="0"/>
               <a:pPr/>
-              <a:t>2/22/2014</a:t>
+              <a:t>3/22/2014</a:t>
             </a:fld>
             <a:endParaRPr lang="en-US"/>
           </a:p>
@@ -12941,7 +13110,7 @@
             <a:fld id="{1D8BD707-D9CF-40AE-B4C6-C98DA3205C09}" type="datetimeFigureOut">
               <a:rPr lang="en-US" smtClean="0"/>
               <a:pPr/>
-              <a:t>2/22/2014</a:t>
+              <a:t>3/22/2014</a:t>
             </a:fld>
             <a:endParaRPr lang="en-US"/>
           </a:p>
@@ -13227,7 +13396,7 @@
             <a:fld id="{1D8BD707-D9CF-40AE-B4C6-C98DA3205C09}" type="datetimeFigureOut">
               <a:rPr lang="en-US" smtClean="0"/>
               <a:pPr/>
-              <a:t>2/22/2014</a:t>
+              <a:t>3/22/2014</a:t>
             </a:fld>
             <a:endParaRPr lang="en-US"/>
           </a:p>
@@ -13751,7 +13920,7 @@
             <a:fld id="{1D8BD707-D9CF-40AE-B4C6-C98DA3205C09}" type="datetimeFigureOut">
               <a:rPr lang="en-US" smtClean="0"/>
               <a:pPr/>
-              <a:t>2/22/2014</a:t>
+              <a:t>3/22/2014</a:t>
             </a:fld>
             <a:endParaRPr lang="en-US"/>
           </a:p>
@@ -14278,7 +14447,7 @@
             <a:fld id="{1D8BD707-D9CF-40AE-B4C6-C98DA3205C09}" type="datetimeFigureOut">
               <a:rPr lang="en-US" smtClean="0"/>
               <a:pPr/>
-              <a:t>2/22/2014</a:t>
+              <a:t>3/22/2014</a:t>
             </a:fld>
             <a:endParaRPr lang="en-US"/>
           </a:p>
@@ -15506,6 +15675,1097 @@
           </a:bodyPr>
           <a:lstStyle/>
           <a:p>
+            <a:pPr lvl="0"/>
+            <a:r>
+              <a:rPr lang="en-US" sz="3200" b="1" dirty="0">
+                <a:ln w="11430"/>
+                <a:gradFill>
+                  <a:gsLst>
+                    <a:gs pos="0">
+                      <a:srgbClr val="F14124">
+                        <a:tint val="90000"/>
+                        <a:satMod val="120000"/>
+                      </a:srgbClr>
+                    </a:gs>
+                    <a:gs pos="25000">
+                      <a:srgbClr val="F14124">
+                        <a:tint val="93000"/>
+                        <a:satMod val="120000"/>
+                      </a:srgbClr>
+                    </a:gs>
+                    <a:gs pos="50000">
+                      <a:srgbClr val="F14124">
+                        <a:shade val="89000"/>
+                        <a:satMod val="110000"/>
+                      </a:srgbClr>
+                    </a:gs>
+                    <a:gs pos="75000">
+                      <a:srgbClr val="F14124">
+                        <a:tint val="93000"/>
+                        <a:satMod val="120000"/>
+                      </a:srgbClr>
+                    </a:gs>
+                    <a:gs pos="100000">
+                      <a:srgbClr val="F14124">
+                        <a:tint val="90000"/>
+                        <a:satMod val="120000"/>
+                      </a:srgbClr>
+                    </a:gs>
+                  </a:gsLst>
+                  <a:lin ang="5400000"/>
+                </a:gradFill>
+                <a:effectLst>
+                  <a:outerShdw blurRad="80000" dist="40000" dir="5040000" algn="tl">
+                    <a:srgbClr val="000000">
+                      <a:alpha val="30000"/>
+                    </a:srgbClr>
+                  </a:outerShdw>
+                </a:effectLst>
+              </a:rPr>
+              <a:t>Subsystem 2: </a:t>
+            </a:r>
+            <a:r>
+              <a:rPr lang="en-US" sz="3200" b="1" dirty="0">
+                <a:ln w="11430"/>
+                <a:gradFill>
+                  <a:gsLst>
+                    <a:gs pos="0">
+                      <a:schemeClr val="accent6">
+                        <a:tint val="90000"/>
+                        <a:satMod val="120000"/>
+                      </a:schemeClr>
+                    </a:gs>
+                    <a:gs pos="25000">
+                      <a:schemeClr val="accent6">
+                        <a:tint val="93000"/>
+                        <a:satMod val="120000"/>
+                      </a:schemeClr>
+                    </a:gs>
+                    <a:gs pos="50000">
+                      <a:schemeClr val="accent6">
+                        <a:shade val="89000"/>
+                        <a:satMod val="110000"/>
+                      </a:schemeClr>
+                    </a:gs>
+                    <a:gs pos="75000">
+                      <a:schemeClr val="accent6">
+                        <a:tint val="93000"/>
+                        <a:satMod val="120000"/>
+                      </a:schemeClr>
+                    </a:gs>
+                    <a:gs pos="100000">
+                      <a:schemeClr val="accent6">
+                        <a:tint val="90000"/>
+                        <a:satMod val="120000"/>
+                      </a:schemeClr>
+                    </a:gs>
+                  </a:gsLst>
+                  <a:lin ang="5400000"/>
+                </a:gradFill>
+                <a:effectLst>
+                  <a:outerShdw blurRad="80000" dist="40000" dir="5040000" algn="tl">
+                    <a:srgbClr val="000000">
+                      <a:alpha val="30000"/>
+                    </a:srgbClr>
+                  </a:outerShdw>
+                </a:effectLst>
+              </a:rPr>
+              <a:t>Cause List Generation</a:t>
+            </a:r>
+            <a:endParaRPr lang="en-US" sz="3200" b="1" dirty="0">
+              <a:ln w="11430"/>
+              <a:gradFill>
+                <a:gsLst>
+                  <a:gs pos="0">
+                    <a:srgbClr val="F14124">
+                      <a:tint val="90000"/>
+                      <a:satMod val="120000"/>
+                    </a:srgbClr>
+                  </a:gs>
+                  <a:gs pos="25000">
+                    <a:srgbClr val="F14124">
+                      <a:tint val="93000"/>
+                      <a:satMod val="120000"/>
+                    </a:srgbClr>
+                  </a:gs>
+                  <a:gs pos="50000">
+                    <a:srgbClr val="F14124">
+                      <a:shade val="89000"/>
+                      <a:satMod val="110000"/>
+                    </a:srgbClr>
+                  </a:gs>
+                  <a:gs pos="75000">
+                    <a:srgbClr val="F14124">
+                      <a:tint val="93000"/>
+                      <a:satMod val="120000"/>
+                    </a:srgbClr>
+                  </a:gs>
+                  <a:gs pos="100000">
+                    <a:srgbClr val="F14124">
+                      <a:tint val="90000"/>
+                      <a:satMod val="120000"/>
+                    </a:srgbClr>
+                  </a:gs>
+                </a:gsLst>
+                <a:lin ang="5400000"/>
+              </a:gradFill>
+              <a:effectLst>
+                <a:outerShdw blurRad="80000" dist="40000" dir="5040000" algn="tl">
+                  <a:srgbClr val="000000">
+                    <a:alpha val="30000"/>
+                  </a:srgbClr>
+                </a:outerShdw>
+              </a:effectLst>
+            </a:endParaRPr>
+          </a:p>
+        </p:txBody>
+      </p:sp>
+      <p:pic>
+        <p:nvPicPr>
+          <p:cNvPr id="5" name="Picture 2" descr="D:\Rakinsfiles\rakin's L-3 T-1\Software\LAB_ISD\Photos\Supreme Court of Bangladesh.jpg"/>
+          <p:cNvPicPr>
+            <a:picLocks noChangeAspect="1" noChangeArrowheads="1"/>
+          </p:cNvPicPr>
+          <p:nvPr/>
+        </p:nvPicPr>
+        <p:blipFill>
+          <a:blip r:embed="rId2" cstate="print">
+            <a:extLst>
+              <a:ext uri="{28A0092B-C50C-407E-A947-70E740481C1C}">
+                <a14:useLocalDpi xmlns:a14="http://schemas.microsoft.com/office/drawing/2010/main" val="0"/>
+              </a:ext>
+            </a:extLst>
+          </a:blip>
+          <a:srcRect/>
+          <a:stretch>
+            <a:fillRect/>
+          </a:stretch>
+        </p:blipFill>
+        <p:spPr bwMode="auto">
+          <a:xfrm>
+            <a:off x="7391400" y="212491"/>
+            <a:ext cx="1461167" cy="1022817"/>
+          </a:xfrm>
+          <a:prstGeom prst="ellipse">
+            <a:avLst/>
+          </a:prstGeom>
+          <a:ln>
+            <a:noFill/>
+          </a:ln>
+          <a:effectLst>
+            <a:softEdge rad="112500"/>
+          </a:effectLst>
+          <a:extLst>
+            <a:ext uri="{909E8E84-426E-40DD-AFC4-6F175D3DCCD1}">
+              <a14:hiddenFill xmlns:a14="http://schemas.microsoft.com/office/drawing/2010/main">
+                <a:solidFill>
+                  <a:srgbClr val="FFFFFF"/>
+                </a:solidFill>
+              </a14:hiddenFill>
+            </a:ext>
+          </a:extLst>
+        </p:spPr>
+      </p:pic>
+      <p:sp>
+        <p:nvSpPr>
+          <p:cNvPr id="6" name="Slide Number Placeholder 3"/>
+          <p:cNvSpPr>
+            <a:spLocks noGrp="1"/>
+          </p:cNvSpPr>
+          <p:nvPr>
+            <p:ph type="sldNum" sz="quarter" idx="12"/>
+          </p:nvPr>
+        </p:nvSpPr>
+        <p:spPr>
+          <a:xfrm>
+            <a:off x="8121983" y="990600"/>
+            <a:ext cx="893649" cy="495299"/>
+          </a:xfrm>
+        </p:spPr>
+        <p:txBody>
+          <a:bodyPr>
+            <a:scene3d>
+              <a:camera prst="orthographicFront">
+                <a:rot lat="0" lon="0" rev="0"/>
+              </a:camera>
+              <a:lightRig rig="contrasting" dir="t">
+                <a:rot lat="0" lon="0" rev="4500000"/>
+              </a:lightRig>
+            </a:scene3d>
+            <a:sp3d contourW="6350" prstMaterial="metal">
+              <a:bevelT w="127000" h="31750" prst="relaxedInset"/>
+              <a:contourClr>
+                <a:schemeClr val="accent1">
+                  <a:shade val="75000"/>
+                </a:schemeClr>
+              </a:contourClr>
+            </a:sp3d>
+          </a:bodyPr>
+          <a:lstStyle/>
+          <a:p>
+            <a:fld id="{D787AFA1-61CC-4523-8BB5-29B4479E0D14}" type="slidenum">
+              <a:rPr lang="en-US" sz="3600" cap="all" smtClean="0">
+                <a:ln w="0"/>
+                <a:gradFill flip="none">
+                  <a:gsLst>
+                    <a:gs pos="0">
+                      <a:schemeClr val="accent1">
+                        <a:tint val="75000"/>
+                        <a:shade val="75000"/>
+                        <a:satMod val="170000"/>
+                      </a:schemeClr>
+                    </a:gs>
+                    <a:gs pos="49000">
+                      <a:schemeClr val="accent1">
+                        <a:tint val="88000"/>
+                        <a:shade val="65000"/>
+                        <a:satMod val="172000"/>
+                      </a:schemeClr>
+                    </a:gs>
+                    <a:gs pos="50000">
+                      <a:schemeClr val="accent1">
+                        <a:shade val="65000"/>
+                        <a:satMod val="130000"/>
+                      </a:schemeClr>
+                    </a:gs>
+                    <a:gs pos="92000">
+                      <a:schemeClr val="accent1">
+                        <a:shade val="50000"/>
+                        <a:satMod val="120000"/>
+                      </a:schemeClr>
+                    </a:gs>
+                    <a:gs pos="100000">
+                      <a:schemeClr val="accent1">
+                        <a:shade val="48000"/>
+                        <a:satMod val="120000"/>
+                      </a:schemeClr>
+                    </a:gs>
+                  </a:gsLst>
+                  <a:lin ang="5400000"/>
+                </a:gradFill>
+                <a:effectLst>
+                  <a:reflection blurRad="12700" stA="50000" endPos="50000" dist="5000" dir="5400000" sy="-100000" rotWithShape="0"/>
+                </a:effectLst>
+              </a:rPr>
+              <a:t>10</a:t>
+            </a:fld>
+            <a:endParaRPr lang="en-US" sz="3600" cap="all" dirty="0">
+              <a:ln w="0"/>
+              <a:gradFill flip="none">
+                <a:gsLst>
+                  <a:gs pos="0">
+                    <a:schemeClr val="accent1">
+                      <a:tint val="75000"/>
+                      <a:shade val="75000"/>
+                      <a:satMod val="170000"/>
+                    </a:schemeClr>
+                  </a:gs>
+                  <a:gs pos="49000">
+                    <a:schemeClr val="accent1">
+                      <a:tint val="88000"/>
+                      <a:shade val="65000"/>
+                      <a:satMod val="172000"/>
+                    </a:schemeClr>
+                  </a:gs>
+                  <a:gs pos="50000">
+                    <a:schemeClr val="accent1">
+                      <a:shade val="65000"/>
+                      <a:satMod val="130000"/>
+                    </a:schemeClr>
+                  </a:gs>
+                  <a:gs pos="92000">
+                    <a:schemeClr val="accent1">
+                      <a:shade val="50000"/>
+                      <a:satMod val="120000"/>
+                    </a:schemeClr>
+                  </a:gs>
+                  <a:gs pos="100000">
+                    <a:schemeClr val="accent1">
+                      <a:shade val="48000"/>
+                      <a:satMod val="120000"/>
+                    </a:schemeClr>
+                  </a:gs>
+                </a:gsLst>
+                <a:lin ang="5400000"/>
+              </a:gradFill>
+              <a:effectLst>
+                <a:reflection blurRad="12700" stA="50000" endPos="50000" dist="5000" dir="5400000" sy="-100000" rotWithShape="0"/>
+              </a:effectLst>
+            </a:endParaRPr>
+          </a:p>
+        </p:txBody>
+      </p:sp>
+      <p:sp>
+        <p:nvSpPr>
+          <p:cNvPr id="2" name="TextBox 1"/>
+          <p:cNvSpPr txBox="1"/>
+          <p:nvPr/>
+        </p:nvSpPr>
+        <p:spPr>
+          <a:xfrm>
+            <a:off x="228599" y="1143000"/>
+            <a:ext cx="3258995" cy="461665"/>
+          </a:xfrm>
+          <a:prstGeom prst="rect">
+            <a:avLst/>
+          </a:prstGeom>
+          <a:noFill/>
+        </p:spPr>
+        <p:txBody>
+          <a:bodyPr wrap="square" rtlCol="0">
+            <a:spAutoFit/>
+            <a:scene3d>
+              <a:camera prst="orthographicFront">
+                <a:rot lat="0" lon="0" rev="0"/>
+              </a:camera>
+              <a:lightRig rig="contrasting" dir="t">
+                <a:rot lat="0" lon="0" rev="4500000"/>
+              </a:lightRig>
+            </a:scene3d>
+            <a:sp3d contourW="6350" prstMaterial="metal">
+              <a:bevelT w="127000" h="31750" prst="relaxedInset"/>
+              <a:contourClr>
+                <a:schemeClr val="accent1">
+                  <a:shade val="75000"/>
+                </a:schemeClr>
+              </a:contourClr>
+            </a:sp3d>
+          </a:bodyPr>
+          <a:lstStyle/>
+          <a:p>
+            <a:r>
+              <a:rPr lang="en-US" sz="2400" b="1" cap="all" dirty="0" smtClean="0">
+                <a:ln w="0"/>
+                <a:gradFill flip="none">
+                  <a:gsLst>
+                    <a:gs pos="0">
+                      <a:schemeClr val="accent1">
+                        <a:tint val="75000"/>
+                        <a:shade val="75000"/>
+                        <a:satMod val="170000"/>
+                      </a:schemeClr>
+                    </a:gs>
+                    <a:gs pos="49000">
+                      <a:schemeClr val="accent1">
+                        <a:tint val="88000"/>
+                        <a:shade val="65000"/>
+                        <a:satMod val="172000"/>
+                      </a:schemeClr>
+                    </a:gs>
+                    <a:gs pos="50000">
+                      <a:schemeClr val="accent1">
+                        <a:shade val="65000"/>
+                        <a:satMod val="130000"/>
+                      </a:schemeClr>
+                    </a:gs>
+                    <a:gs pos="92000">
+                      <a:schemeClr val="accent1">
+                        <a:shade val="50000"/>
+                        <a:satMod val="120000"/>
+                      </a:schemeClr>
+                    </a:gs>
+                    <a:gs pos="100000">
+                      <a:schemeClr val="accent1">
+                        <a:shade val="48000"/>
+                        <a:satMod val="120000"/>
+                      </a:schemeClr>
+                    </a:gs>
+                  </a:gsLst>
+                  <a:lin ang="5400000"/>
+                </a:gradFill>
+                <a:effectLst>
+                  <a:reflection blurRad="12700" stA="50000" endPos="50000" dist="5000" dir="5400000" sy="-100000" rotWithShape="0"/>
+                </a:effectLst>
+              </a:rPr>
+              <a:t>Use Case Glossary:</a:t>
+            </a:r>
+            <a:endParaRPr lang="en-US" sz="2400" b="1" cap="all" dirty="0">
+              <a:ln w="0"/>
+              <a:gradFill flip="none">
+                <a:gsLst>
+                  <a:gs pos="0">
+                    <a:schemeClr val="accent1">
+                      <a:tint val="75000"/>
+                      <a:shade val="75000"/>
+                      <a:satMod val="170000"/>
+                    </a:schemeClr>
+                  </a:gs>
+                  <a:gs pos="49000">
+                    <a:schemeClr val="accent1">
+                      <a:tint val="88000"/>
+                      <a:shade val="65000"/>
+                      <a:satMod val="172000"/>
+                    </a:schemeClr>
+                  </a:gs>
+                  <a:gs pos="50000">
+                    <a:schemeClr val="accent1">
+                      <a:shade val="65000"/>
+                      <a:satMod val="130000"/>
+                    </a:schemeClr>
+                  </a:gs>
+                  <a:gs pos="92000">
+                    <a:schemeClr val="accent1">
+                      <a:shade val="50000"/>
+                      <a:satMod val="120000"/>
+                    </a:schemeClr>
+                  </a:gs>
+                  <a:gs pos="100000">
+                    <a:schemeClr val="accent1">
+                      <a:shade val="48000"/>
+                      <a:satMod val="120000"/>
+                    </a:schemeClr>
+                  </a:gs>
+                </a:gsLst>
+                <a:lin ang="5400000"/>
+              </a:gradFill>
+              <a:effectLst>
+                <a:reflection blurRad="12700" stA="50000" endPos="50000" dist="5000" dir="5400000" sy="-100000" rotWithShape="0"/>
+              </a:effectLst>
+            </a:endParaRPr>
+          </a:p>
+        </p:txBody>
+      </p:sp>
+      <p:graphicFrame>
+        <p:nvGraphicFramePr>
+          <p:cNvPr id="3" name="Table 2"/>
+          <p:cNvGraphicFramePr>
+            <a:graphicFrameLocks noGrp="1"/>
+          </p:cNvGraphicFramePr>
+          <p:nvPr>
+            <p:extLst>
+              <p:ext uri="{D42A27DB-BD31-4B8C-83A1-F6EECF244321}">
+                <p14:modId xmlns:p14="http://schemas.microsoft.com/office/powerpoint/2010/main" val="1192104423"/>
+              </p:ext>
+            </p:extLst>
+          </p:nvPr>
+        </p:nvGraphicFramePr>
+        <p:xfrm>
+          <a:off x="228600" y="1705159"/>
+          <a:ext cx="8686802" cy="4702711"/>
+        </p:xfrm>
+        <a:graphic>
+          <a:graphicData uri="http://schemas.openxmlformats.org/drawingml/2006/table">
+            <a:tbl>
+              <a:tblPr firstRow="1" bandRow="1">
+                <a:tableStyleId>{69C7853C-536D-4A76-A0AE-DD22124D55A5}</a:tableStyleId>
+              </a:tblPr>
+              <a:tblGrid>
+                <a:gridCol w="2417315"/>
+                <a:gridCol w="3018641"/>
+                <a:gridCol w="3250846"/>
+              </a:tblGrid>
+              <a:tr h="580841">
+                <a:tc>
+                  <a:txBody>
+                    <a:bodyPr/>
+                    <a:lstStyle/>
+                    <a:p>
+                      <a:pPr algn="ctr"/>
+                      <a:r>
+                        <a:rPr lang="en-US" dirty="0" smtClean="0"/>
+                        <a:t>Use-Case</a:t>
+                      </a:r>
+                      <a:endParaRPr lang="en-US" dirty="0"/>
+                    </a:p>
+                  </a:txBody>
+                  <a:tcPr>
+                    <a:solidFill>
+                      <a:schemeClr val="tx2">
+                        <a:lumMod val="50000"/>
+                      </a:schemeClr>
+                    </a:solidFill>
+                  </a:tcPr>
+                </a:tc>
+                <a:tc>
+                  <a:txBody>
+                    <a:bodyPr/>
+                    <a:lstStyle/>
+                    <a:p>
+                      <a:pPr algn="ctr"/>
+                      <a:r>
+                        <a:rPr lang="en-US" dirty="0" smtClean="0"/>
+                        <a:t>Description</a:t>
+                      </a:r>
+                      <a:endParaRPr lang="en-US" dirty="0"/>
+                    </a:p>
+                  </a:txBody>
+                  <a:tcPr>
+                    <a:solidFill>
+                      <a:schemeClr val="tx2">
+                        <a:lumMod val="50000"/>
+                      </a:schemeClr>
+                    </a:solidFill>
+                  </a:tcPr>
+                </a:tc>
+                <a:tc>
+                  <a:txBody>
+                    <a:bodyPr/>
+                    <a:lstStyle/>
+                    <a:p>
+                      <a:pPr algn="ctr"/>
+                      <a:r>
+                        <a:rPr lang="en-US" dirty="0" smtClean="0"/>
+                        <a:t>Participant actors and Roles</a:t>
+                      </a:r>
+                      <a:endParaRPr lang="en-US" dirty="0"/>
+                    </a:p>
+                  </a:txBody>
+                  <a:tcPr>
+                    <a:solidFill>
+                      <a:schemeClr val="tx2">
+                        <a:lumMod val="50000"/>
+                      </a:schemeClr>
+                    </a:solidFill>
+                  </a:tcPr>
+                </a:tc>
+              </a:tr>
+              <a:tr h="1066800">
+                <a:tc>
+                  <a:txBody>
+                    <a:bodyPr/>
+                    <a:lstStyle/>
+                    <a:p>
+                      <a:r>
+                        <a:rPr lang="en-US" sz="1600" dirty="0" smtClean="0"/>
+                        <a:t>Case Reception</a:t>
+                      </a:r>
+                      <a:endParaRPr lang="en-US" sz="1600" dirty="0"/>
+                    </a:p>
+                  </a:txBody>
+                  <a:tcPr/>
+                </a:tc>
+                <a:tc>
+                  <a:txBody>
+                    <a:bodyPr/>
+                    <a:lstStyle/>
+                    <a:p>
+                      <a:r>
+                        <a:rPr lang="en-US" sz="1600" dirty="0" smtClean="0"/>
+                        <a:t>The FIR with</a:t>
+                      </a:r>
+                      <a:r>
+                        <a:rPr lang="en-US" sz="1600" baseline="0" dirty="0" smtClean="0"/>
+                        <a:t> necessary details are received at the Magistrate office</a:t>
+                      </a:r>
+                      <a:endParaRPr lang="en-US" sz="1600" dirty="0"/>
+                    </a:p>
+                  </a:txBody>
+                  <a:tcPr/>
+                </a:tc>
+                <a:tc>
+                  <a:txBody>
+                    <a:bodyPr/>
+                    <a:lstStyle/>
+                    <a:p>
+                      <a:pPr marL="285750" marR="0" indent="-285750" algn="l" defTabSz="914400" rtl="0" eaLnBrk="1" fontAlgn="auto" latinLnBrk="0" hangingPunct="1">
+                        <a:lnSpc>
+                          <a:spcPct val="100000"/>
+                        </a:lnSpc>
+                        <a:spcBef>
+                          <a:spcPts val="0"/>
+                        </a:spcBef>
+                        <a:spcAft>
+                          <a:spcPts val="0"/>
+                        </a:spcAft>
+                        <a:buClrTx/>
+                        <a:buSzTx/>
+                        <a:buFont typeface="Courier New" pitchFamily="49" charset="0"/>
+                        <a:buChar char="o"/>
+                        <a:tabLst/>
+                        <a:defRPr/>
+                      </a:pPr>
+                      <a:r>
+                        <a:rPr lang="en-US" sz="1600" u="sng" dirty="0" smtClean="0">
+                          <a:solidFill>
+                            <a:schemeClr val="accent5">
+                              <a:lumMod val="75000"/>
+                            </a:schemeClr>
+                          </a:solidFill>
+                          <a:effectLst>
+                            <a:outerShdw blurRad="38100" dist="38100" dir="2700000" algn="tl">
+                              <a:srgbClr val="000000">
+                                <a:alpha val="43137"/>
+                              </a:srgbClr>
+                            </a:outerShdw>
+                          </a:effectLst>
+                        </a:rPr>
+                        <a:t>GRO</a:t>
+                      </a:r>
+                      <a:r>
+                        <a:rPr lang="en-US" sz="1600" u="sng" dirty="0" smtClean="0">
+                          <a:solidFill>
+                            <a:schemeClr val="accent5">
+                              <a:lumMod val="75000"/>
+                            </a:schemeClr>
+                          </a:solidFill>
+                        </a:rPr>
+                        <a:t>:</a:t>
+                      </a:r>
+                      <a:r>
+                        <a:rPr lang="en-US" sz="1600" dirty="0" smtClean="0">
+                          <a:solidFill>
+                            <a:schemeClr val="accent5">
+                              <a:lumMod val="75000"/>
+                            </a:schemeClr>
+                          </a:solidFill>
+                        </a:rPr>
+                        <a:t> </a:t>
+                      </a:r>
+                      <a:r>
+                        <a:rPr lang="en-US" sz="1600" dirty="0" smtClean="0"/>
+                        <a:t>Receives the FIR</a:t>
+                      </a:r>
+                    </a:p>
+                  </a:txBody>
+                  <a:tcPr/>
+                </a:tc>
+              </a:tr>
+              <a:tr h="1256750">
+                <a:tc>
+                  <a:txBody>
+                    <a:bodyPr/>
+                    <a:lstStyle/>
+                    <a:p>
+                      <a:r>
+                        <a:rPr lang="en-US" sz="1600" dirty="0" smtClean="0"/>
+                        <a:t>Received Case List Sending</a:t>
+                      </a:r>
+                      <a:endParaRPr lang="en-US" sz="1600" dirty="0"/>
+                    </a:p>
+                  </a:txBody>
+                  <a:tcPr/>
+                </a:tc>
+                <a:tc>
+                  <a:txBody>
+                    <a:bodyPr/>
+                    <a:lstStyle/>
+                    <a:p>
+                      <a:r>
+                        <a:rPr lang="en-US" sz="1600" dirty="0" smtClean="0"/>
+                        <a:t>The Magistrate</a:t>
+                      </a:r>
+                      <a:r>
+                        <a:rPr lang="en-US" sz="1600" baseline="0" dirty="0" smtClean="0"/>
+                        <a:t> approved FIR is forwarded to the CMM for the rest of the processes.</a:t>
+                      </a:r>
+                      <a:endParaRPr lang="en-US" sz="1600" dirty="0"/>
+                    </a:p>
+                  </a:txBody>
+                  <a:tcPr/>
+                </a:tc>
+                <a:tc>
+                  <a:txBody>
+                    <a:bodyPr/>
+                    <a:lstStyle/>
+                    <a:p>
+                      <a:pPr marL="285750" indent="-285750">
+                        <a:buFont typeface="Courier New" pitchFamily="49" charset="0"/>
+                        <a:buChar char="o"/>
+                      </a:pPr>
+                      <a:r>
+                        <a:rPr lang="en-US" sz="1600" u="sng" kern="1200" dirty="0" smtClean="0">
+                          <a:solidFill>
+                            <a:schemeClr val="accent5">
+                              <a:lumMod val="75000"/>
+                            </a:schemeClr>
+                          </a:solidFill>
+                          <a:effectLst>
+                            <a:outerShdw blurRad="38100" dist="38100" dir="2700000" algn="tl">
+                              <a:srgbClr val="000000">
+                                <a:alpha val="43137"/>
+                              </a:srgbClr>
+                            </a:outerShdw>
+                          </a:effectLst>
+                          <a:latin typeface="+mn-lt"/>
+                          <a:ea typeface="+mn-ea"/>
+                          <a:cs typeface="+mn-cs"/>
+                        </a:rPr>
+                        <a:t>GRO:</a:t>
+                      </a:r>
+                      <a:r>
+                        <a:rPr lang="en-US" sz="1600" u="none" kern="1200" dirty="0" smtClean="0">
+                          <a:solidFill>
+                            <a:schemeClr val="accent5">
+                              <a:lumMod val="75000"/>
+                            </a:schemeClr>
+                          </a:solidFill>
+                          <a:effectLst>
+                            <a:outerShdw blurRad="38100" dist="38100" dir="2700000" algn="tl">
+                              <a:srgbClr val="000000">
+                                <a:alpha val="43137"/>
+                              </a:srgbClr>
+                            </a:outerShdw>
+                          </a:effectLst>
+                          <a:latin typeface="+mn-lt"/>
+                          <a:ea typeface="+mn-ea"/>
+                          <a:cs typeface="+mn-cs"/>
+                        </a:rPr>
+                        <a:t> </a:t>
+                      </a:r>
+                      <a:r>
+                        <a:rPr lang="en-US" sz="1600" dirty="0" smtClean="0"/>
+                        <a:t>Forwards the case list</a:t>
+                      </a:r>
+                    </a:p>
+                    <a:p>
+                      <a:pPr marL="285750" indent="-285750">
+                        <a:buFont typeface="Courier New" pitchFamily="49" charset="0"/>
+                        <a:buChar char="o"/>
+                      </a:pPr>
+                      <a:r>
+                        <a:rPr lang="en-US" sz="1600" u="sng" kern="1200" dirty="0" smtClean="0">
+                          <a:solidFill>
+                            <a:schemeClr val="accent5">
+                              <a:lumMod val="75000"/>
+                            </a:schemeClr>
+                          </a:solidFill>
+                          <a:effectLst>
+                            <a:outerShdw blurRad="38100" dist="38100" dir="2700000" algn="tl">
+                              <a:srgbClr val="000000">
+                                <a:alpha val="43137"/>
+                              </a:srgbClr>
+                            </a:outerShdw>
+                          </a:effectLst>
+                          <a:latin typeface="+mn-lt"/>
+                          <a:ea typeface="+mn-ea"/>
+                          <a:cs typeface="+mn-cs"/>
+                        </a:rPr>
+                        <a:t>Clerk Office:</a:t>
+                      </a:r>
+                      <a:r>
+                        <a:rPr lang="en-US" sz="1600" u="none" kern="1200" dirty="0" smtClean="0">
+                          <a:solidFill>
+                            <a:schemeClr val="accent5">
+                              <a:lumMod val="75000"/>
+                            </a:schemeClr>
+                          </a:solidFill>
+                          <a:effectLst>
+                            <a:outerShdw blurRad="38100" dist="38100" dir="2700000" algn="tl">
+                              <a:srgbClr val="000000">
+                                <a:alpha val="43137"/>
+                              </a:srgbClr>
+                            </a:outerShdw>
+                          </a:effectLst>
+                          <a:latin typeface="+mn-lt"/>
+                          <a:ea typeface="+mn-ea"/>
+                          <a:cs typeface="+mn-cs"/>
+                        </a:rPr>
+                        <a:t> </a:t>
+                      </a:r>
+                      <a:r>
+                        <a:rPr lang="en-US" sz="1600" dirty="0" smtClean="0"/>
+                        <a:t>Maintains</a:t>
+                      </a:r>
+                      <a:r>
+                        <a:rPr lang="en-US" sz="1600" baseline="0" dirty="0" smtClean="0"/>
+                        <a:t> the docs flow</a:t>
+                      </a:r>
+                    </a:p>
+                  </a:txBody>
+                  <a:tcPr/>
+                </a:tc>
+              </a:tr>
+              <a:tr h="1645920">
+                <a:tc>
+                  <a:txBody>
+                    <a:bodyPr/>
+                    <a:lstStyle/>
+                    <a:p>
+                      <a:r>
+                        <a:rPr lang="en-US" sz="1600" dirty="0" smtClean="0"/>
+                        <a:t>Cause List</a:t>
+                      </a:r>
+                      <a:r>
+                        <a:rPr lang="en-US" sz="1600" baseline="0" dirty="0" smtClean="0"/>
+                        <a:t> Generation</a:t>
+                      </a:r>
+                      <a:endParaRPr lang="en-US" sz="1600" dirty="0"/>
+                    </a:p>
+                  </a:txBody>
+                  <a:tcPr/>
+                </a:tc>
+                <a:tc>
+                  <a:txBody>
+                    <a:bodyPr/>
+                    <a:lstStyle/>
+                    <a:p>
+                      <a:r>
+                        <a:rPr lang="en-US" sz="1600" dirty="0" smtClean="0"/>
+                        <a:t>The case is categorized by respective laws</a:t>
+                      </a:r>
+                      <a:r>
+                        <a:rPr lang="en-US" sz="1600" baseline="0" dirty="0" smtClean="0"/>
+                        <a:t> and the logs are written to the cause-list</a:t>
+                      </a:r>
+                      <a:endParaRPr lang="en-US" sz="1600" dirty="0"/>
+                    </a:p>
+                  </a:txBody>
+                  <a:tcPr/>
+                </a:tc>
+                <a:tc>
+                  <a:txBody>
+                    <a:bodyPr/>
+                    <a:lstStyle/>
+                    <a:p>
+                      <a:pPr marL="285750" indent="-285750">
+                        <a:buFont typeface="Courier New" pitchFamily="49" charset="0"/>
+                        <a:buChar char="o"/>
+                      </a:pPr>
+                      <a:r>
+                        <a:rPr lang="en-US" sz="1600" u="sng" kern="1200" dirty="0" smtClean="0">
+                          <a:solidFill>
+                            <a:schemeClr val="accent5">
+                              <a:lumMod val="75000"/>
+                            </a:schemeClr>
+                          </a:solidFill>
+                          <a:effectLst>
+                            <a:outerShdw blurRad="38100" dist="38100" dir="2700000" algn="tl">
+                              <a:srgbClr val="000000">
+                                <a:alpha val="43137"/>
+                              </a:srgbClr>
+                            </a:outerShdw>
+                          </a:effectLst>
+                          <a:latin typeface="+mn-lt"/>
+                          <a:ea typeface="+mn-ea"/>
+                          <a:cs typeface="+mn-cs"/>
+                        </a:rPr>
+                        <a:t>GRO:</a:t>
+                      </a:r>
+                      <a:r>
+                        <a:rPr lang="en-US" sz="1600" u="none" kern="1200" dirty="0" smtClean="0">
+                          <a:solidFill>
+                            <a:schemeClr val="accent5">
+                              <a:lumMod val="75000"/>
+                            </a:schemeClr>
+                          </a:solidFill>
+                          <a:effectLst>
+                            <a:outerShdw blurRad="38100" dist="38100" dir="2700000" algn="tl">
+                              <a:srgbClr val="000000">
+                                <a:alpha val="43137"/>
+                              </a:srgbClr>
+                            </a:outerShdw>
+                          </a:effectLst>
+                          <a:latin typeface="+mn-lt"/>
+                          <a:ea typeface="+mn-ea"/>
+                          <a:cs typeface="+mn-cs"/>
+                        </a:rPr>
+                        <a:t> </a:t>
+                      </a:r>
+                      <a:r>
+                        <a:rPr lang="en-US" sz="1600" dirty="0" smtClean="0"/>
+                        <a:t>Categorizes the case &amp; forwards the FIR to the Magistrate</a:t>
+                      </a:r>
+                    </a:p>
+                    <a:p>
+                      <a:pPr marL="285750" indent="-285750">
+                        <a:buFont typeface="Courier New" pitchFamily="49" charset="0"/>
+                        <a:buChar char="o"/>
+                      </a:pPr>
+                      <a:r>
+                        <a:rPr lang="en-US" sz="1600" u="sng" kern="1200" dirty="0" smtClean="0">
+                          <a:solidFill>
+                            <a:schemeClr val="accent5">
+                              <a:lumMod val="75000"/>
+                            </a:schemeClr>
+                          </a:solidFill>
+                          <a:effectLst>
+                            <a:outerShdw blurRad="38100" dist="38100" dir="2700000" algn="tl">
+                              <a:srgbClr val="000000">
+                                <a:alpha val="43137"/>
+                              </a:srgbClr>
+                            </a:outerShdw>
+                          </a:effectLst>
+                          <a:latin typeface="+mn-lt"/>
+                          <a:ea typeface="+mn-ea"/>
+                          <a:cs typeface="+mn-cs"/>
+                        </a:rPr>
+                        <a:t>Clerk Office:</a:t>
+                      </a:r>
+                      <a:r>
+                        <a:rPr lang="en-US" sz="1600" u="none" kern="1200" dirty="0" smtClean="0">
+                          <a:solidFill>
+                            <a:schemeClr val="accent5">
+                              <a:lumMod val="75000"/>
+                            </a:schemeClr>
+                          </a:solidFill>
+                          <a:effectLst>
+                            <a:outerShdw blurRad="38100" dist="38100" dir="2700000" algn="tl">
+                              <a:srgbClr val="000000">
+                                <a:alpha val="43137"/>
+                              </a:srgbClr>
+                            </a:outerShdw>
+                          </a:effectLst>
+                          <a:latin typeface="+mn-lt"/>
+                          <a:ea typeface="+mn-ea"/>
+                          <a:cs typeface="+mn-cs"/>
+                        </a:rPr>
+                        <a:t> </a:t>
+                      </a:r>
+                      <a:r>
+                        <a:rPr lang="en-US" sz="1600" dirty="0" smtClean="0"/>
+                        <a:t>Maintains</a:t>
+                      </a:r>
+                      <a:r>
+                        <a:rPr lang="en-US" sz="1600" baseline="0" dirty="0" smtClean="0"/>
+                        <a:t> the docs flow</a:t>
+                      </a:r>
+                    </a:p>
+                    <a:p>
+                      <a:pPr marL="285750" indent="-285750">
+                        <a:buFont typeface="Courier New" pitchFamily="49" charset="0"/>
+                        <a:buChar char="o"/>
+                      </a:pPr>
+                      <a:r>
+                        <a:rPr lang="en-US" sz="1600" u="sng" kern="1200" dirty="0" smtClean="0">
+                          <a:solidFill>
+                            <a:schemeClr val="accent5">
+                              <a:lumMod val="75000"/>
+                            </a:schemeClr>
+                          </a:solidFill>
+                          <a:effectLst>
+                            <a:outerShdw blurRad="38100" dist="38100" dir="2700000" algn="tl">
+                              <a:srgbClr val="000000">
+                                <a:alpha val="43137"/>
+                              </a:srgbClr>
+                            </a:outerShdw>
+                          </a:effectLst>
+                          <a:latin typeface="+mn-lt"/>
+                          <a:ea typeface="+mn-ea"/>
+                          <a:cs typeface="+mn-cs"/>
+                        </a:rPr>
+                        <a:t>Magistrate:</a:t>
+                      </a:r>
+                      <a:r>
+                        <a:rPr lang="en-US" sz="1600" u="none" kern="1200" dirty="0" smtClean="0">
+                          <a:solidFill>
+                            <a:schemeClr val="accent5">
+                              <a:lumMod val="75000"/>
+                            </a:schemeClr>
+                          </a:solidFill>
+                          <a:effectLst>
+                            <a:outerShdw blurRad="38100" dist="38100" dir="2700000" algn="tl">
+                              <a:srgbClr val="000000">
+                                <a:alpha val="43137"/>
+                              </a:srgbClr>
+                            </a:outerShdw>
+                          </a:effectLst>
+                          <a:latin typeface="+mn-lt"/>
+                          <a:ea typeface="+mn-ea"/>
+                          <a:cs typeface="+mn-cs"/>
+                        </a:rPr>
+                        <a:t> </a:t>
+                      </a:r>
+                      <a:r>
+                        <a:rPr lang="en-US" sz="1600" dirty="0" smtClean="0"/>
+                        <a:t>Monitors the cause list</a:t>
+                      </a:r>
+                      <a:endParaRPr lang="en-US" sz="1600" dirty="0"/>
+                    </a:p>
+                  </a:txBody>
+                  <a:tcPr/>
+                </a:tc>
+              </a:tr>
+            </a:tbl>
+          </a:graphicData>
+        </a:graphic>
+      </p:graphicFrame>
+    </p:spTree>
+    <p:extLst>
+      <p:ext uri="{BB962C8B-B14F-4D97-AF65-F5344CB8AC3E}">
+        <p14:creationId xmlns:p14="http://schemas.microsoft.com/office/powerpoint/2010/main" val="326882931"/>
+      </p:ext>
+    </p:extLst>
+  </p:cSld>
+  <p:clrMapOvr>
+    <a:masterClrMapping/>
+  </p:clrMapOvr>
+  <mc:AlternateContent xmlns:mc="http://schemas.openxmlformats.org/markup-compatibility/2006" xmlns:p14="http://schemas.microsoft.com/office/powerpoint/2010/main">
+    <mc:Choice Requires="p14">
+      <p:transition spd="slow" p14:dur="1500">
+        <p14:ripple dir="ld"/>
+      </p:transition>
+    </mc:Choice>
+    <mc:Fallback xmlns="">
+      <p:transition spd="slow">
+        <p:fade/>
+      </p:transition>
+    </mc:Fallback>
+  </mc:AlternateContent>
+  <p:timing>
+    <p:tnLst>
+      <p:par>
+        <p:cTn id="1" dur="indefinite" restart="never" nodeType="tmRoot"/>
+      </p:par>
+    </p:tnLst>
+  </p:timing>
+</p:sld>
+</file>
+
+<file path=ppt/slides/slide11.xml><?xml version="1.0" encoding="utf-8"?>
+<p:sld xmlns:a="http://schemas.openxmlformats.org/drawingml/2006/main" xmlns:r="http://schemas.openxmlformats.org/officeDocument/2006/relationships" xmlns:p="http://schemas.openxmlformats.org/presentationml/2006/main">
+  <p:cSld>
+    <p:spTree>
+      <p:nvGrpSpPr>
+        <p:cNvPr id="1" name=""/>
+        <p:cNvGrpSpPr/>
+        <p:nvPr/>
+      </p:nvGrpSpPr>
+      <p:grpSpPr>
+        <a:xfrm>
+          <a:off x="0" y="0"/>
+          <a:ext cx="0" cy="0"/>
+          <a:chOff x="0" y="0"/>
+          <a:chExt cx="0" cy="0"/>
+        </a:xfrm>
+      </p:grpSpPr>
+      <p:sp>
+        <p:nvSpPr>
+          <p:cNvPr id="4" name="Rounded Rectangle 3"/>
+          <p:cNvSpPr/>
+          <p:nvPr/>
+        </p:nvSpPr>
+        <p:spPr>
+          <a:xfrm>
+            <a:off x="228599" y="304800"/>
+            <a:ext cx="7162801" cy="838200"/>
+          </a:xfrm>
+          <a:prstGeom prst="roundRect">
+            <a:avLst/>
+          </a:prstGeom>
+        </p:spPr>
+        <p:style>
+          <a:lnRef idx="0">
+            <a:schemeClr val="accent3"/>
+          </a:lnRef>
+          <a:fillRef idx="3">
+            <a:schemeClr val="accent3"/>
+          </a:fillRef>
+          <a:effectRef idx="3">
+            <a:schemeClr val="accent3"/>
+          </a:effectRef>
+          <a:fontRef idx="minor">
+            <a:schemeClr val="lt1"/>
+          </a:fontRef>
+        </p:style>
+        <p:txBody>
+          <a:bodyPr rtlCol="0" anchor="ctr">
+            <a:scene3d>
+              <a:camera prst="orthographicFront"/>
+              <a:lightRig rig="glow" dir="tl">
+                <a:rot lat="0" lon="0" rev="5400000"/>
+              </a:lightRig>
+            </a:scene3d>
+            <a:sp3d contourW="12700">
+              <a:bevelT w="25400" h="25400"/>
+              <a:contourClr>
+                <a:schemeClr val="accent6">
+                  <a:shade val="73000"/>
+                </a:schemeClr>
+              </a:contourClr>
+            </a:sp3d>
+          </a:bodyPr>
+          <a:lstStyle/>
+          <a:p>
             <a:r>
               <a:rPr lang="en-US" sz="3200" b="1" dirty="0">
                 <a:ln w="11430"/>
@@ -15777,7 +17037,7 @@
                   <a:reflection blurRad="12700" stA="50000" endPos="50000" dist="5000" dir="5400000" sy="-100000" rotWithShape="0"/>
                 </a:effectLst>
               </a:rPr>
-              <a:t>10</a:t>
+              <a:t>11</a:t>
             </a:fld>
             <a:endParaRPr lang="en-US" sz="3600" cap="all" dirty="0">
               <a:ln w="0"/>
@@ -16051,7 +17311,7 @@
 </p:sld>
 </file>
 
-<file path=ppt/slides/slide11.xml><?xml version="1.0" encoding="utf-8"?>
+<file path=ppt/slides/slide12.xml><?xml version="1.0" encoding="utf-8"?>
 <p:sld xmlns:a="http://schemas.openxmlformats.org/drawingml/2006/main" xmlns:r="http://schemas.openxmlformats.org/officeDocument/2006/relationships" xmlns:p="http://schemas.openxmlformats.org/presentationml/2006/main">
   <p:cSld>
     <p:spTree>
@@ -16990,7 +18250,7 @@
                   <a:reflection blurRad="12700" stA="50000" endPos="50000" dist="5000" dir="5400000" sy="-100000" rotWithShape="0"/>
                 </a:effectLst>
               </a:rPr>
-              <a:t>11</a:t>
+              <a:t>12</a:t>
             </a:fld>
             <a:endParaRPr lang="en-US" sz="3600" cap="all" dirty="0">
               <a:ln w="0"/>
@@ -17070,7 +18330,7 @@
 </p:sld>
 </file>
 
-<file path=ppt/slides/slide12.xml><?xml version="1.0" encoding="utf-8"?>
+<file path=ppt/slides/slide13.xml><?xml version="1.0" encoding="utf-8"?>
 <p:sld xmlns:a="http://schemas.openxmlformats.org/drawingml/2006/main" xmlns:r="http://schemas.openxmlformats.org/officeDocument/2006/relationships" xmlns:p="http://schemas.openxmlformats.org/presentationml/2006/main">
   <p:cSld>
     <p:spTree>
@@ -17406,7 +18666,7 @@
                   <a:reflection blurRad="12700" stA="50000" endPos="50000" dist="5000" dir="5400000" sy="-100000" rotWithShape="0"/>
                 </a:effectLst>
               </a:rPr>
-              <a:t>12</a:t>
+              <a:t>13</a:t>
             </a:fld>
             <a:endParaRPr lang="en-US" sz="3600" cap="all" dirty="0">
               <a:ln w="0"/>
@@ -17982,7 +19242,7 @@
 </p:sld>
 </file>
 
-<file path=ppt/slides/slide13.xml><?xml version="1.0" encoding="utf-8"?>
+<file path=ppt/slides/slide14.xml><?xml version="1.0" encoding="utf-8"?>
 <p:sld xmlns:a="http://schemas.openxmlformats.org/drawingml/2006/main" xmlns:r="http://schemas.openxmlformats.org/officeDocument/2006/relationships" xmlns:p="http://schemas.openxmlformats.org/presentationml/2006/main">
   <p:cSld>
     <p:spTree>
@@ -18126,7 +19386,7 @@
                   <a:reflection blurRad="12700" stA="50000" endPos="50000" dist="5000" dir="5400000" sy="-100000" rotWithShape="0"/>
                 </a:effectLst>
               </a:rPr>
-              <a:t>13</a:t>
+              <a:t>14</a:t>
             </a:fld>
             <a:endParaRPr lang="en-US" sz="3600" cap="all" dirty="0">
               <a:ln w="0"/>
@@ -19139,7 +20399,7 @@
 </p:sld>
 </file>
 
-<file path=ppt/slides/slide14.xml><?xml version="1.0" encoding="utf-8"?>
+<file path=ppt/slides/slide15.xml><?xml version="1.0" encoding="utf-8"?>
 <p:sld xmlns:a="http://schemas.openxmlformats.org/drawingml/2006/main" xmlns:r="http://schemas.openxmlformats.org/officeDocument/2006/relationships" xmlns:p="http://schemas.openxmlformats.org/presentationml/2006/main">
   <p:cSld>
     <p:spTree>
@@ -19454,7 +20714,7 @@
                   <a:reflection blurRad="12700" stA="50000" endPos="50000" dist="5000" dir="5400000" sy="-100000" rotWithShape="0"/>
                 </a:effectLst>
               </a:rPr>
-              <a:t>14</a:t>
+              <a:t>15</a:t>
             </a:fld>
             <a:endParaRPr lang="en-US" sz="3600" cap="all" dirty="0">
               <a:ln w="0"/>
@@ -19728,7 +20988,7 @@
 </p:sld>
 </file>
 
-<file path=ppt/slides/slide15.xml><?xml version="1.0" encoding="utf-8"?>
+<file path=ppt/slides/slide16.xml><?xml version="1.0" encoding="utf-8"?>
 <p:sld xmlns:a="http://schemas.openxmlformats.org/drawingml/2006/main" xmlns:r="http://schemas.openxmlformats.org/officeDocument/2006/relationships" xmlns:p="http://schemas.openxmlformats.org/presentationml/2006/main">
   <p:cSld>
     <p:spTree>
@@ -20043,7 +21303,7 @@
                   <a:reflection blurRad="12700" stA="50000" endPos="50000" dist="5000" dir="5400000" sy="-100000" rotWithShape="0"/>
                 </a:effectLst>
               </a:rPr>
-              <a:t>15</a:t>
+              <a:t>16</a:t>
             </a:fld>
             <a:endParaRPr lang="en-US" sz="3600" cap="all" dirty="0">
               <a:ln w="0"/>
@@ -20619,7 +21879,7 @@
 </p:sld>
 </file>
 
-<file path=ppt/slides/slide16.xml><?xml version="1.0" encoding="utf-8"?>
+<file path=ppt/slides/slide17.xml><?xml version="1.0" encoding="utf-8"?>
 <p:sld xmlns:a="http://schemas.openxmlformats.org/drawingml/2006/main" xmlns:r="http://schemas.openxmlformats.org/officeDocument/2006/relationships" xmlns:p="http://schemas.openxmlformats.org/presentationml/2006/main">
   <p:cSld>
     <p:spTree>
@@ -20955,7 +22215,7 @@
                   <a:reflection blurRad="12700" stA="50000" endPos="50000" dist="5000" dir="5400000" sy="-100000" rotWithShape="0"/>
                 </a:effectLst>
               </a:rPr>
-              <a:t>16</a:t>
+              <a:t>17</a:t>
             </a:fld>
             <a:endParaRPr lang="en-US" sz="3600" cap="all" dirty="0">
               <a:ln w="0"/>
@@ -21666,7 +22926,7 @@
 </p:sld>
 </file>
 
-<file path=ppt/slides/slide17.xml><?xml version="1.0" encoding="utf-8"?>
+<file path=ppt/slides/slide18.xml><?xml version="1.0" encoding="utf-8"?>
 <p:sld xmlns:a="http://schemas.openxmlformats.org/drawingml/2006/main" xmlns:r="http://schemas.openxmlformats.org/officeDocument/2006/relationships" xmlns:p="http://schemas.openxmlformats.org/presentationml/2006/main">
   <p:cSld>
     <p:spTree>
@@ -22002,7 +23262,7 @@
                   <a:reflection blurRad="12700" stA="50000" endPos="50000" dist="5000" dir="5400000" sy="-100000" rotWithShape="0"/>
                 </a:effectLst>
               </a:rPr>
-              <a:t>17</a:t>
+              <a:t>18</a:t>
             </a:fld>
             <a:endParaRPr lang="en-US" sz="3600" cap="all" dirty="0">
               <a:ln w="0"/>
@@ -22276,7 +23536,7 @@
 </p:sld>
 </file>
 
-<file path=ppt/slides/slide18.xml><?xml version="1.0" encoding="utf-8"?>
+<file path=ppt/slides/slide19.xml><?xml version="1.0" encoding="utf-8"?>
 <p:sld xmlns:a="http://schemas.openxmlformats.org/drawingml/2006/main" xmlns:r="http://schemas.openxmlformats.org/officeDocument/2006/relationships" xmlns:p="http://schemas.openxmlformats.org/presentationml/2006/main">
   <p:cSld>
     <p:spTree>
@@ -22612,7 +23872,7 @@
                   <a:reflection blurRad="12700" stA="50000" endPos="50000" dist="5000" dir="5400000" sy="-100000" rotWithShape="0"/>
                 </a:effectLst>
               </a:rPr>
-              <a:t>18</a:t>
+              <a:t>19</a:t>
             </a:fld>
             <a:endParaRPr lang="en-US" sz="3600" cap="all" dirty="0">
               <a:ln w="0"/>
@@ -23188,7 +24448,617 @@
 </p:sld>
 </file>
 
-<file path=ppt/slides/slide19.xml><?xml version="1.0" encoding="utf-8"?>
+<file path=ppt/slides/slide2.xml><?xml version="1.0" encoding="utf-8"?>
+<p:sld xmlns:a="http://schemas.openxmlformats.org/drawingml/2006/main" xmlns:r="http://schemas.openxmlformats.org/officeDocument/2006/relationships" xmlns:p="http://schemas.openxmlformats.org/presentationml/2006/main">
+  <p:cSld>
+    <p:spTree>
+      <p:nvGrpSpPr>
+        <p:cNvPr id="1" name=""/>
+        <p:cNvGrpSpPr/>
+        <p:nvPr/>
+      </p:nvGrpSpPr>
+      <p:grpSpPr>
+        <a:xfrm>
+          <a:off x="0" y="0"/>
+          <a:ext cx="0" cy="0"/>
+          <a:chOff x="0" y="0"/>
+          <a:chExt cx="0" cy="0"/>
+        </a:xfrm>
+      </p:grpSpPr>
+      <p:sp>
+        <p:nvSpPr>
+          <p:cNvPr id="4" name="Rounded Rectangle 3"/>
+          <p:cNvSpPr/>
+          <p:nvPr/>
+        </p:nvSpPr>
+        <p:spPr>
+          <a:xfrm>
+            <a:off x="228599" y="304800"/>
+            <a:ext cx="7162801" cy="838200"/>
+          </a:xfrm>
+          <a:prstGeom prst="roundRect">
+            <a:avLst/>
+          </a:prstGeom>
+        </p:spPr>
+        <p:style>
+          <a:lnRef idx="0">
+            <a:schemeClr val="accent3"/>
+          </a:lnRef>
+          <a:fillRef idx="3">
+            <a:schemeClr val="accent3"/>
+          </a:fillRef>
+          <a:effectRef idx="3">
+            <a:schemeClr val="accent3"/>
+          </a:effectRef>
+          <a:fontRef idx="minor">
+            <a:schemeClr val="lt1"/>
+          </a:fontRef>
+        </p:style>
+        <p:txBody>
+          <a:bodyPr rtlCol="0" anchor="ctr">
+            <a:scene3d>
+              <a:camera prst="orthographicFront"/>
+              <a:lightRig rig="glow" dir="tl">
+                <a:rot lat="0" lon="0" rev="5400000"/>
+              </a:lightRig>
+            </a:scene3d>
+            <a:sp3d contourW="12700">
+              <a:bevelT w="25400" h="25400"/>
+              <a:contourClr>
+                <a:schemeClr val="accent6">
+                  <a:shade val="73000"/>
+                </a:schemeClr>
+              </a:contourClr>
+            </a:sp3d>
+          </a:bodyPr>
+          <a:lstStyle/>
+          <a:p>
+            <a:r>
+              <a:rPr lang="en-US" sz="5400" b="1" dirty="0">
+                <a:ln w="11430"/>
+                <a:gradFill>
+                  <a:gsLst>
+                    <a:gs pos="0">
+                      <a:schemeClr val="accent6">
+                        <a:tint val="90000"/>
+                        <a:satMod val="120000"/>
+                      </a:schemeClr>
+                    </a:gs>
+                    <a:gs pos="25000">
+                      <a:schemeClr val="accent6">
+                        <a:tint val="93000"/>
+                        <a:satMod val="120000"/>
+                      </a:schemeClr>
+                    </a:gs>
+                    <a:gs pos="50000">
+                      <a:schemeClr val="accent6">
+                        <a:shade val="89000"/>
+                        <a:satMod val="110000"/>
+                      </a:schemeClr>
+                    </a:gs>
+                    <a:gs pos="75000">
+                      <a:schemeClr val="accent6">
+                        <a:tint val="93000"/>
+                        <a:satMod val="120000"/>
+                      </a:schemeClr>
+                    </a:gs>
+                    <a:gs pos="100000">
+                      <a:schemeClr val="accent6">
+                        <a:tint val="90000"/>
+                        <a:satMod val="120000"/>
+                      </a:schemeClr>
+                    </a:gs>
+                  </a:gsLst>
+                  <a:lin ang="5400000"/>
+                </a:gradFill>
+                <a:effectLst>
+                  <a:outerShdw blurRad="80000" dist="40000" dir="5040000" algn="tl">
+                    <a:srgbClr val="000000">
+                      <a:alpha val="30000"/>
+                    </a:srgbClr>
+                  </a:outerShdw>
+                </a:effectLst>
+              </a:rPr>
+              <a:t>Outline</a:t>
+            </a:r>
+          </a:p>
+        </p:txBody>
+      </p:sp>
+      <p:sp>
+        <p:nvSpPr>
+          <p:cNvPr id="5" name="TextBox 4"/>
+          <p:cNvSpPr txBox="1"/>
+          <p:nvPr/>
+        </p:nvSpPr>
+        <p:spPr>
+          <a:xfrm>
+            <a:off x="1066800" y="1676400"/>
+            <a:ext cx="6511719" cy="4031873"/>
+          </a:xfrm>
+          <a:prstGeom prst="rect">
+            <a:avLst/>
+          </a:prstGeom>
+          <a:noFill/>
+        </p:spPr>
+        <p:txBody>
+          <a:bodyPr wrap="none" rtlCol="0">
+            <a:spAutoFit/>
+          </a:bodyPr>
+          <a:lstStyle/>
+          <a:p>
+            <a:pPr marL="285750" indent="-285750">
+              <a:buFont typeface="Wingdings" pitchFamily="2" charset="2"/>
+              <a:buChar char="Ø"/>
+            </a:pPr>
+            <a:r>
+              <a:rPr lang="en-US" sz="3200" b="1" dirty="0" smtClean="0">
+                <a:ln w="1905"/>
+                <a:solidFill>
+                  <a:schemeClr val="accent2">
+                    <a:lumMod val="50000"/>
+                  </a:schemeClr>
+                </a:solidFill>
+                <a:effectLst>
+                  <a:innerShdw blurRad="69850" dist="43180" dir="5400000">
+                    <a:srgbClr val="000000">
+                      <a:alpha val="65000"/>
+                    </a:srgbClr>
+                  </a:innerShdw>
+                </a:effectLst>
+              </a:rPr>
+              <a:t>Subsystems</a:t>
+            </a:r>
+          </a:p>
+          <a:p>
+            <a:pPr marL="285750" indent="-285750">
+              <a:buFont typeface="Wingdings" pitchFamily="2" charset="2"/>
+              <a:buChar char="Ø"/>
+            </a:pPr>
+            <a:r>
+              <a:rPr lang="en-US" sz="3200" b="1" dirty="0" smtClean="0">
+                <a:ln w="1905"/>
+                <a:solidFill>
+                  <a:schemeClr val="accent1">
+                    <a:lumMod val="50000"/>
+                  </a:schemeClr>
+                </a:solidFill>
+                <a:effectLst>
+                  <a:innerShdw blurRad="69850" dist="43180" dir="5400000">
+                    <a:srgbClr val="000000">
+                      <a:alpha val="65000"/>
+                    </a:srgbClr>
+                  </a:innerShdw>
+                </a:effectLst>
+              </a:rPr>
+              <a:t>Actors</a:t>
+            </a:r>
+          </a:p>
+          <a:p>
+            <a:pPr marL="285750" indent="-285750">
+              <a:buFont typeface="Wingdings" pitchFamily="2" charset="2"/>
+              <a:buChar char="Ø"/>
+            </a:pPr>
+            <a:r>
+              <a:rPr lang="en-US" sz="3200" b="1" dirty="0" smtClean="0">
+                <a:ln w="1905"/>
+                <a:solidFill>
+                  <a:schemeClr val="accent2">
+                    <a:lumMod val="50000"/>
+                  </a:schemeClr>
+                </a:solidFill>
+                <a:effectLst>
+                  <a:innerShdw blurRad="69850" dist="43180" dir="5400000">
+                    <a:srgbClr val="000000">
+                      <a:alpha val="65000"/>
+                    </a:srgbClr>
+                  </a:innerShdw>
+                </a:effectLst>
+              </a:rPr>
+              <a:t>According </a:t>
+            </a:r>
+            <a:r>
+              <a:rPr lang="en-US" sz="3200" b="1" dirty="0">
+                <a:ln w="1905"/>
+                <a:solidFill>
+                  <a:schemeClr val="accent2">
+                    <a:lumMod val="50000"/>
+                  </a:schemeClr>
+                </a:solidFill>
+                <a:effectLst>
+                  <a:innerShdw blurRad="69850" dist="43180" dir="5400000">
+                    <a:srgbClr val="000000">
+                      <a:alpha val="65000"/>
+                    </a:srgbClr>
+                  </a:innerShdw>
+                </a:effectLst>
+              </a:rPr>
+              <a:t>to each </a:t>
+            </a:r>
+            <a:r>
+              <a:rPr lang="en-US" sz="3200" b="1" dirty="0" smtClean="0">
+                <a:ln w="1905"/>
+                <a:solidFill>
+                  <a:schemeClr val="accent2">
+                    <a:lumMod val="50000"/>
+                  </a:schemeClr>
+                </a:solidFill>
+                <a:effectLst>
+                  <a:innerShdw blurRad="69850" dist="43180" dir="5400000">
+                    <a:srgbClr val="000000">
+                      <a:alpha val="65000"/>
+                    </a:srgbClr>
+                  </a:innerShdw>
+                </a:effectLst>
+              </a:rPr>
+              <a:t>subsystem -</a:t>
+            </a:r>
+            <a:endParaRPr lang="en-US" sz="3200" b="1" dirty="0">
+              <a:ln w="1905"/>
+              <a:solidFill>
+                <a:schemeClr val="accent2">
+                  <a:lumMod val="50000"/>
+                </a:schemeClr>
+              </a:solidFill>
+              <a:effectLst>
+                <a:innerShdw blurRad="69850" dist="43180" dir="5400000">
+                  <a:srgbClr val="000000">
+                    <a:alpha val="65000"/>
+                  </a:srgbClr>
+                </a:innerShdw>
+              </a:effectLst>
+            </a:endParaRPr>
+          </a:p>
+          <a:p>
+            <a:pPr marL="742950" lvl="1" indent="-285750">
+              <a:buFont typeface="Courier New" pitchFamily="49" charset="0"/>
+              <a:buChar char="o"/>
+            </a:pPr>
+            <a:r>
+              <a:rPr lang="en-US" sz="3200" b="1" dirty="0" smtClean="0">
+                <a:ln w="10541" cmpd="sng">
+                  <a:solidFill>
+                    <a:srgbClr val="7D7D7D">
+                      <a:tint val="100000"/>
+                      <a:shade val="100000"/>
+                      <a:satMod val="110000"/>
+                    </a:srgbClr>
+                  </a:solidFill>
+                  <a:prstDash val="solid"/>
+                </a:ln>
+                <a:solidFill>
+                  <a:schemeClr val="accent1">
+                    <a:lumMod val="75000"/>
+                  </a:schemeClr>
+                </a:solidFill>
+              </a:rPr>
+              <a:t>Use-case Glossary</a:t>
+            </a:r>
+          </a:p>
+          <a:p>
+            <a:pPr marL="742950" lvl="1" indent="-285750">
+              <a:buFont typeface="Courier New" pitchFamily="49" charset="0"/>
+              <a:buChar char="o"/>
+            </a:pPr>
+            <a:r>
+              <a:rPr lang="en-US" sz="3200" b="1" dirty="0" smtClean="0">
+                <a:ln w="10541" cmpd="sng">
+                  <a:solidFill>
+                    <a:srgbClr val="7D7D7D">
+                      <a:tint val="100000"/>
+                      <a:shade val="100000"/>
+                      <a:satMod val="110000"/>
+                    </a:srgbClr>
+                  </a:solidFill>
+                  <a:prstDash val="solid"/>
+                </a:ln>
+                <a:solidFill>
+                  <a:schemeClr val="accent1">
+                    <a:lumMod val="75000"/>
+                  </a:schemeClr>
+                </a:solidFill>
+              </a:rPr>
+              <a:t>Use-case Diagram</a:t>
+            </a:r>
+          </a:p>
+          <a:p>
+            <a:pPr marL="742950" lvl="1" indent="-285750">
+              <a:buFont typeface="Courier New" pitchFamily="49" charset="0"/>
+              <a:buChar char="o"/>
+            </a:pPr>
+            <a:r>
+              <a:rPr lang="en-US" sz="3200" b="1" dirty="0" smtClean="0">
+                <a:ln w="10541" cmpd="sng">
+                  <a:solidFill>
+                    <a:srgbClr val="7D7D7D">
+                      <a:tint val="100000"/>
+                      <a:shade val="100000"/>
+                      <a:satMod val="110000"/>
+                    </a:srgbClr>
+                  </a:solidFill>
+                  <a:prstDash val="solid"/>
+                </a:ln>
+                <a:solidFill>
+                  <a:schemeClr val="accent1">
+                    <a:lumMod val="75000"/>
+                  </a:schemeClr>
+                </a:solidFill>
+              </a:rPr>
+              <a:t>Use-case Narrative with</a:t>
+            </a:r>
+          </a:p>
+          <a:p>
+            <a:pPr marL="1200150" lvl="2" indent="-285750">
+              <a:buFont typeface="Wingdings" pitchFamily="2" charset="2"/>
+              <a:buChar char="§"/>
+            </a:pPr>
+            <a:r>
+              <a:rPr lang="en-US" sz="3200" b="1" dirty="0" smtClean="0">
+                <a:ln w="1905"/>
+                <a:solidFill>
+                  <a:schemeClr val="accent1">
+                    <a:lumMod val="75000"/>
+                  </a:schemeClr>
+                </a:solidFill>
+                <a:effectLst>
+                  <a:innerShdw blurRad="69850" dist="43180" dir="5400000">
+                    <a:srgbClr val="000000">
+                      <a:alpha val="65000"/>
+                    </a:srgbClr>
+                  </a:innerShdw>
+                </a:effectLst>
+              </a:rPr>
+              <a:t>High level table version</a:t>
+            </a:r>
+          </a:p>
+          <a:p>
+            <a:pPr marL="1200150" lvl="2" indent="-285750">
+              <a:buFont typeface="Wingdings" pitchFamily="2" charset="2"/>
+              <a:buChar char="§"/>
+            </a:pPr>
+            <a:r>
+              <a:rPr lang="en-US" sz="3200" b="1" dirty="0" smtClean="0">
+                <a:ln w="1905"/>
+                <a:solidFill>
+                  <a:schemeClr val="accent1">
+                    <a:lumMod val="75000"/>
+                  </a:schemeClr>
+                </a:solidFill>
+                <a:effectLst>
+                  <a:innerShdw blurRad="69850" dist="43180" dir="5400000">
+                    <a:srgbClr val="000000">
+                      <a:alpha val="65000"/>
+                    </a:srgbClr>
+                  </a:innerShdw>
+                </a:effectLst>
+              </a:rPr>
+              <a:t>Documentation</a:t>
+            </a:r>
+            <a:endParaRPr lang="en-US" sz="3200" b="1" dirty="0">
+              <a:ln w="1905"/>
+              <a:solidFill>
+                <a:schemeClr val="accent1">
+                  <a:lumMod val="75000"/>
+                </a:schemeClr>
+              </a:solidFill>
+              <a:effectLst>
+                <a:innerShdw blurRad="69850" dist="43180" dir="5400000">
+                  <a:srgbClr val="000000">
+                    <a:alpha val="65000"/>
+                  </a:srgbClr>
+                </a:innerShdw>
+              </a:effectLst>
+            </a:endParaRPr>
+          </a:p>
+        </p:txBody>
+      </p:sp>
+      <p:pic>
+        <p:nvPicPr>
+          <p:cNvPr id="6" name="Picture 2" descr="D:\Rakinsfiles\rakin's L-3 T-1\Software\LAB_ISD\Photos\Supreme Court of Bangladesh.jpg"/>
+          <p:cNvPicPr>
+            <a:picLocks noChangeAspect="1" noChangeArrowheads="1"/>
+          </p:cNvPicPr>
+          <p:nvPr/>
+        </p:nvPicPr>
+        <p:blipFill>
+          <a:blip r:embed="rId3" cstate="print">
+            <a:extLst>
+              <a:ext uri="{28A0092B-C50C-407E-A947-70E740481C1C}">
+                <a14:useLocalDpi xmlns:a14="http://schemas.microsoft.com/office/drawing/2010/main" val="0"/>
+              </a:ext>
+            </a:extLst>
+          </a:blip>
+          <a:srcRect/>
+          <a:stretch>
+            <a:fillRect/>
+          </a:stretch>
+        </p:blipFill>
+        <p:spPr bwMode="auto">
+          <a:xfrm>
+            <a:off x="7391400" y="212491"/>
+            <a:ext cx="1461167" cy="1022817"/>
+          </a:xfrm>
+          <a:prstGeom prst="ellipse">
+            <a:avLst/>
+          </a:prstGeom>
+          <a:ln>
+            <a:noFill/>
+          </a:ln>
+          <a:effectLst>
+            <a:softEdge rad="112500"/>
+          </a:effectLst>
+          <a:extLst>
+            <a:ext uri="{909E8E84-426E-40DD-AFC4-6F175D3DCCD1}">
+              <a14:hiddenFill xmlns:a14="http://schemas.microsoft.com/office/drawing/2010/main">
+                <a:solidFill>
+                  <a:srgbClr val="FFFFFF"/>
+                </a:solidFill>
+              </a14:hiddenFill>
+            </a:ext>
+          </a:extLst>
+        </p:spPr>
+      </p:pic>
+      <p:sp>
+        <p:nvSpPr>
+          <p:cNvPr id="7" name="Slide Number Placeholder 3"/>
+          <p:cNvSpPr>
+            <a:spLocks noGrp="1"/>
+          </p:cNvSpPr>
+          <p:nvPr>
+            <p:ph type="sldNum" sz="quarter" idx="12"/>
+          </p:nvPr>
+        </p:nvSpPr>
+        <p:spPr>
+          <a:xfrm>
+            <a:off x="8305800" y="990600"/>
+            <a:ext cx="709832" cy="495299"/>
+          </a:xfrm>
+        </p:spPr>
+        <p:txBody>
+          <a:bodyPr>
+            <a:scene3d>
+              <a:camera prst="orthographicFront">
+                <a:rot lat="0" lon="0" rev="0"/>
+              </a:camera>
+              <a:lightRig rig="contrasting" dir="t">
+                <a:rot lat="0" lon="0" rev="4500000"/>
+              </a:lightRig>
+            </a:scene3d>
+            <a:sp3d contourW="6350" prstMaterial="metal">
+              <a:bevelT w="127000" h="31750" prst="relaxedInset"/>
+              <a:contourClr>
+                <a:schemeClr val="accent1">
+                  <a:shade val="75000"/>
+                </a:schemeClr>
+              </a:contourClr>
+            </a:sp3d>
+          </a:bodyPr>
+          <a:lstStyle/>
+          <a:p>
+            <a:fld id="{D787AFA1-61CC-4523-8BB5-29B4479E0D14}" type="slidenum">
+              <a:rPr lang="en-US" sz="3600" cap="all" smtClean="0">
+                <a:ln w="0"/>
+                <a:gradFill flip="none">
+                  <a:gsLst>
+                    <a:gs pos="0">
+                      <a:schemeClr val="accent1">
+                        <a:tint val="75000"/>
+                        <a:shade val="75000"/>
+                        <a:satMod val="170000"/>
+                      </a:schemeClr>
+                    </a:gs>
+                    <a:gs pos="49000">
+                      <a:schemeClr val="accent1">
+                        <a:tint val="88000"/>
+                        <a:shade val="65000"/>
+                        <a:satMod val="172000"/>
+                      </a:schemeClr>
+                    </a:gs>
+                    <a:gs pos="50000">
+                      <a:schemeClr val="accent1">
+                        <a:shade val="65000"/>
+                        <a:satMod val="130000"/>
+                      </a:schemeClr>
+                    </a:gs>
+                    <a:gs pos="92000">
+                      <a:schemeClr val="accent1">
+                        <a:shade val="50000"/>
+                        <a:satMod val="120000"/>
+                      </a:schemeClr>
+                    </a:gs>
+                    <a:gs pos="100000">
+                      <a:schemeClr val="accent1">
+                        <a:shade val="48000"/>
+                        <a:satMod val="120000"/>
+                      </a:schemeClr>
+                    </a:gs>
+                  </a:gsLst>
+                  <a:lin ang="5400000"/>
+                </a:gradFill>
+                <a:effectLst>
+                  <a:reflection blurRad="12700" stA="50000" endPos="50000" dist="5000" dir="5400000" sy="-100000" rotWithShape="0"/>
+                </a:effectLst>
+              </a:rPr>
+              <a:t>2</a:t>
+            </a:fld>
+            <a:endParaRPr lang="en-US" sz="3600" cap="all" dirty="0">
+              <a:ln w="0"/>
+              <a:gradFill flip="none">
+                <a:gsLst>
+                  <a:gs pos="0">
+                    <a:schemeClr val="accent1">
+                      <a:tint val="75000"/>
+                      <a:shade val="75000"/>
+                      <a:satMod val="170000"/>
+                    </a:schemeClr>
+                  </a:gs>
+                  <a:gs pos="49000">
+                    <a:schemeClr val="accent1">
+                      <a:tint val="88000"/>
+                      <a:shade val="65000"/>
+                      <a:satMod val="172000"/>
+                    </a:schemeClr>
+                  </a:gs>
+                  <a:gs pos="50000">
+                    <a:schemeClr val="accent1">
+                      <a:shade val="65000"/>
+                      <a:satMod val="130000"/>
+                    </a:schemeClr>
+                  </a:gs>
+                  <a:gs pos="92000">
+                    <a:schemeClr val="accent1">
+                      <a:shade val="50000"/>
+                      <a:satMod val="120000"/>
+                    </a:schemeClr>
+                  </a:gs>
+                  <a:gs pos="100000">
+                    <a:schemeClr val="accent1">
+                      <a:shade val="48000"/>
+                      <a:satMod val="120000"/>
+                    </a:schemeClr>
+                  </a:gs>
+                </a:gsLst>
+                <a:lin ang="5400000"/>
+              </a:gradFill>
+              <a:effectLst>
+                <a:reflection blurRad="12700" stA="50000" endPos="50000" dist="5000" dir="5400000" sy="-100000" rotWithShape="0"/>
+              </a:effectLst>
+            </a:endParaRPr>
+          </a:p>
+        </p:txBody>
+      </p:sp>
+    </p:spTree>
+    <p:extLst>
+      <p:ext uri="{BB962C8B-B14F-4D97-AF65-F5344CB8AC3E}">
+        <p14:creationId xmlns:p14="http://schemas.microsoft.com/office/powerpoint/2010/main" val="3714330402"/>
+      </p:ext>
+    </p:extLst>
+  </p:cSld>
+  <p:clrMapOvr>
+    <a:masterClrMapping/>
+  </p:clrMapOvr>
+  <mc:AlternateContent xmlns:mc="http://schemas.openxmlformats.org/markup-compatibility/2006" xmlns:p14="http://schemas.microsoft.com/office/powerpoint/2010/main">
+    <mc:Choice Requires="p14">
+      <p:transition spd="slow" p14:dur="1500">
+        <p14:ripple dir="ld"/>
+      </p:transition>
+    </mc:Choice>
+    <mc:Fallback xmlns="">
+      <p:transition spd="slow">
+        <p:fade/>
+      </p:transition>
+    </mc:Fallback>
+  </mc:AlternateContent>
+  <p:timing>
+    <p:tnLst>
+      <p:par>
+        <p:cTn id="1" dur="indefinite" restart="never" nodeType="tmRoot"/>
+      </p:par>
+    </p:tnLst>
+  </p:timing>
+</p:sld>
+</file>
+
+<file path=ppt/slides/slide20.xml><?xml version="1.0" encoding="utf-8"?>
 <p:sld xmlns:a="http://schemas.openxmlformats.org/drawingml/2006/main" xmlns:r="http://schemas.openxmlformats.org/officeDocument/2006/relationships" xmlns:p="http://schemas.openxmlformats.org/presentationml/2006/main">
   <p:cSld>
     <p:spTree>
@@ -23524,7 +25394,7 @@
                   <a:reflection blurRad="12700" stA="50000" endPos="50000" dist="5000" dir="5400000" sy="-100000" rotWithShape="0"/>
                 </a:effectLst>
               </a:rPr>
-              <a:t>19</a:t>
+              <a:t>20</a:t>
             </a:fld>
             <a:endParaRPr lang="en-US" sz="3600" cap="all" dirty="0">
               <a:ln w="0"/>
@@ -24236,617 +26106,7 @@
 </p:sld>
 </file>
 
-<file path=ppt/slides/slide2.xml><?xml version="1.0" encoding="utf-8"?>
-<p:sld xmlns:a="http://schemas.openxmlformats.org/drawingml/2006/main" xmlns:r="http://schemas.openxmlformats.org/officeDocument/2006/relationships" xmlns:p="http://schemas.openxmlformats.org/presentationml/2006/main">
-  <p:cSld>
-    <p:spTree>
-      <p:nvGrpSpPr>
-        <p:cNvPr id="1" name=""/>
-        <p:cNvGrpSpPr/>
-        <p:nvPr/>
-      </p:nvGrpSpPr>
-      <p:grpSpPr>
-        <a:xfrm>
-          <a:off x="0" y="0"/>
-          <a:ext cx="0" cy="0"/>
-          <a:chOff x="0" y="0"/>
-          <a:chExt cx="0" cy="0"/>
-        </a:xfrm>
-      </p:grpSpPr>
-      <p:sp>
-        <p:nvSpPr>
-          <p:cNvPr id="4" name="Rounded Rectangle 3"/>
-          <p:cNvSpPr/>
-          <p:nvPr/>
-        </p:nvSpPr>
-        <p:spPr>
-          <a:xfrm>
-            <a:off x="228599" y="304800"/>
-            <a:ext cx="7162801" cy="838200"/>
-          </a:xfrm>
-          <a:prstGeom prst="roundRect">
-            <a:avLst/>
-          </a:prstGeom>
-        </p:spPr>
-        <p:style>
-          <a:lnRef idx="0">
-            <a:schemeClr val="accent3"/>
-          </a:lnRef>
-          <a:fillRef idx="3">
-            <a:schemeClr val="accent3"/>
-          </a:fillRef>
-          <a:effectRef idx="3">
-            <a:schemeClr val="accent3"/>
-          </a:effectRef>
-          <a:fontRef idx="minor">
-            <a:schemeClr val="lt1"/>
-          </a:fontRef>
-        </p:style>
-        <p:txBody>
-          <a:bodyPr rtlCol="0" anchor="ctr">
-            <a:scene3d>
-              <a:camera prst="orthographicFront"/>
-              <a:lightRig rig="glow" dir="tl">
-                <a:rot lat="0" lon="0" rev="5400000"/>
-              </a:lightRig>
-            </a:scene3d>
-            <a:sp3d contourW="12700">
-              <a:bevelT w="25400" h="25400"/>
-              <a:contourClr>
-                <a:schemeClr val="accent6">
-                  <a:shade val="73000"/>
-                </a:schemeClr>
-              </a:contourClr>
-            </a:sp3d>
-          </a:bodyPr>
-          <a:lstStyle/>
-          <a:p>
-            <a:r>
-              <a:rPr lang="en-US" sz="5400" b="1" dirty="0">
-                <a:ln w="11430"/>
-                <a:gradFill>
-                  <a:gsLst>
-                    <a:gs pos="0">
-                      <a:schemeClr val="accent6">
-                        <a:tint val="90000"/>
-                        <a:satMod val="120000"/>
-                      </a:schemeClr>
-                    </a:gs>
-                    <a:gs pos="25000">
-                      <a:schemeClr val="accent6">
-                        <a:tint val="93000"/>
-                        <a:satMod val="120000"/>
-                      </a:schemeClr>
-                    </a:gs>
-                    <a:gs pos="50000">
-                      <a:schemeClr val="accent6">
-                        <a:shade val="89000"/>
-                        <a:satMod val="110000"/>
-                      </a:schemeClr>
-                    </a:gs>
-                    <a:gs pos="75000">
-                      <a:schemeClr val="accent6">
-                        <a:tint val="93000"/>
-                        <a:satMod val="120000"/>
-                      </a:schemeClr>
-                    </a:gs>
-                    <a:gs pos="100000">
-                      <a:schemeClr val="accent6">
-                        <a:tint val="90000"/>
-                        <a:satMod val="120000"/>
-                      </a:schemeClr>
-                    </a:gs>
-                  </a:gsLst>
-                  <a:lin ang="5400000"/>
-                </a:gradFill>
-                <a:effectLst>
-                  <a:outerShdw blurRad="80000" dist="40000" dir="5040000" algn="tl">
-                    <a:srgbClr val="000000">
-                      <a:alpha val="30000"/>
-                    </a:srgbClr>
-                  </a:outerShdw>
-                </a:effectLst>
-              </a:rPr>
-              <a:t>Outline</a:t>
-            </a:r>
-          </a:p>
-        </p:txBody>
-      </p:sp>
-      <p:sp>
-        <p:nvSpPr>
-          <p:cNvPr id="5" name="TextBox 4"/>
-          <p:cNvSpPr txBox="1"/>
-          <p:nvPr/>
-        </p:nvSpPr>
-        <p:spPr>
-          <a:xfrm>
-            <a:off x="1066800" y="1676400"/>
-            <a:ext cx="6511719" cy="4031873"/>
-          </a:xfrm>
-          <a:prstGeom prst="rect">
-            <a:avLst/>
-          </a:prstGeom>
-          <a:noFill/>
-        </p:spPr>
-        <p:txBody>
-          <a:bodyPr wrap="none" rtlCol="0">
-            <a:spAutoFit/>
-          </a:bodyPr>
-          <a:lstStyle/>
-          <a:p>
-            <a:pPr marL="285750" indent="-285750">
-              <a:buFont typeface="Wingdings" pitchFamily="2" charset="2"/>
-              <a:buChar char="Ø"/>
-            </a:pPr>
-            <a:r>
-              <a:rPr lang="en-US" sz="3200" b="1" dirty="0" smtClean="0">
-                <a:ln w="1905"/>
-                <a:solidFill>
-                  <a:schemeClr val="accent2">
-                    <a:lumMod val="50000"/>
-                  </a:schemeClr>
-                </a:solidFill>
-                <a:effectLst>
-                  <a:innerShdw blurRad="69850" dist="43180" dir="5400000">
-                    <a:srgbClr val="000000">
-                      <a:alpha val="65000"/>
-                    </a:srgbClr>
-                  </a:innerShdw>
-                </a:effectLst>
-              </a:rPr>
-              <a:t>Subsystems</a:t>
-            </a:r>
-          </a:p>
-          <a:p>
-            <a:pPr marL="285750" indent="-285750">
-              <a:buFont typeface="Wingdings" pitchFamily="2" charset="2"/>
-              <a:buChar char="Ø"/>
-            </a:pPr>
-            <a:r>
-              <a:rPr lang="en-US" sz="3200" b="1" dirty="0" smtClean="0">
-                <a:ln w="1905"/>
-                <a:solidFill>
-                  <a:schemeClr val="accent1">
-                    <a:lumMod val="50000"/>
-                  </a:schemeClr>
-                </a:solidFill>
-                <a:effectLst>
-                  <a:innerShdw blurRad="69850" dist="43180" dir="5400000">
-                    <a:srgbClr val="000000">
-                      <a:alpha val="65000"/>
-                    </a:srgbClr>
-                  </a:innerShdw>
-                </a:effectLst>
-              </a:rPr>
-              <a:t>Actors</a:t>
-            </a:r>
-          </a:p>
-          <a:p>
-            <a:pPr marL="285750" indent="-285750">
-              <a:buFont typeface="Wingdings" pitchFamily="2" charset="2"/>
-              <a:buChar char="Ø"/>
-            </a:pPr>
-            <a:r>
-              <a:rPr lang="en-US" sz="3200" b="1" dirty="0" smtClean="0">
-                <a:ln w="1905"/>
-                <a:solidFill>
-                  <a:schemeClr val="accent2">
-                    <a:lumMod val="50000"/>
-                  </a:schemeClr>
-                </a:solidFill>
-                <a:effectLst>
-                  <a:innerShdw blurRad="69850" dist="43180" dir="5400000">
-                    <a:srgbClr val="000000">
-                      <a:alpha val="65000"/>
-                    </a:srgbClr>
-                  </a:innerShdw>
-                </a:effectLst>
-              </a:rPr>
-              <a:t>According </a:t>
-            </a:r>
-            <a:r>
-              <a:rPr lang="en-US" sz="3200" b="1" dirty="0">
-                <a:ln w="1905"/>
-                <a:solidFill>
-                  <a:schemeClr val="accent2">
-                    <a:lumMod val="50000"/>
-                  </a:schemeClr>
-                </a:solidFill>
-                <a:effectLst>
-                  <a:innerShdw blurRad="69850" dist="43180" dir="5400000">
-                    <a:srgbClr val="000000">
-                      <a:alpha val="65000"/>
-                    </a:srgbClr>
-                  </a:innerShdw>
-                </a:effectLst>
-              </a:rPr>
-              <a:t>to each </a:t>
-            </a:r>
-            <a:r>
-              <a:rPr lang="en-US" sz="3200" b="1" dirty="0" smtClean="0">
-                <a:ln w="1905"/>
-                <a:solidFill>
-                  <a:schemeClr val="accent2">
-                    <a:lumMod val="50000"/>
-                  </a:schemeClr>
-                </a:solidFill>
-                <a:effectLst>
-                  <a:innerShdw blurRad="69850" dist="43180" dir="5400000">
-                    <a:srgbClr val="000000">
-                      <a:alpha val="65000"/>
-                    </a:srgbClr>
-                  </a:innerShdw>
-                </a:effectLst>
-              </a:rPr>
-              <a:t>subsystem -</a:t>
-            </a:r>
-            <a:endParaRPr lang="en-US" sz="3200" b="1" dirty="0">
-              <a:ln w="1905"/>
-              <a:solidFill>
-                <a:schemeClr val="accent2">
-                  <a:lumMod val="50000"/>
-                </a:schemeClr>
-              </a:solidFill>
-              <a:effectLst>
-                <a:innerShdw blurRad="69850" dist="43180" dir="5400000">
-                  <a:srgbClr val="000000">
-                    <a:alpha val="65000"/>
-                  </a:srgbClr>
-                </a:innerShdw>
-              </a:effectLst>
-            </a:endParaRPr>
-          </a:p>
-          <a:p>
-            <a:pPr marL="742950" lvl="1" indent="-285750">
-              <a:buFont typeface="Courier New" pitchFamily="49" charset="0"/>
-              <a:buChar char="o"/>
-            </a:pPr>
-            <a:r>
-              <a:rPr lang="en-US" sz="3200" b="1" dirty="0" smtClean="0">
-                <a:ln w="10541" cmpd="sng">
-                  <a:solidFill>
-                    <a:srgbClr val="7D7D7D">
-                      <a:tint val="100000"/>
-                      <a:shade val="100000"/>
-                      <a:satMod val="110000"/>
-                    </a:srgbClr>
-                  </a:solidFill>
-                  <a:prstDash val="solid"/>
-                </a:ln>
-                <a:solidFill>
-                  <a:schemeClr val="accent1">
-                    <a:lumMod val="75000"/>
-                  </a:schemeClr>
-                </a:solidFill>
-              </a:rPr>
-              <a:t>Use-case Glossary</a:t>
-            </a:r>
-          </a:p>
-          <a:p>
-            <a:pPr marL="742950" lvl="1" indent="-285750">
-              <a:buFont typeface="Courier New" pitchFamily="49" charset="0"/>
-              <a:buChar char="o"/>
-            </a:pPr>
-            <a:r>
-              <a:rPr lang="en-US" sz="3200" b="1" dirty="0" smtClean="0">
-                <a:ln w="10541" cmpd="sng">
-                  <a:solidFill>
-                    <a:srgbClr val="7D7D7D">
-                      <a:tint val="100000"/>
-                      <a:shade val="100000"/>
-                      <a:satMod val="110000"/>
-                    </a:srgbClr>
-                  </a:solidFill>
-                  <a:prstDash val="solid"/>
-                </a:ln>
-                <a:solidFill>
-                  <a:schemeClr val="accent1">
-                    <a:lumMod val="75000"/>
-                  </a:schemeClr>
-                </a:solidFill>
-              </a:rPr>
-              <a:t>Use-case Diagram</a:t>
-            </a:r>
-          </a:p>
-          <a:p>
-            <a:pPr marL="742950" lvl="1" indent="-285750">
-              <a:buFont typeface="Courier New" pitchFamily="49" charset="0"/>
-              <a:buChar char="o"/>
-            </a:pPr>
-            <a:r>
-              <a:rPr lang="en-US" sz="3200" b="1" dirty="0" smtClean="0">
-                <a:ln w="10541" cmpd="sng">
-                  <a:solidFill>
-                    <a:srgbClr val="7D7D7D">
-                      <a:tint val="100000"/>
-                      <a:shade val="100000"/>
-                      <a:satMod val="110000"/>
-                    </a:srgbClr>
-                  </a:solidFill>
-                  <a:prstDash val="solid"/>
-                </a:ln>
-                <a:solidFill>
-                  <a:schemeClr val="accent1">
-                    <a:lumMod val="75000"/>
-                  </a:schemeClr>
-                </a:solidFill>
-              </a:rPr>
-              <a:t>Use-case Narrative with</a:t>
-            </a:r>
-          </a:p>
-          <a:p>
-            <a:pPr marL="1200150" lvl="2" indent="-285750">
-              <a:buFont typeface="Wingdings" pitchFamily="2" charset="2"/>
-              <a:buChar char="§"/>
-            </a:pPr>
-            <a:r>
-              <a:rPr lang="en-US" sz="3200" b="1" dirty="0" smtClean="0">
-                <a:ln w="1905"/>
-                <a:solidFill>
-                  <a:schemeClr val="accent1">
-                    <a:lumMod val="75000"/>
-                  </a:schemeClr>
-                </a:solidFill>
-                <a:effectLst>
-                  <a:innerShdw blurRad="69850" dist="43180" dir="5400000">
-                    <a:srgbClr val="000000">
-                      <a:alpha val="65000"/>
-                    </a:srgbClr>
-                  </a:innerShdw>
-                </a:effectLst>
-              </a:rPr>
-              <a:t>High level table version</a:t>
-            </a:r>
-          </a:p>
-          <a:p>
-            <a:pPr marL="1200150" lvl="2" indent="-285750">
-              <a:buFont typeface="Wingdings" pitchFamily="2" charset="2"/>
-              <a:buChar char="§"/>
-            </a:pPr>
-            <a:r>
-              <a:rPr lang="en-US" sz="3200" b="1" dirty="0" smtClean="0">
-                <a:ln w="1905"/>
-                <a:solidFill>
-                  <a:schemeClr val="accent1">
-                    <a:lumMod val="75000"/>
-                  </a:schemeClr>
-                </a:solidFill>
-                <a:effectLst>
-                  <a:innerShdw blurRad="69850" dist="43180" dir="5400000">
-                    <a:srgbClr val="000000">
-                      <a:alpha val="65000"/>
-                    </a:srgbClr>
-                  </a:innerShdw>
-                </a:effectLst>
-              </a:rPr>
-              <a:t>Documentation</a:t>
-            </a:r>
-            <a:endParaRPr lang="en-US" sz="3200" b="1" dirty="0">
-              <a:ln w="1905"/>
-              <a:solidFill>
-                <a:schemeClr val="accent1">
-                  <a:lumMod val="75000"/>
-                </a:schemeClr>
-              </a:solidFill>
-              <a:effectLst>
-                <a:innerShdw blurRad="69850" dist="43180" dir="5400000">
-                  <a:srgbClr val="000000">
-                    <a:alpha val="65000"/>
-                  </a:srgbClr>
-                </a:innerShdw>
-              </a:effectLst>
-            </a:endParaRPr>
-          </a:p>
-        </p:txBody>
-      </p:sp>
-      <p:pic>
-        <p:nvPicPr>
-          <p:cNvPr id="6" name="Picture 2" descr="D:\Rakinsfiles\rakin's L-3 T-1\Software\LAB_ISD\Photos\Supreme Court of Bangladesh.jpg"/>
-          <p:cNvPicPr>
-            <a:picLocks noChangeAspect="1" noChangeArrowheads="1"/>
-          </p:cNvPicPr>
-          <p:nvPr/>
-        </p:nvPicPr>
-        <p:blipFill>
-          <a:blip r:embed="rId3" cstate="print">
-            <a:extLst>
-              <a:ext uri="{28A0092B-C50C-407E-A947-70E740481C1C}">
-                <a14:useLocalDpi xmlns:a14="http://schemas.microsoft.com/office/drawing/2010/main" val="0"/>
-              </a:ext>
-            </a:extLst>
-          </a:blip>
-          <a:srcRect/>
-          <a:stretch>
-            <a:fillRect/>
-          </a:stretch>
-        </p:blipFill>
-        <p:spPr bwMode="auto">
-          <a:xfrm>
-            <a:off x="7391400" y="212491"/>
-            <a:ext cx="1461167" cy="1022817"/>
-          </a:xfrm>
-          <a:prstGeom prst="ellipse">
-            <a:avLst/>
-          </a:prstGeom>
-          <a:ln>
-            <a:noFill/>
-          </a:ln>
-          <a:effectLst>
-            <a:softEdge rad="112500"/>
-          </a:effectLst>
-          <a:extLst>
-            <a:ext uri="{909E8E84-426E-40DD-AFC4-6F175D3DCCD1}">
-              <a14:hiddenFill xmlns:a14="http://schemas.microsoft.com/office/drawing/2010/main">
-                <a:solidFill>
-                  <a:srgbClr val="FFFFFF"/>
-                </a:solidFill>
-              </a14:hiddenFill>
-            </a:ext>
-          </a:extLst>
-        </p:spPr>
-      </p:pic>
-      <p:sp>
-        <p:nvSpPr>
-          <p:cNvPr id="7" name="Slide Number Placeholder 3"/>
-          <p:cNvSpPr>
-            <a:spLocks noGrp="1"/>
-          </p:cNvSpPr>
-          <p:nvPr>
-            <p:ph type="sldNum" sz="quarter" idx="12"/>
-          </p:nvPr>
-        </p:nvSpPr>
-        <p:spPr>
-          <a:xfrm>
-            <a:off x="8305800" y="990600"/>
-            <a:ext cx="709832" cy="495299"/>
-          </a:xfrm>
-        </p:spPr>
-        <p:txBody>
-          <a:bodyPr>
-            <a:scene3d>
-              <a:camera prst="orthographicFront">
-                <a:rot lat="0" lon="0" rev="0"/>
-              </a:camera>
-              <a:lightRig rig="contrasting" dir="t">
-                <a:rot lat="0" lon="0" rev="4500000"/>
-              </a:lightRig>
-            </a:scene3d>
-            <a:sp3d contourW="6350" prstMaterial="metal">
-              <a:bevelT w="127000" h="31750" prst="relaxedInset"/>
-              <a:contourClr>
-                <a:schemeClr val="accent1">
-                  <a:shade val="75000"/>
-                </a:schemeClr>
-              </a:contourClr>
-            </a:sp3d>
-          </a:bodyPr>
-          <a:lstStyle/>
-          <a:p>
-            <a:fld id="{D787AFA1-61CC-4523-8BB5-29B4479E0D14}" type="slidenum">
-              <a:rPr lang="en-US" sz="3600" cap="all" smtClean="0">
-                <a:ln w="0"/>
-                <a:gradFill flip="none">
-                  <a:gsLst>
-                    <a:gs pos="0">
-                      <a:schemeClr val="accent1">
-                        <a:tint val="75000"/>
-                        <a:shade val="75000"/>
-                        <a:satMod val="170000"/>
-                      </a:schemeClr>
-                    </a:gs>
-                    <a:gs pos="49000">
-                      <a:schemeClr val="accent1">
-                        <a:tint val="88000"/>
-                        <a:shade val="65000"/>
-                        <a:satMod val="172000"/>
-                      </a:schemeClr>
-                    </a:gs>
-                    <a:gs pos="50000">
-                      <a:schemeClr val="accent1">
-                        <a:shade val="65000"/>
-                        <a:satMod val="130000"/>
-                      </a:schemeClr>
-                    </a:gs>
-                    <a:gs pos="92000">
-                      <a:schemeClr val="accent1">
-                        <a:shade val="50000"/>
-                        <a:satMod val="120000"/>
-                      </a:schemeClr>
-                    </a:gs>
-                    <a:gs pos="100000">
-                      <a:schemeClr val="accent1">
-                        <a:shade val="48000"/>
-                        <a:satMod val="120000"/>
-                      </a:schemeClr>
-                    </a:gs>
-                  </a:gsLst>
-                  <a:lin ang="5400000"/>
-                </a:gradFill>
-                <a:effectLst>
-                  <a:reflection blurRad="12700" stA="50000" endPos="50000" dist="5000" dir="5400000" sy="-100000" rotWithShape="0"/>
-                </a:effectLst>
-              </a:rPr>
-              <a:t>2</a:t>
-            </a:fld>
-            <a:endParaRPr lang="en-US" sz="3600" cap="all" dirty="0">
-              <a:ln w="0"/>
-              <a:gradFill flip="none">
-                <a:gsLst>
-                  <a:gs pos="0">
-                    <a:schemeClr val="accent1">
-                      <a:tint val="75000"/>
-                      <a:shade val="75000"/>
-                      <a:satMod val="170000"/>
-                    </a:schemeClr>
-                  </a:gs>
-                  <a:gs pos="49000">
-                    <a:schemeClr val="accent1">
-                      <a:tint val="88000"/>
-                      <a:shade val="65000"/>
-                      <a:satMod val="172000"/>
-                    </a:schemeClr>
-                  </a:gs>
-                  <a:gs pos="50000">
-                    <a:schemeClr val="accent1">
-                      <a:shade val="65000"/>
-                      <a:satMod val="130000"/>
-                    </a:schemeClr>
-                  </a:gs>
-                  <a:gs pos="92000">
-                    <a:schemeClr val="accent1">
-                      <a:shade val="50000"/>
-                      <a:satMod val="120000"/>
-                    </a:schemeClr>
-                  </a:gs>
-                  <a:gs pos="100000">
-                    <a:schemeClr val="accent1">
-                      <a:shade val="48000"/>
-                      <a:satMod val="120000"/>
-                    </a:schemeClr>
-                  </a:gs>
-                </a:gsLst>
-                <a:lin ang="5400000"/>
-              </a:gradFill>
-              <a:effectLst>
-                <a:reflection blurRad="12700" stA="50000" endPos="50000" dist="5000" dir="5400000" sy="-100000" rotWithShape="0"/>
-              </a:effectLst>
-            </a:endParaRPr>
-          </a:p>
-        </p:txBody>
-      </p:sp>
-    </p:spTree>
-    <p:extLst>
-      <p:ext uri="{BB962C8B-B14F-4D97-AF65-F5344CB8AC3E}">
-        <p14:creationId xmlns:p14="http://schemas.microsoft.com/office/powerpoint/2010/main" val="3714330402"/>
-      </p:ext>
-    </p:extLst>
-  </p:cSld>
-  <p:clrMapOvr>
-    <a:masterClrMapping/>
-  </p:clrMapOvr>
-  <mc:AlternateContent xmlns:mc="http://schemas.openxmlformats.org/markup-compatibility/2006" xmlns:p14="http://schemas.microsoft.com/office/powerpoint/2010/main">
-    <mc:Choice Requires="p14">
-      <p:transition spd="slow" p14:dur="1500">
-        <p14:ripple dir="ld"/>
-      </p:transition>
-    </mc:Choice>
-    <mc:Fallback xmlns="">
-      <p:transition spd="slow">
-        <p:fade/>
-      </p:transition>
-    </mc:Fallback>
-  </mc:AlternateContent>
-  <p:timing>
-    <p:tnLst>
-      <p:par>
-        <p:cTn id="1" dur="indefinite" restart="never" nodeType="tmRoot"/>
-      </p:par>
-    </p:tnLst>
-  </p:timing>
-</p:sld>
-</file>
-
-<file path=ppt/slides/slide20.xml><?xml version="1.0" encoding="utf-8"?>
+<file path=ppt/slides/slide21.xml><?xml version="1.0" encoding="utf-8"?>
 <p:sld xmlns:a="http://schemas.openxmlformats.org/drawingml/2006/main" xmlns:r="http://schemas.openxmlformats.org/officeDocument/2006/relationships" xmlns:p="http://schemas.openxmlformats.org/presentationml/2006/main">
   <p:cSld>
     <p:spTree>
@@ -25182,7 +26442,7 @@
                   <a:reflection blurRad="12700" stA="50000" endPos="50000" dist="5000" dir="5400000" sy="-100000" rotWithShape="0"/>
                 </a:effectLst>
               </a:rPr>
-              <a:t>20</a:t>
+              <a:t>21</a:t>
             </a:fld>
             <a:endParaRPr lang="en-US" sz="3600" cap="all" dirty="0">
               <a:ln w="0"/>
@@ -25456,7 +26716,7 @@
 </p:sld>
 </file>
 
-<file path=ppt/slides/slide21.xml><?xml version="1.0" encoding="utf-8"?>
+<file path=ppt/slides/slide22.xml><?xml version="1.0" encoding="utf-8"?>
 <p:sld xmlns:a="http://schemas.openxmlformats.org/drawingml/2006/main" xmlns:r="http://schemas.openxmlformats.org/officeDocument/2006/relationships" xmlns:p="http://schemas.openxmlformats.org/presentationml/2006/main">
   <p:cSld>
     <p:spTree>
@@ -25792,7 +27052,7 @@
                   <a:reflection blurRad="12700" stA="50000" endPos="50000" dist="5000" dir="5400000" sy="-100000" rotWithShape="0"/>
                 </a:effectLst>
               </a:rPr>
-              <a:t>21</a:t>
+              <a:t>22</a:t>
             </a:fld>
             <a:endParaRPr lang="en-US" sz="3600" cap="all" dirty="0">
               <a:ln w="0"/>
@@ -26368,7 +27628,7 @@
 </p:sld>
 </file>
 
-<file path=ppt/slides/slide22.xml><?xml version="1.0" encoding="utf-8"?>
+<file path=ppt/slides/slide23.xml><?xml version="1.0" encoding="utf-8"?>
 <p:sld xmlns:a="http://schemas.openxmlformats.org/drawingml/2006/main" xmlns:r="http://schemas.openxmlformats.org/officeDocument/2006/relationships" xmlns:p="http://schemas.openxmlformats.org/presentationml/2006/main">
   <p:cSld>
     <p:spTree>
@@ -26709,7 +27969,7 @@
 </p:sld>
 </file>
 
-<file path=ppt/slides/slide23.xml><?xml version="1.0" encoding="utf-8"?>
+<file path=ppt/slides/slide24.xml><?xml version="1.0" encoding="utf-8"?>
 <p:sld xmlns:a="http://schemas.openxmlformats.org/drawingml/2006/main" xmlns:r="http://schemas.openxmlformats.org/officeDocument/2006/relationships" xmlns:p="http://schemas.openxmlformats.org/presentationml/2006/main">
   <p:cSld>
     <p:spTree>
@@ -28200,7 +29460,7 @@
           <p:nvPr>
             <p:extLst>
               <p:ext uri="{D42A27DB-BD31-4B8C-83A1-F6EECF244321}">
-                <p14:modId xmlns:p14="http://schemas.microsoft.com/office/powerpoint/2010/main" val="2252514041"/>
+                <p14:modId xmlns:p14="http://schemas.microsoft.com/office/powerpoint/2010/main" val="2004088245"/>
               </p:ext>
             </p:extLst>
           </p:nvPr>
@@ -28293,11 +29553,15 @@
                     <a:p>
                       <a:r>
                         <a:rPr lang="en-US" dirty="0" smtClean="0"/>
-                        <a:t>Case</a:t>
+                        <a:t>1.1 Case</a:t>
                       </a:r>
                       <a:r>
                         <a:rPr lang="en-US" baseline="0" dirty="0" smtClean="0"/>
-                        <a:t> Filing</a:t>
+                        <a:t> </a:t>
+                      </a:r>
+                      <a:r>
+                        <a:rPr lang="en-US" baseline="0" dirty="0" smtClean="0"/>
+                        <a:t>Filing</a:t>
                       </a:r>
                       <a:endParaRPr lang="en-US" dirty="0"/>
                     </a:p>
@@ -28420,7 +29684,11 @@
                     <a:p>
                       <a:r>
                         <a:rPr lang="en-US" dirty="0" smtClean="0"/>
-                        <a:t>FIR Generation</a:t>
+                        <a:t>1.2 FIR </a:t>
+                      </a:r>
+                      <a:r>
+                        <a:rPr lang="en-US" dirty="0" smtClean="0"/>
+                        <a:t>Generation</a:t>
                       </a:r>
                       <a:endParaRPr lang="en-US" dirty="0"/>
                     </a:p>
@@ -28510,7 +29778,11 @@
                     <a:p>
                       <a:r>
                         <a:rPr lang="en-US" dirty="0" smtClean="0"/>
-                        <a:t>Forwarding FIR</a:t>
+                        <a:t>1.3 Forwarding </a:t>
+                      </a:r>
+                      <a:r>
+                        <a:rPr lang="en-US" dirty="0" smtClean="0"/>
+                        <a:t>FIR</a:t>
                       </a:r>
                       <a:endParaRPr lang="en-US" dirty="0"/>
                     </a:p>
@@ -28701,7 +29973,11 @@
                     <a:p>
                       <a:r>
                         <a:rPr lang="en-US" dirty="0" smtClean="0"/>
-                        <a:t>Charge Sheet Submission</a:t>
+                        <a:t>1.4 Charge </a:t>
+                      </a:r>
+                      <a:r>
+                        <a:rPr lang="en-US" dirty="0" smtClean="0"/>
+                        <a:t>Sheet Submission</a:t>
                       </a:r>
                       <a:endParaRPr lang="en-US" dirty="0"/>
                     </a:p>
@@ -29051,7 +30327,7 @@
           <p:nvPr/>
         </p:nvPicPr>
         <p:blipFill>
-          <a:blip r:embed="rId2" cstate="print">
+          <a:blip r:embed="rId3" cstate="print">
             <a:extLst>
               <a:ext uri="{28A0092B-C50C-407E-A947-70E740481C1C}">
                 <a14:useLocalDpi xmlns:a14="http://schemas.microsoft.com/office/drawing/2010/main" val="0"/>
@@ -29356,7 +30632,7 @@
           <p:nvPr/>
         </p:nvPicPr>
         <p:blipFill>
-          <a:blip r:embed="rId3">
+          <a:blip r:embed="rId4">
             <a:extLst>
               <a:ext uri="{28A0092B-C50C-407E-A947-70E740481C1C}">
                 <a14:useLocalDpi xmlns:a14="http://schemas.microsoft.com/office/drawing/2010/main" val="0"/>
@@ -29568,6 +30844,523 @@
           <p:nvPr/>
         </p:nvPicPr>
         <p:blipFill>
+          <a:blip r:embed="rId3" cstate="print">
+            <a:extLst>
+              <a:ext uri="{28A0092B-C50C-407E-A947-70E740481C1C}">
+                <a14:useLocalDpi xmlns:a14="http://schemas.microsoft.com/office/drawing/2010/main" val="0"/>
+              </a:ext>
+            </a:extLst>
+          </a:blip>
+          <a:srcRect/>
+          <a:stretch>
+            <a:fillRect/>
+          </a:stretch>
+        </p:blipFill>
+        <p:spPr bwMode="auto">
+          <a:xfrm>
+            <a:off x="7391400" y="212491"/>
+            <a:ext cx="1461167" cy="1022817"/>
+          </a:xfrm>
+          <a:prstGeom prst="ellipse">
+            <a:avLst/>
+          </a:prstGeom>
+          <a:ln>
+            <a:noFill/>
+          </a:ln>
+          <a:effectLst>
+            <a:softEdge rad="112500"/>
+          </a:effectLst>
+          <a:extLst>
+            <a:ext uri="{909E8E84-426E-40DD-AFC4-6F175D3DCCD1}">
+              <a14:hiddenFill xmlns:a14="http://schemas.microsoft.com/office/drawing/2010/main">
+                <a:solidFill>
+                  <a:srgbClr val="FFFFFF"/>
+                </a:solidFill>
+              </a14:hiddenFill>
+            </a:ext>
+          </a:extLst>
+        </p:spPr>
+      </p:pic>
+      <p:sp>
+        <p:nvSpPr>
+          <p:cNvPr id="6" name="Slide Number Placeholder 3"/>
+          <p:cNvSpPr>
+            <a:spLocks noGrp="1"/>
+          </p:cNvSpPr>
+          <p:nvPr>
+            <p:ph type="sldNum" sz="quarter" idx="12"/>
+          </p:nvPr>
+        </p:nvSpPr>
+        <p:spPr>
+          <a:xfrm>
+            <a:off x="8305800" y="990600"/>
+            <a:ext cx="709832" cy="495299"/>
+          </a:xfrm>
+        </p:spPr>
+        <p:txBody>
+          <a:bodyPr>
+            <a:scene3d>
+              <a:camera prst="orthographicFront">
+                <a:rot lat="0" lon="0" rev="0"/>
+              </a:camera>
+              <a:lightRig rig="contrasting" dir="t">
+                <a:rot lat="0" lon="0" rev="4500000"/>
+              </a:lightRig>
+            </a:scene3d>
+            <a:sp3d contourW="6350" prstMaterial="metal">
+              <a:bevelT w="127000" h="31750" prst="relaxedInset"/>
+              <a:contourClr>
+                <a:schemeClr val="accent1">
+                  <a:shade val="75000"/>
+                </a:schemeClr>
+              </a:contourClr>
+            </a:sp3d>
+          </a:bodyPr>
+          <a:lstStyle/>
+          <a:p>
+            <a:fld id="{D787AFA1-61CC-4523-8BB5-29B4479E0D14}" type="slidenum">
+              <a:rPr lang="en-US" sz="3600" cap="all" smtClean="0">
+                <a:ln w="0"/>
+                <a:gradFill flip="none">
+                  <a:gsLst>
+                    <a:gs pos="0">
+                      <a:schemeClr val="accent1">
+                        <a:tint val="75000"/>
+                        <a:shade val="75000"/>
+                        <a:satMod val="170000"/>
+                      </a:schemeClr>
+                    </a:gs>
+                    <a:gs pos="49000">
+                      <a:schemeClr val="accent1">
+                        <a:tint val="88000"/>
+                        <a:shade val="65000"/>
+                        <a:satMod val="172000"/>
+                      </a:schemeClr>
+                    </a:gs>
+                    <a:gs pos="50000">
+                      <a:schemeClr val="accent1">
+                        <a:shade val="65000"/>
+                        <a:satMod val="130000"/>
+                      </a:schemeClr>
+                    </a:gs>
+                    <a:gs pos="92000">
+                      <a:schemeClr val="accent1">
+                        <a:shade val="50000"/>
+                        <a:satMod val="120000"/>
+                      </a:schemeClr>
+                    </a:gs>
+                    <a:gs pos="100000">
+                      <a:schemeClr val="accent1">
+                        <a:shade val="48000"/>
+                        <a:satMod val="120000"/>
+                      </a:schemeClr>
+                    </a:gs>
+                  </a:gsLst>
+                  <a:lin ang="5400000"/>
+                </a:gradFill>
+                <a:effectLst>
+                  <a:reflection blurRad="12700" stA="50000" endPos="50000" dist="5000" dir="5400000" sy="-100000" rotWithShape="0"/>
+                </a:effectLst>
+              </a:rPr>
+              <a:t>7</a:t>
+            </a:fld>
+            <a:endParaRPr lang="en-US" sz="3600" cap="all" dirty="0">
+              <a:ln w="0"/>
+              <a:gradFill flip="none">
+                <a:gsLst>
+                  <a:gs pos="0">
+                    <a:schemeClr val="accent1">
+                      <a:tint val="75000"/>
+                      <a:shade val="75000"/>
+                      <a:satMod val="170000"/>
+                    </a:schemeClr>
+                  </a:gs>
+                  <a:gs pos="49000">
+                    <a:schemeClr val="accent1">
+                      <a:tint val="88000"/>
+                      <a:shade val="65000"/>
+                      <a:satMod val="172000"/>
+                    </a:schemeClr>
+                  </a:gs>
+                  <a:gs pos="50000">
+                    <a:schemeClr val="accent1">
+                      <a:shade val="65000"/>
+                      <a:satMod val="130000"/>
+                    </a:schemeClr>
+                  </a:gs>
+                  <a:gs pos="92000">
+                    <a:schemeClr val="accent1">
+                      <a:shade val="50000"/>
+                      <a:satMod val="120000"/>
+                    </a:schemeClr>
+                  </a:gs>
+                  <a:gs pos="100000">
+                    <a:schemeClr val="accent1">
+                      <a:shade val="48000"/>
+                      <a:satMod val="120000"/>
+                    </a:schemeClr>
+                  </a:gs>
+                </a:gsLst>
+                <a:lin ang="5400000"/>
+              </a:gradFill>
+              <a:effectLst>
+                <a:reflection blurRad="12700" stA="50000" endPos="50000" dist="5000" dir="5400000" sy="-100000" rotWithShape="0"/>
+              </a:effectLst>
+            </a:endParaRPr>
+          </a:p>
+        </p:txBody>
+      </p:sp>
+      <p:sp>
+        <p:nvSpPr>
+          <p:cNvPr id="2" name="TextBox 1"/>
+          <p:cNvSpPr txBox="1"/>
+          <p:nvPr/>
+        </p:nvSpPr>
+        <p:spPr>
+          <a:xfrm>
+            <a:off x="228599" y="1143000"/>
+            <a:ext cx="3258995" cy="461665"/>
+          </a:xfrm>
+          <a:prstGeom prst="rect">
+            <a:avLst/>
+          </a:prstGeom>
+          <a:noFill/>
+        </p:spPr>
+        <p:txBody>
+          <a:bodyPr wrap="square" rtlCol="0">
+            <a:spAutoFit/>
+            <a:scene3d>
+              <a:camera prst="orthographicFront">
+                <a:rot lat="0" lon="0" rev="0"/>
+              </a:camera>
+              <a:lightRig rig="contrasting" dir="t">
+                <a:rot lat="0" lon="0" rev="4500000"/>
+              </a:lightRig>
+            </a:scene3d>
+            <a:sp3d contourW="6350" prstMaterial="metal">
+              <a:bevelT w="127000" h="31750" prst="relaxedInset"/>
+              <a:contourClr>
+                <a:schemeClr val="accent1">
+                  <a:shade val="75000"/>
+                </a:schemeClr>
+              </a:contourClr>
+            </a:sp3d>
+          </a:bodyPr>
+          <a:lstStyle/>
+          <a:p>
+            <a:r>
+              <a:rPr lang="en-US" sz="2400" b="1" cap="all" dirty="0" smtClean="0">
+                <a:ln w="0"/>
+                <a:gradFill flip="none">
+                  <a:gsLst>
+                    <a:gs pos="0">
+                      <a:schemeClr val="accent1">
+                        <a:tint val="75000"/>
+                        <a:shade val="75000"/>
+                        <a:satMod val="170000"/>
+                      </a:schemeClr>
+                    </a:gs>
+                    <a:gs pos="49000">
+                      <a:schemeClr val="accent1">
+                        <a:tint val="88000"/>
+                        <a:shade val="65000"/>
+                        <a:satMod val="172000"/>
+                      </a:schemeClr>
+                    </a:gs>
+                    <a:gs pos="50000">
+                      <a:schemeClr val="accent1">
+                        <a:shade val="65000"/>
+                        <a:satMod val="130000"/>
+                      </a:schemeClr>
+                    </a:gs>
+                    <a:gs pos="92000">
+                      <a:schemeClr val="accent1">
+                        <a:shade val="50000"/>
+                        <a:satMod val="120000"/>
+                      </a:schemeClr>
+                    </a:gs>
+                    <a:gs pos="100000">
+                      <a:schemeClr val="accent1">
+                        <a:shade val="48000"/>
+                        <a:satMod val="120000"/>
+                      </a:schemeClr>
+                    </a:gs>
+                  </a:gsLst>
+                  <a:lin ang="5400000"/>
+                </a:gradFill>
+                <a:effectLst>
+                  <a:reflection blurRad="12700" stA="50000" endPos="50000" dist="5000" dir="5400000" sy="-100000" rotWithShape="0"/>
+                </a:effectLst>
+              </a:rPr>
+              <a:t>Use Case Diagram:</a:t>
+            </a:r>
+            <a:endParaRPr lang="en-US" sz="2400" b="1" cap="all" dirty="0">
+              <a:ln w="0"/>
+              <a:gradFill flip="none">
+                <a:gsLst>
+                  <a:gs pos="0">
+                    <a:schemeClr val="accent1">
+                      <a:tint val="75000"/>
+                      <a:shade val="75000"/>
+                      <a:satMod val="170000"/>
+                    </a:schemeClr>
+                  </a:gs>
+                  <a:gs pos="49000">
+                    <a:schemeClr val="accent1">
+                      <a:tint val="88000"/>
+                      <a:shade val="65000"/>
+                      <a:satMod val="172000"/>
+                    </a:schemeClr>
+                  </a:gs>
+                  <a:gs pos="50000">
+                    <a:schemeClr val="accent1">
+                      <a:shade val="65000"/>
+                      <a:satMod val="130000"/>
+                    </a:schemeClr>
+                  </a:gs>
+                  <a:gs pos="92000">
+                    <a:schemeClr val="accent1">
+                      <a:shade val="50000"/>
+                      <a:satMod val="120000"/>
+                    </a:schemeClr>
+                  </a:gs>
+                  <a:gs pos="100000">
+                    <a:schemeClr val="accent1">
+                      <a:shade val="48000"/>
+                      <a:satMod val="120000"/>
+                    </a:schemeClr>
+                  </a:gs>
+                </a:gsLst>
+                <a:lin ang="5400000"/>
+              </a:gradFill>
+              <a:effectLst>
+                <a:reflection blurRad="12700" stA="50000" endPos="50000" dist="5000" dir="5400000" sy="-100000" rotWithShape="0"/>
+              </a:effectLst>
+            </a:endParaRPr>
+          </a:p>
+        </p:txBody>
+      </p:sp>
+      <p:pic>
+        <p:nvPicPr>
+          <p:cNvPr id="3" name="Picture 2"/>
+          <p:cNvPicPr>
+            <a:picLocks noChangeAspect="1" noChangeArrowheads="1"/>
+          </p:cNvPicPr>
+          <p:nvPr/>
+        </p:nvPicPr>
+        <p:blipFill>
+          <a:blip r:embed="rId4">
+            <a:extLst>
+              <a:ext uri="{28A0092B-C50C-407E-A947-70E740481C1C}">
+                <a14:useLocalDpi xmlns:a14="http://schemas.microsoft.com/office/drawing/2010/main" val="0"/>
+              </a:ext>
+            </a:extLst>
+          </a:blip>
+          <a:srcRect/>
+          <a:stretch>
+            <a:fillRect/>
+          </a:stretch>
+        </p:blipFill>
+        <p:spPr bwMode="auto">
+          <a:xfrm>
+            <a:off x="1219200" y="1604665"/>
+            <a:ext cx="6705601" cy="5143265"/>
+          </a:xfrm>
+          <a:prstGeom prst="rect">
+            <a:avLst/>
+          </a:prstGeom>
+          <a:noFill/>
+          <a:ln>
+            <a:noFill/>
+          </a:ln>
+          <a:effectLst/>
+          <a:extLst>
+            <a:ext uri="{909E8E84-426E-40DD-AFC4-6F175D3DCCD1}">
+              <a14:hiddenFill xmlns:a14="http://schemas.microsoft.com/office/drawing/2010/main">
+                <a:solidFill>
+                  <a:schemeClr val="accent1"/>
+                </a:solidFill>
+              </a14:hiddenFill>
+            </a:ext>
+            <a:ext uri="{91240B29-F687-4F45-9708-019B960494DF}">
+              <a14:hiddenLine xmlns:a14="http://schemas.microsoft.com/office/drawing/2010/main" w="9525">
+                <a:solidFill>
+                  <a:schemeClr val="tx1"/>
+                </a:solidFill>
+                <a:miter lim="800000"/>
+                <a:headEnd/>
+                <a:tailEnd/>
+              </a14:hiddenLine>
+            </a:ext>
+            <a:ext uri="{AF507438-7753-43E0-B8FC-AC1667EBCBE1}">
+              <a14:hiddenEffects xmlns:a14="http://schemas.microsoft.com/office/drawing/2010/main">
+                <a:effectLst>
+                  <a:outerShdw dist="35921" dir="2700000" algn="ctr" rotWithShape="0">
+                    <a:schemeClr val="bg2"/>
+                  </a:outerShdw>
+                </a:effectLst>
+              </a14:hiddenEffects>
+            </a:ext>
+          </a:extLst>
+        </p:spPr>
+      </p:pic>
+    </p:spTree>
+    <p:extLst>
+      <p:ext uri="{BB962C8B-B14F-4D97-AF65-F5344CB8AC3E}">
+        <p14:creationId xmlns:p14="http://schemas.microsoft.com/office/powerpoint/2010/main" val="2182202506"/>
+      </p:ext>
+    </p:extLst>
+  </p:cSld>
+  <p:clrMapOvr>
+    <a:masterClrMapping/>
+  </p:clrMapOvr>
+  <mc:AlternateContent xmlns:mc="http://schemas.openxmlformats.org/markup-compatibility/2006" xmlns:p14="http://schemas.microsoft.com/office/powerpoint/2010/main">
+    <mc:Choice Requires="p14">
+      <p:transition spd="slow" p14:dur="1500">
+        <p14:ripple dir="ld"/>
+      </p:transition>
+    </mc:Choice>
+    <mc:Fallback xmlns="">
+      <p:transition spd="slow">
+        <p:fade/>
+      </p:transition>
+    </mc:Fallback>
+  </mc:AlternateContent>
+  <p:timing>
+    <p:tnLst>
+      <p:par>
+        <p:cTn id="1" dur="indefinite" restart="never" nodeType="tmRoot"/>
+      </p:par>
+    </p:tnLst>
+  </p:timing>
+</p:sld>
+</file>
+
+<file path=ppt/slides/slide8.xml><?xml version="1.0" encoding="utf-8"?>
+<p:sld xmlns:a="http://schemas.openxmlformats.org/drawingml/2006/main" xmlns:r="http://schemas.openxmlformats.org/officeDocument/2006/relationships" xmlns:p="http://schemas.openxmlformats.org/presentationml/2006/main">
+  <p:cSld>
+    <p:spTree>
+      <p:nvGrpSpPr>
+        <p:cNvPr id="1" name=""/>
+        <p:cNvGrpSpPr/>
+        <p:nvPr/>
+      </p:nvGrpSpPr>
+      <p:grpSpPr>
+        <a:xfrm>
+          <a:off x="0" y="0"/>
+          <a:ext cx="0" cy="0"/>
+          <a:chOff x="0" y="0"/>
+          <a:chExt cx="0" cy="0"/>
+        </a:xfrm>
+      </p:grpSpPr>
+      <p:sp>
+        <p:nvSpPr>
+          <p:cNvPr id="4" name="Rounded Rectangle 3"/>
+          <p:cNvSpPr/>
+          <p:nvPr/>
+        </p:nvSpPr>
+        <p:spPr>
+          <a:xfrm>
+            <a:off x="228599" y="304800"/>
+            <a:ext cx="7162801" cy="838200"/>
+          </a:xfrm>
+          <a:prstGeom prst="roundRect">
+            <a:avLst/>
+          </a:prstGeom>
+        </p:spPr>
+        <p:style>
+          <a:lnRef idx="0">
+            <a:schemeClr val="accent3"/>
+          </a:lnRef>
+          <a:fillRef idx="3">
+            <a:schemeClr val="accent3"/>
+          </a:fillRef>
+          <a:effectRef idx="3">
+            <a:schemeClr val="accent3"/>
+          </a:effectRef>
+          <a:fontRef idx="minor">
+            <a:schemeClr val="lt1"/>
+          </a:fontRef>
+        </p:style>
+        <p:txBody>
+          <a:bodyPr rtlCol="0" anchor="ctr">
+            <a:scene3d>
+              <a:camera prst="orthographicFront"/>
+              <a:lightRig rig="glow" dir="tl">
+                <a:rot lat="0" lon="0" rev="5400000"/>
+              </a:lightRig>
+            </a:scene3d>
+            <a:sp3d contourW="12700">
+              <a:bevelT w="25400" h="25400"/>
+              <a:contourClr>
+                <a:schemeClr val="accent6">
+                  <a:shade val="73000"/>
+                </a:schemeClr>
+              </a:contourClr>
+            </a:sp3d>
+          </a:bodyPr>
+          <a:lstStyle/>
+          <a:p>
+            <a:r>
+              <a:rPr lang="en-US" sz="3200" b="1" dirty="0">
+                <a:ln w="11430"/>
+                <a:gradFill>
+                  <a:gsLst>
+                    <a:gs pos="0">
+                      <a:schemeClr val="accent6">
+                        <a:tint val="90000"/>
+                        <a:satMod val="120000"/>
+                      </a:schemeClr>
+                    </a:gs>
+                    <a:gs pos="25000">
+                      <a:schemeClr val="accent6">
+                        <a:tint val="93000"/>
+                        <a:satMod val="120000"/>
+                      </a:schemeClr>
+                    </a:gs>
+                    <a:gs pos="50000">
+                      <a:schemeClr val="accent6">
+                        <a:shade val="89000"/>
+                        <a:satMod val="110000"/>
+                      </a:schemeClr>
+                    </a:gs>
+                    <a:gs pos="75000">
+                      <a:schemeClr val="accent6">
+                        <a:tint val="93000"/>
+                        <a:satMod val="120000"/>
+                      </a:schemeClr>
+                    </a:gs>
+                    <a:gs pos="100000">
+                      <a:schemeClr val="accent6">
+                        <a:tint val="90000"/>
+                        <a:satMod val="120000"/>
+                      </a:schemeClr>
+                    </a:gs>
+                  </a:gsLst>
+                  <a:lin ang="5400000"/>
+                </a:gradFill>
+                <a:effectLst>
+                  <a:outerShdw blurRad="80000" dist="40000" dir="5040000" algn="tl">
+                    <a:srgbClr val="000000">
+                      <a:alpha val="30000"/>
+                    </a:srgbClr>
+                  </a:outerShdw>
+                </a:effectLst>
+              </a:rPr>
+              <a:t>Subsystem 1: Case Filing</a:t>
+            </a:r>
+          </a:p>
+        </p:txBody>
+      </p:sp>
+      <p:pic>
+        <p:nvPicPr>
+          <p:cNvPr id="5" name="Picture 2" descr="D:\Rakinsfiles\rakin's L-3 T-1\Software\LAB_ISD\Photos\Supreme Court of Bangladesh.jpg"/>
+          <p:cNvPicPr>
+            <a:picLocks noChangeAspect="1" noChangeArrowheads="1"/>
+          </p:cNvPicPr>
+          <p:nvPr/>
+        </p:nvPicPr>
+        <p:blipFill>
           <a:blip r:embed="rId2" cstate="print">
             <a:extLst>
               <a:ext uri="{28A0092B-C50C-407E-A947-70E740481C1C}">
@@ -29686,7 +31479,7 @@
                   <a:reflection blurRad="12700" stA="50000" endPos="50000" dist="5000" dir="5400000" sy="-100000" rotWithShape="0"/>
                 </a:effectLst>
               </a:rPr>
-              <a:t>7</a:t>
+              <a:t>8</a:t>
             </a:fld>
             <a:endParaRPr lang="en-US" sz="3600" cap="all" dirty="0">
               <a:ln w="0"/>
@@ -30356,7 +32149,7 @@
 </p:sld>
 </file>
 
-<file path=ppt/slides/slide8.xml><?xml version="1.0" encoding="utf-8"?>
+<file path=ppt/slides/slide9.xml><?xml version="1.0" encoding="utf-8"?>
 <p:sld xmlns:a="http://schemas.openxmlformats.org/drawingml/2006/main" xmlns:r="http://schemas.openxmlformats.org/officeDocument/2006/relationships" xmlns:p="http://schemas.openxmlformats.org/presentationml/2006/main">
   <p:cSld>
     <p:spTree>
@@ -30500,7 +32293,7 @@
                   <a:reflection blurRad="12700" stA="50000" endPos="50000" dist="5000" dir="5400000" sy="-100000" rotWithShape="0"/>
                 </a:effectLst>
               </a:rPr>
-              <a:t>8</a:t>
+              <a:t>9</a:t>
             </a:fld>
             <a:endParaRPr lang="en-US" sz="3600" cap="all" dirty="0">
               <a:ln w="0"/>
@@ -31147,1097 +32940,6 @@
     <p:extLst>
       <p:ext uri="{BB962C8B-B14F-4D97-AF65-F5344CB8AC3E}">
         <p14:creationId xmlns:p14="http://schemas.microsoft.com/office/powerpoint/2010/main" val="616902532"/>
-      </p:ext>
-    </p:extLst>
-  </p:cSld>
-  <p:clrMapOvr>
-    <a:masterClrMapping/>
-  </p:clrMapOvr>
-  <mc:AlternateContent xmlns:mc="http://schemas.openxmlformats.org/markup-compatibility/2006" xmlns:p14="http://schemas.microsoft.com/office/powerpoint/2010/main">
-    <mc:Choice Requires="p14">
-      <p:transition spd="slow" p14:dur="1500">
-        <p14:ripple dir="ld"/>
-      </p:transition>
-    </mc:Choice>
-    <mc:Fallback xmlns="">
-      <p:transition spd="slow">
-        <p:fade/>
-      </p:transition>
-    </mc:Fallback>
-  </mc:AlternateContent>
-  <p:timing>
-    <p:tnLst>
-      <p:par>
-        <p:cTn id="1" dur="indefinite" restart="never" nodeType="tmRoot"/>
-      </p:par>
-    </p:tnLst>
-  </p:timing>
-</p:sld>
-</file>
-
-<file path=ppt/slides/slide9.xml><?xml version="1.0" encoding="utf-8"?>
-<p:sld xmlns:a="http://schemas.openxmlformats.org/drawingml/2006/main" xmlns:r="http://schemas.openxmlformats.org/officeDocument/2006/relationships" xmlns:p="http://schemas.openxmlformats.org/presentationml/2006/main">
-  <p:cSld>
-    <p:spTree>
-      <p:nvGrpSpPr>
-        <p:cNvPr id="1" name=""/>
-        <p:cNvGrpSpPr/>
-        <p:nvPr/>
-      </p:nvGrpSpPr>
-      <p:grpSpPr>
-        <a:xfrm>
-          <a:off x="0" y="0"/>
-          <a:ext cx="0" cy="0"/>
-          <a:chOff x="0" y="0"/>
-          <a:chExt cx="0" cy="0"/>
-        </a:xfrm>
-      </p:grpSpPr>
-      <p:sp>
-        <p:nvSpPr>
-          <p:cNvPr id="4" name="Rounded Rectangle 3"/>
-          <p:cNvSpPr/>
-          <p:nvPr/>
-        </p:nvSpPr>
-        <p:spPr>
-          <a:xfrm>
-            <a:off x="228599" y="304800"/>
-            <a:ext cx="7162801" cy="838200"/>
-          </a:xfrm>
-          <a:prstGeom prst="roundRect">
-            <a:avLst/>
-          </a:prstGeom>
-        </p:spPr>
-        <p:style>
-          <a:lnRef idx="0">
-            <a:schemeClr val="accent3"/>
-          </a:lnRef>
-          <a:fillRef idx="3">
-            <a:schemeClr val="accent3"/>
-          </a:fillRef>
-          <a:effectRef idx="3">
-            <a:schemeClr val="accent3"/>
-          </a:effectRef>
-          <a:fontRef idx="minor">
-            <a:schemeClr val="lt1"/>
-          </a:fontRef>
-        </p:style>
-        <p:txBody>
-          <a:bodyPr rtlCol="0" anchor="ctr">
-            <a:scene3d>
-              <a:camera prst="orthographicFront"/>
-              <a:lightRig rig="glow" dir="tl">
-                <a:rot lat="0" lon="0" rev="5400000"/>
-              </a:lightRig>
-            </a:scene3d>
-            <a:sp3d contourW="12700">
-              <a:bevelT w="25400" h="25400"/>
-              <a:contourClr>
-                <a:schemeClr val="accent6">
-                  <a:shade val="73000"/>
-                </a:schemeClr>
-              </a:contourClr>
-            </a:sp3d>
-          </a:bodyPr>
-          <a:lstStyle/>
-          <a:p>
-            <a:pPr lvl="0"/>
-            <a:r>
-              <a:rPr lang="en-US" sz="3200" b="1" dirty="0">
-                <a:ln w="11430"/>
-                <a:gradFill>
-                  <a:gsLst>
-                    <a:gs pos="0">
-                      <a:srgbClr val="F14124">
-                        <a:tint val="90000"/>
-                        <a:satMod val="120000"/>
-                      </a:srgbClr>
-                    </a:gs>
-                    <a:gs pos="25000">
-                      <a:srgbClr val="F14124">
-                        <a:tint val="93000"/>
-                        <a:satMod val="120000"/>
-                      </a:srgbClr>
-                    </a:gs>
-                    <a:gs pos="50000">
-                      <a:srgbClr val="F14124">
-                        <a:shade val="89000"/>
-                        <a:satMod val="110000"/>
-                      </a:srgbClr>
-                    </a:gs>
-                    <a:gs pos="75000">
-                      <a:srgbClr val="F14124">
-                        <a:tint val="93000"/>
-                        <a:satMod val="120000"/>
-                      </a:srgbClr>
-                    </a:gs>
-                    <a:gs pos="100000">
-                      <a:srgbClr val="F14124">
-                        <a:tint val="90000"/>
-                        <a:satMod val="120000"/>
-                      </a:srgbClr>
-                    </a:gs>
-                  </a:gsLst>
-                  <a:lin ang="5400000"/>
-                </a:gradFill>
-                <a:effectLst>
-                  <a:outerShdw blurRad="80000" dist="40000" dir="5040000" algn="tl">
-                    <a:srgbClr val="000000">
-                      <a:alpha val="30000"/>
-                    </a:srgbClr>
-                  </a:outerShdw>
-                </a:effectLst>
-              </a:rPr>
-              <a:t>Subsystem 2: </a:t>
-            </a:r>
-            <a:r>
-              <a:rPr lang="en-US" sz="3200" b="1" dirty="0">
-                <a:ln w="11430"/>
-                <a:gradFill>
-                  <a:gsLst>
-                    <a:gs pos="0">
-                      <a:schemeClr val="accent6">
-                        <a:tint val="90000"/>
-                        <a:satMod val="120000"/>
-                      </a:schemeClr>
-                    </a:gs>
-                    <a:gs pos="25000">
-                      <a:schemeClr val="accent6">
-                        <a:tint val="93000"/>
-                        <a:satMod val="120000"/>
-                      </a:schemeClr>
-                    </a:gs>
-                    <a:gs pos="50000">
-                      <a:schemeClr val="accent6">
-                        <a:shade val="89000"/>
-                        <a:satMod val="110000"/>
-                      </a:schemeClr>
-                    </a:gs>
-                    <a:gs pos="75000">
-                      <a:schemeClr val="accent6">
-                        <a:tint val="93000"/>
-                        <a:satMod val="120000"/>
-                      </a:schemeClr>
-                    </a:gs>
-                    <a:gs pos="100000">
-                      <a:schemeClr val="accent6">
-                        <a:tint val="90000"/>
-                        <a:satMod val="120000"/>
-                      </a:schemeClr>
-                    </a:gs>
-                  </a:gsLst>
-                  <a:lin ang="5400000"/>
-                </a:gradFill>
-                <a:effectLst>
-                  <a:outerShdw blurRad="80000" dist="40000" dir="5040000" algn="tl">
-                    <a:srgbClr val="000000">
-                      <a:alpha val="30000"/>
-                    </a:srgbClr>
-                  </a:outerShdw>
-                </a:effectLst>
-              </a:rPr>
-              <a:t>Cause List Generation</a:t>
-            </a:r>
-            <a:endParaRPr lang="en-US" sz="3200" b="1" dirty="0">
-              <a:ln w="11430"/>
-              <a:gradFill>
-                <a:gsLst>
-                  <a:gs pos="0">
-                    <a:srgbClr val="F14124">
-                      <a:tint val="90000"/>
-                      <a:satMod val="120000"/>
-                    </a:srgbClr>
-                  </a:gs>
-                  <a:gs pos="25000">
-                    <a:srgbClr val="F14124">
-                      <a:tint val="93000"/>
-                      <a:satMod val="120000"/>
-                    </a:srgbClr>
-                  </a:gs>
-                  <a:gs pos="50000">
-                    <a:srgbClr val="F14124">
-                      <a:shade val="89000"/>
-                      <a:satMod val="110000"/>
-                    </a:srgbClr>
-                  </a:gs>
-                  <a:gs pos="75000">
-                    <a:srgbClr val="F14124">
-                      <a:tint val="93000"/>
-                      <a:satMod val="120000"/>
-                    </a:srgbClr>
-                  </a:gs>
-                  <a:gs pos="100000">
-                    <a:srgbClr val="F14124">
-                      <a:tint val="90000"/>
-                      <a:satMod val="120000"/>
-                    </a:srgbClr>
-                  </a:gs>
-                </a:gsLst>
-                <a:lin ang="5400000"/>
-              </a:gradFill>
-              <a:effectLst>
-                <a:outerShdw blurRad="80000" dist="40000" dir="5040000" algn="tl">
-                  <a:srgbClr val="000000">
-                    <a:alpha val="30000"/>
-                  </a:srgbClr>
-                </a:outerShdw>
-              </a:effectLst>
-            </a:endParaRPr>
-          </a:p>
-        </p:txBody>
-      </p:sp>
-      <p:pic>
-        <p:nvPicPr>
-          <p:cNvPr id="5" name="Picture 2" descr="D:\Rakinsfiles\rakin's L-3 T-1\Software\LAB_ISD\Photos\Supreme Court of Bangladesh.jpg"/>
-          <p:cNvPicPr>
-            <a:picLocks noChangeAspect="1" noChangeArrowheads="1"/>
-          </p:cNvPicPr>
-          <p:nvPr/>
-        </p:nvPicPr>
-        <p:blipFill>
-          <a:blip r:embed="rId2" cstate="print">
-            <a:extLst>
-              <a:ext uri="{28A0092B-C50C-407E-A947-70E740481C1C}">
-                <a14:useLocalDpi xmlns:a14="http://schemas.microsoft.com/office/drawing/2010/main" val="0"/>
-              </a:ext>
-            </a:extLst>
-          </a:blip>
-          <a:srcRect/>
-          <a:stretch>
-            <a:fillRect/>
-          </a:stretch>
-        </p:blipFill>
-        <p:spPr bwMode="auto">
-          <a:xfrm>
-            <a:off x="7391400" y="212491"/>
-            <a:ext cx="1461167" cy="1022817"/>
-          </a:xfrm>
-          <a:prstGeom prst="ellipse">
-            <a:avLst/>
-          </a:prstGeom>
-          <a:ln>
-            <a:noFill/>
-          </a:ln>
-          <a:effectLst>
-            <a:softEdge rad="112500"/>
-          </a:effectLst>
-          <a:extLst>
-            <a:ext uri="{909E8E84-426E-40DD-AFC4-6F175D3DCCD1}">
-              <a14:hiddenFill xmlns:a14="http://schemas.microsoft.com/office/drawing/2010/main">
-                <a:solidFill>
-                  <a:srgbClr val="FFFFFF"/>
-                </a:solidFill>
-              </a14:hiddenFill>
-            </a:ext>
-          </a:extLst>
-        </p:spPr>
-      </p:pic>
-      <p:sp>
-        <p:nvSpPr>
-          <p:cNvPr id="6" name="Slide Number Placeholder 3"/>
-          <p:cNvSpPr>
-            <a:spLocks noGrp="1"/>
-          </p:cNvSpPr>
-          <p:nvPr>
-            <p:ph type="sldNum" sz="quarter" idx="12"/>
-          </p:nvPr>
-        </p:nvSpPr>
-        <p:spPr>
-          <a:xfrm>
-            <a:off x="8121983" y="990600"/>
-            <a:ext cx="893649" cy="495299"/>
-          </a:xfrm>
-        </p:spPr>
-        <p:txBody>
-          <a:bodyPr>
-            <a:scene3d>
-              <a:camera prst="orthographicFront">
-                <a:rot lat="0" lon="0" rev="0"/>
-              </a:camera>
-              <a:lightRig rig="contrasting" dir="t">
-                <a:rot lat="0" lon="0" rev="4500000"/>
-              </a:lightRig>
-            </a:scene3d>
-            <a:sp3d contourW="6350" prstMaterial="metal">
-              <a:bevelT w="127000" h="31750" prst="relaxedInset"/>
-              <a:contourClr>
-                <a:schemeClr val="accent1">
-                  <a:shade val="75000"/>
-                </a:schemeClr>
-              </a:contourClr>
-            </a:sp3d>
-          </a:bodyPr>
-          <a:lstStyle/>
-          <a:p>
-            <a:fld id="{D787AFA1-61CC-4523-8BB5-29B4479E0D14}" type="slidenum">
-              <a:rPr lang="en-US" sz="3600" cap="all" smtClean="0">
-                <a:ln w="0"/>
-                <a:gradFill flip="none">
-                  <a:gsLst>
-                    <a:gs pos="0">
-                      <a:schemeClr val="accent1">
-                        <a:tint val="75000"/>
-                        <a:shade val="75000"/>
-                        <a:satMod val="170000"/>
-                      </a:schemeClr>
-                    </a:gs>
-                    <a:gs pos="49000">
-                      <a:schemeClr val="accent1">
-                        <a:tint val="88000"/>
-                        <a:shade val="65000"/>
-                        <a:satMod val="172000"/>
-                      </a:schemeClr>
-                    </a:gs>
-                    <a:gs pos="50000">
-                      <a:schemeClr val="accent1">
-                        <a:shade val="65000"/>
-                        <a:satMod val="130000"/>
-                      </a:schemeClr>
-                    </a:gs>
-                    <a:gs pos="92000">
-                      <a:schemeClr val="accent1">
-                        <a:shade val="50000"/>
-                        <a:satMod val="120000"/>
-                      </a:schemeClr>
-                    </a:gs>
-                    <a:gs pos="100000">
-                      <a:schemeClr val="accent1">
-                        <a:shade val="48000"/>
-                        <a:satMod val="120000"/>
-                      </a:schemeClr>
-                    </a:gs>
-                  </a:gsLst>
-                  <a:lin ang="5400000"/>
-                </a:gradFill>
-                <a:effectLst>
-                  <a:reflection blurRad="12700" stA="50000" endPos="50000" dist="5000" dir="5400000" sy="-100000" rotWithShape="0"/>
-                </a:effectLst>
-              </a:rPr>
-              <a:t>9</a:t>
-            </a:fld>
-            <a:endParaRPr lang="en-US" sz="3600" cap="all" dirty="0">
-              <a:ln w="0"/>
-              <a:gradFill flip="none">
-                <a:gsLst>
-                  <a:gs pos="0">
-                    <a:schemeClr val="accent1">
-                      <a:tint val="75000"/>
-                      <a:shade val="75000"/>
-                      <a:satMod val="170000"/>
-                    </a:schemeClr>
-                  </a:gs>
-                  <a:gs pos="49000">
-                    <a:schemeClr val="accent1">
-                      <a:tint val="88000"/>
-                      <a:shade val="65000"/>
-                      <a:satMod val="172000"/>
-                    </a:schemeClr>
-                  </a:gs>
-                  <a:gs pos="50000">
-                    <a:schemeClr val="accent1">
-                      <a:shade val="65000"/>
-                      <a:satMod val="130000"/>
-                    </a:schemeClr>
-                  </a:gs>
-                  <a:gs pos="92000">
-                    <a:schemeClr val="accent1">
-                      <a:shade val="50000"/>
-                      <a:satMod val="120000"/>
-                    </a:schemeClr>
-                  </a:gs>
-                  <a:gs pos="100000">
-                    <a:schemeClr val="accent1">
-                      <a:shade val="48000"/>
-                      <a:satMod val="120000"/>
-                    </a:schemeClr>
-                  </a:gs>
-                </a:gsLst>
-                <a:lin ang="5400000"/>
-              </a:gradFill>
-              <a:effectLst>
-                <a:reflection blurRad="12700" stA="50000" endPos="50000" dist="5000" dir="5400000" sy="-100000" rotWithShape="0"/>
-              </a:effectLst>
-            </a:endParaRPr>
-          </a:p>
-        </p:txBody>
-      </p:sp>
-      <p:sp>
-        <p:nvSpPr>
-          <p:cNvPr id="2" name="TextBox 1"/>
-          <p:cNvSpPr txBox="1"/>
-          <p:nvPr/>
-        </p:nvSpPr>
-        <p:spPr>
-          <a:xfrm>
-            <a:off x="228599" y="1143000"/>
-            <a:ext cx="3258995" cy="461665"/>
-          </a:xfrm>
-          <a:prstGeom prst="rect">
-            <a:avLst/>
-          </a:prstGeom>
-          <a:noFill/>
-        </p:spPr>
-        <p:txBody>
-          <a:bodyPr wrap="square" rtlCol="0">
-            <a:spAutoFit/>
-            <a:scene3d>
-              <a:camera prst="orthographicFront">
-                <a:rot lat="0" lon="0" rev="0"/>
-              </a:camera>
-              <a:lightRig rig="contrasting" dir="t">
-                <a:rot lat="0" lon="0" rev="4500000"/>
-              </a:lightRig>
-            </a:scene3d>
-            <a:sp3d contourW="6350" prstMaterial="metal">
-              <a:bevelT w="127000" h="31750" prst="relaxedInset"/>
-              <a:contourClr>
-                <a:schemeClr val="accent1">
-                  <a:shade val="75000"/>
-                </a:schemeClr>
-              </a:contourClr>
-            </a:sp3d>
-          </a:bodyPr>
-          <a:lstStyle/>
-          <a:p>
-            <a:r>
-              <a:rPr lang="en-US" sz="2400" b="1" cap="all" dirty="0" smtClean="0">
-                <a:ln w="0"/>
-                <a:gradFill flip="none">
-                  <a:gsLst>
-                    <a:gs pos="0">
-                      <a:schemeClr val="accent1">
-                        <a:tint val="75000"/>
-                        <a:shade val="75000"/>
-                        <a:satMod val="170000"/>
-                      </a:schemeClr>
-                    </a:gs>
-                    <a:gs pos="49000">
-                      <a:schemeClr val="accent1">
-                        <a:tint val="88000"/>
-                        <a:shade val="65000"/>
-                        <a:satMod val="172000"/>
-                      </a:schemeClr>
-                    </a:gs>
-                    <a:gs pos="50000">
-                      <a:schemeClr val="accent1">
-                        <a:shade val="65000"/>
-                        <a:satMod val="130000"/>
-                      </a:schemeClr>
-                    </a:gs>
-                    <a:gs pos="92000">
-                      <a:schemeClr val="accent1">
-                        <a:shade val="50000"/>
-                        <a:satMod val="120000"/>
-                      </a:schemeClr>
-                    </a:gs>
-                    <a:gs pos="100000">
-                      <a:schemeClr val="accent1">
-                        <a:shade val="48000"/>
-                        <a:satMod val="120000"/>
-                      </a:schemeClr>
-                    </a:gs>
-                  </a:gsLst>
-                  <a:lin ang="5400000"/>
-                </a:gradFill>
-                <a:effectLst>
-                  <a:reflection blurRad="12700" stA="50000" endPos="50000" dist="5000" dir="5400000" sy="-100000" rotWithShape="0"/>
-                </a:effectLst>
-              </a:rPr>
-              <a:t>Use Case Glossary:</a:t>
-            </a:r>
-            <a:endParaRPr lang="en-US" sz="2400" b="1" cap="all" dirty="0">
-              <a:ln w="0"/>
-              <a:gradFill flip="none">
-                <a:gsLst>
-                  <a:gs pos="0">
-                    <a:schemeClr val="accent1">
-                      <a:tint val="75000"/>
-                      <a:shade val="75000"/>
-                      <a:satMod val="170000"/>
-                    </a:schemeClr>
-                  </a:gs>
-                  <a:gs pos="49000">
-                    <a:schemeClr val="accent1">
-                      <a:tint val="88000"/>
-                      <a:shade val="65000"/>
-                      <a:satMod val="172000"/>
-                    </a:schemeClr>
-                  </a:gs>
-                  <a:gs pos="50000">
-                    <a:schemeClr val="accent1">
-                      <a:shade val="65000"/>
-                      <a:satMod val="130000"/>
-                    </a:schemeClr>
-                  </a:gs>
-                  <a:gs pos="92000">
-                    <a:schemeClr val="accent1">
-                      <a:shade val="50000"/>
-                      <a:satMod val="120000"/>
-                    </a:schemeClr>
-                  </a:gs>
-                  <a:gs pos="100000">
-                    <a:schemeClr val="accent1">
-                      <a:shade val="48000"/>
-                      <a:satMod val="120000"/>
-                    </a:schemeClr>
-                  </a:gs>
-                </a:gsLst>
-                <a:lin ang="5400000"/>
-              </a:gradFill>
-              <a:effectLst>
-                <a:reflection blurRad="12700" stA="50000" endPos="50000" dist="5000" dir="5400000" sy="-100000" rotWithShape="0"/>
-              </a:effectLst>
-            </a:endParaRPr>
-          </a:p>
-        </p:txBody>
-      </p:sp>
-      <p:graphicFrame>
-        <p:nvGraphicFramePr>
-          <p:cNvPr id="3" name="Table 2"/>
-          <p:cNvGraphicFramePr>
-            <a:graphicFrameLocks noGrp="1"/>
-          </p:cNvGraphicFramePr>
-          <p:nvPr>
-            <p:extLst>
-              <p:ext uri="{D42A27DB-BD31-4B8C-83A1-F6EECF244321}">
-                <p14:modId xmlns:p14="http://schemas.microsoft.com/office/powerpoint/2010/main" val="1192104423"/>
-              </p:ext>
-            </p:extLst>
-          </p:nvPr>
-        </p:nvGraphicFramePr>
-        <p:xfrm>
-          <a:off x="228600" y="1705159"/>
-          <a:ext cx="8686802" cy="4702711"/>
-        </p:xfrm>
-        <a:graphic>
-          <a:graphicData uri="http://schemas.openxmlformats.org/drawingml/2006/table">
-            <a:tbl>
-              <a:tblPr firstRow="1" bandRow="1">
-                <a:tableStyleId>{69C7853C-536D-4A76-A0AE-DD22124D55A5}</a:tableStyleId>
-              </a:tblPr>
-              <a:tblGrid>
-                <a:gridCol w="2417315"/>
-                <a:gridCol w="3018641"/>
-                <a:gridCol w="3250846"/>
-              </a:tblGrid>
-              <a:tr h="580841">
-                <a:tc>
-                  <a:txBody>
-                    <a:bodyPr/>
-                    <a:lstStyle/>
-                    <a:p>
-                      <a:pPr algn="ctr"/>
-                      <a:r>
-                        <a:rPr lang="en-US" dirty="0" smtClean="0"/>
-                        <a:t>Use-Case</a:t>
-                      </a:r>
-                      <a:endParaRPr lang="en-US" dirty="0"/>
-                    </a:p>
-                  </a:txBody>
-                  <a:tcPr>
-                    <a:solidFill>
-                      <a:schemeClr val="tx2">
-                        <a:lumMod val="50000"/>
-                      </a:schemeClr>
-                    </a:solidFill>
-                  </a:tcPr>
-                </a:tc>
-                <a:tc>
-                  <a:txBody>
-                    <a:bodyPr/>
-                    <a:lstStyle/>
-                    <a:p>
-                      <a:pPr algn="ctr"/>
-                      <a:r>
-                        <a:rPr lang="en-US" dirty="0" smtClean="0"/>
-                        <a:t>Description</a:t>
-                      </a:r>
-                      <a:endParaRPr lang="en-US" dirty="0"/>
-                    </a:p>
-                  </a:txBody>
-                  <a:tcPr>
-                    <a:solidFill>
-                      <a:schemeClr val="tx2">
-                        <a:lumMod val="50000"/>
-                      </a:schemeClr>
-                    </a:solidFill>
-                  </a:tcPr>
-                </a:tc>
-                <a:tc>
-                  <a:txBody>
-                    <a:bodyPr/>
-                    <a:lstStyle/>
-                    <a:p>
-                      <a:pPr algn="ctr"/>
-                      <a:r>
-                        <a:rPr lang="en-US" dirty="0" smtClean="0"/>
-                        <a:t>Participant actors and Roles</a:t>
-                      </a:r>
-                      <a:endParaRPr lang="en-US" dirty="0"/>
-                    </a:p>
-                  </a:txBody>
-                  <a:tcPr>
-                    <a:solidFill>
-                      <a:schemeClr val="tx2">
-                        <a:lumMod val="50000"/>
-                      </a:schemeClr>
-                    </a:solidFill>
-                  </a:tcPr>
-                </a:tc>
-              </a:tr>
-              <a:tr h="1066800">
-                <a:tc>
-                  <a:txBody>
-                    <a:bodyPr/>
-                    <a:lstStyle/>
-                    <a:p>
-                      <a:r>
-                        <a:rPr lang="en-US" sz="1600" dirty="0" smtClean="0"/>
-                        <a:t>Case Reception</a:t>
-                      </a:r>
-                      <a:endParaRPr lang="en-US" sz="1600" dirty="0"/>
-                    </a:p>
-                  </a:txBody>
-                  <a:tcPr/>
-                </a:tc>
-                <a:tc>
-                  <a:txBody>
-                    <a:bodyPr/>
-                    <a:lstStyle/>
-                    <a:p>
-                      <a:r>
-                        <a:rPr lang="en-US" sz="1600" dirty="0" smtClean="0"/>
-                        <a:t>The FIR with</a:t>
-                      </a:r>
-                      <a:r>
-                        <a:rPr lang="en-US" sz="1600" baseline="0" dirty="0" smtClean="0"/>
-                        <a:t> necessary details are received at the Magistrate office</a:t>
-                      </a:r>
-                      <a:endParaRPr lang="en-US" sz="1600" dirty="0"/>
-                    </a:p>
-                  </a:txBody>
-                  <a:tcPr/>
-                </a:tc>
-                <a:tc>
-                  <a:txBody>
-                    <a:bodyPr/>
-                    <a:lstStyle/>
-                    <a:p>
-                      <a:pPr marL="285750" marR="0" indent="-285750" algn="l" defTabSz="914400" rtl="0" eaLnBrk="1" fontAlgn="auto" latinLnBrk="0" hangingPunct="1">
-                        <a:lnSpc>
-                          <a:spcPct val="100000"/>
-                        </a:lnSpc>
-                        <a:spcBef>
-                          <a:spcPts val="0"/>
-                        </a:spcBef>
-                        <a:spcAft>
-                          <a:spcPts val="0"/>
-                        </a:spcAft>
-                        <a:buClrTx/>
-                        <a:buSzTx/>
-                        <a:buFont typeface="Courier New" pitchFamily="49" charset="0"/>
-                        <a:buChar char="o"/>
-                        <a:tabLst/>
-                        <a:defRPr/>
-                      </a:pPr>
-                      <a:r>
-                        <a:rPr lang="en-US" sz="1600" u="sng" dirty="0" smtClean="0">
-                          <a:solidFill>
-                            <a:schemeClr val="accent5">
-                              <a:lumMod val="75000"/>
-                            </a:schemeClr>
-                          </a:solidFill>
-                          <a:effectLst>
-                            <a:outerShdw blurRad="38100" dist="38100" dir="2700000" algn="tl">
-                              <a:srgbClr val="000000">
-                                <a:alpha val="43137"/>
-                              </a:srgbClr>
-                            </a:outerShdw>
-                          </a:effectLst>
-                        </a:rPr>
-                        <a:t>GRO</a:t>
-                      </a:r>
-                      <a:r>
-                        <a:rPr lang="en-US" sz="1600" u="sng" dirty="0" smtClean="0">
-                          <a:solidFill>
-                            <a:schemeClr val="accent5">
-                              <a:lumMod val="75000"/>
-                            </a:schemeClr>
-                          </a:solidFill>
-                        </a:rPr>
-                        <a:t>:</a:t>
-                      </a:r>
-                      <a:r>
-                        <a:rPr lang="en-US" sz="1600" dirty="0" smtClean="0">
-                          <a:solidFill>
-                            <a:schemeClr val="accent5">
-                              <a:lumMod val="75000"/>
-                            </a:schemeClr>
-                          </a:solidFill>
-                        </a:rPr>
-                        <a:t> </a:t>
-                      </a:r>
-                      <a:r>
-                        <a:rPr lang="en-US" sz="1600" dirty="0" smtClean="0"/>
-                        <a:t>Receives the FIR</a:t>
-                      </a:r>
-                    </a:p>
-                  </a:txBody>
-                  <a:tcPr/>
-                </a:tc>
-              </a:tr>
-              <a:tr h="1256750">
-                <a:tc>
-                  <a:txBody>
-                    <a:bodyPr/>
-                    <a:lstStyle/>
-                    <a:p>
-                      <a:r>
-                        <a:rPr lang="en-US" sz="1600" dirty="0" smtClean="0"/>
-                        <a:t>Received Case List Sending</a:t>
-                      </a:r>
-                      <a:endParaRPr lang="en-US" sz="1600" dirty="0"/>
-                    </a:p>
-                  </a:txBody>
-                  <a:tcPr/>
-                </a:tc>
-                <a:tc>
-                  <a:txBody>
-                    <a:bodyPr/>
-                    <a:lstStyle/>
-                    <a:p>
-                      <a:r>
-                        <a:rPr lang="en-US" sz="1600" dirty="0" smtClean="0"/>
-                        <a:t>The Magistrate</a:t>
-                      </a:r>
-                      <a:r>
-                        <a:rPr lang="en-US" sz="1600" baseline="0" dirty="0" smtClean="0"/>
-                        <a:t> approved FIR is forwarded to the CMM for the rest of the processes.</a:t>
-                      </a:r>
-                      <a:endParaRPr lang="en-US" sz="1600" dirty="0"/>
-                    </a:p>
-                  </a:txBody>
-                  <a:tcPr/>
-                </a:tc>
-                <a:tc>
-                  <a:txBody>
-                    <a:bodyPr/>
-                    <a:lstStyle/>
-                    <a:p>
-                      <a:pPr marL="285750" indent="-285750">
-                        <a:buFont typeface="Courier New" pitchFamily="49" charset="0"/>
-                        <a:buChar char="o"/>
-                      </a:pPr>
-                      <a:r>
-                        <a:rPr lang="en-US" sz="1600" u="sng" kern="1200" dirty="0" smtClean="0">
-                          <a:solidFill>
-                            <a:schemeClr val="accent5">
-                              <a:lumMod val="75000"/>
-                            </a:schemeClr>
-                          </a:solidFill>
-                          <a:effectLst>
-                            <a:outerShdw blurRad="38100" dist="38100" dir="2700000" algn="tl">
-                              <a:srgbClr val="000000">
-                                <a:alpha val="43137"/>
-                              </a:srgbClr>
-                            </a:outerShdw>
-                          </a:effectLst>
-                          <a:latin typeface="+mn-lt"/>
-                          <a:ea typeface="+mn-ea"/>
-                          <a:cs typeface="+mn-cs"/>
-                        </a:rPr>
-                        <a:t>GRO:</a:t>
-                      </a:r>
-                      <a:r>
-                        <a:rPr lang="en-US" sz="1600" u="none" kern="1200" dirty="0" smtClean="0">
-                          <a:solidFill>
-                            <a:schemeClr val="accent5">
-                              <a:lumMod val="75000"/>
-                            </a:schemeClr>
-                          </a:solidFill>
-                          <a:effectLst>
-                            <a:outerShdw blurRad="38100" dist="38100" dir="2700000" algn="tl">
-                              <a:srgbClr val="000000">
-                                <a:alpha val="43137"/>
-                              </a:srgbClr>
-                            </a:outerShdw>
-                          </a:effectLst>
-                          <a:latin typeface="+mn-lt"/>
-                          <a:ea typeface="+mn-ea"/>
-                          <a:cs typeface="+mn-cs"/>
-                        </a:rPr>
-                        <a:t> </a:t>
-                      </a:r>
-                      <a:r>
-                        <a:rPr lang="en-US" sz="1600" dirty="0" smtClean="0"/>
-                        <a:t>Forwards the case list</a:t>
-                      </a:r>
-                    </a:p>
-                    <a:p>
-                      <a:pPr marL="285750" indent="-285750">
-                        <a:buFont typeface="Courier New" pitchFamily="49" charset="0"/>
-                        <a:buChar char="o"/>
-                      </a:pPr>
-                      <a:r>
-                        <a:rPr lang="en-US" sz="1600" u="sng" kern="1200" dirty="0" smtClean="0">
-                          <a:solidFill>
-                            <a:schemeClr val="accent5">
-                              <a:lumMod val="75000"/>
-                            </a:schemeClr>
-                          </a:solidFill>
-                          <a:effectLst>
-                            <a:outerShdw blurRad="38100" dist="38100" dir="2700000" algn="tl">
-                              <a:srgbClr val="000000">
-                                <a:alpha val="43137"/>
-                              </a:srgbClr>
-                            </a:outerShdw>
-                          </a:effectLst>
-                          <a:latin typeface="+mn-lt"/>
-                          <a:ea typeface="+mn-ea"/>
-                          <a:cs typeface="+mn-cs"/>
-                        </a:rPr>
-                        <a:t>Clerk Office:</a:t>
-                      </a:r>
-                      <a:r>
-                        <a:rPr lang="en-US" sz="1600" u="none" kern="1200" dirty="0" smtClean="0">
-                          <a:solidFill>
-                            <a:schemeClr val="accent5">
-                              <a:lumMod val="75000"/>
-                            </a:schemeClr>
-                          </a:solidFill>
-                          <a:effectLst>
-                            <a:outerShdw blurRad="38100" dist="38100" dir="2700000" algn="tl">
-                              <a:srgbClr val="000000">
-                                <a:alpha val="43137"/>
-                              </a:srgbClr>
-                            </a:outerShdw>
-                          </a:effectLst>
-                          <a:latin typeface="+mn-lt"/>
-                          <a:ea typeface="+mn-ea"/>
-                          <a:cs typeface="+mn-cs"/>
-                        </a:rPr>
-                        <a:t> </a:t>
-                      </a:r>
-                      <a:r>
-                        <a:rPr lang="en-US" sz="1600" dirty="0" smtClean="0"/>
-                        <a:t>Maintains</a:t>
-                      </a:r>
-                      <a:r>
-                        <a:rPr lang="en-US" sz="1600" baseline="0" dirty="0" smtClean="0"/>
-                        <a:t> the docs flow</a:t>
-                      </a:r>
-                    </a:p>
-                  </a:txBody>
-                  <a:tcPr/>
-                </a:tc>
-              </a:tr>
-              <a:tr h="1645920">
-                <a:tc>
-                  <a:txBody>
-                    <a:bodyPr/>
-                    <a:lstStyle/>
-                    <a:p>
-                      <a:r>
-                        <a:rPr lang="en-US" sz="1600" dirty="0" smtClean="0"/>
-                        <a:t>Cause List</a:t>
-                      </a:r>
-                      <a:r>
-                        <a:rPr lang="en-US" sz="1600" baseline="0" dirty="0" smtClean="0"/>
-                        <a:t> Generation</a:t>
-                      </a:r>
-                      <a:endParaRPr lang="en-US" sz="1600" dirty="0"/>
-                    </a:p>
-                  </a:txBody>
-                  <a:tcPr/>
-                </a:tc>
-                <a:tc>
-                  <a:txBody>
-                    <a:bodyPr/>
-                    <a:lstStyle/>
-                    <a:p>
-                      <a:r>
-                        <a:rPr lang="en-US" sz="1600" dirty="0" smtClean="0"/>
-                        <a:t>The case is categorized by respective laws</a:t>
-                      </a:r>
-                      <a:r>
-                        <a:rPr lang="en-US" sz="1600" baseline="0" dirty="0" smtClean="0"/>
-                        <a:t> and the logs are written to the cause-list</a:t>
-                      </a:r>
-                      <a:endParaRPr lang="en-US" sz="1600" dirty="0"/>
-                    </a:p>
-                  </a:txBody>
-                  <a:tcPr/>
-                </a:tc>
-                <a:tc>
-                  <a:txBody>
-                    <a:bodyPr/>
-                    <a:lstStyle/>
-                    <a:p>
-                      <a:pPr marL="285750" indent="-285750">
-                        <a:buFont typeface="Courier New" pitchFamily="49" charset="0"/>
-                        <a:buChar char="o"/>
-                      </a:pPr>
-                      <a:r>
-                        <a:rPr lang="en-US" sz="1600" u="sng" kern="1200" dirty="0" smtClean="0">
-                          <a:solidFill>
-                            <a:schemeClr val="accent5">
-                              <a:lumMod val="75000"/>
-                            </a:schemeClr>
-                          </a:solidFill>
-                          <a:effectLst>
-                            <a:outerShdw blurRad="38100" dist="38100" dir="2700000" algn="tl">
-                              <a:srgbClr val="000000">
-                                <a:alpha val="43137"/>
-                              </a:srgbClr>
-                            </a:outerShdw>
-                          </a:effectLst>
-                          <a:latin typeface="+mn-lt"/>
-                          <a:ea typeface="+mn-ea"/>
-                          <a:cs typeface="+mn-cs"/>
-                        </a:rPr>
-                        <a:t>GRO:</a:t>
-                      </a:r>
-                      <a:r>
-                        <a:rPr lang="en-US" sz="1600" u="none" kern="1200" dirty="0" smtClean="0">
-                          <a:solidFill>
-                            <a:schemeClr val="accent5">
-                              <a:lumMod val="75000"/>
-                            </a:schemeClr>
-                          </a:solidFill>
-                          <a:effectLst>
-                            <a:outerShdw blurRad="38100" dist="38100" dir="2700000" algn="tl">
-                              <a:srgbClr val="000000">
-                                <a:alpha val="43137"/>
-                              </a:srgbClr>
-                            </a:outerShdw>
-                          </a:effectLst>
-                          <a:latin typeface="+mn-lt"/>
-                          <a:ea typeface="+mn-ea"/>
-                          <a:cs typeface="+mn-cs"/>
-                        </a:rPr>
-                        <a:t> </a:t>
-                      </a:r>
-                      <a:r>
-                        <a:rPr lang="en-US" sz="1600" dirty="0" smtClean="0"/>
-                        <a:t>Categorizes the case &amp; forwards the FIR to the Magistrate</a:t>
-                      </a:r>
-                    </a:p>
-                    <a:p>
-                      <a:pPr marL="285750" indent="-285750">
-                        <a:buFont typeface="Courier New" pitchFamily="49" charset="0"/>
-                        <a:buChar char="o"/>
-                      </a:pPr>
-                      <a:r>
-                        <a:rPr lang="en-US" sz="1600" u="sng" kern="1200" dirty="0" smtClean="0">
-                          <a:solidFill>
-                            <a:schemeClr val="accent5">
-                              <a:lumMod val="75000"/>
-                            </a:schemeClr>
-                          </a:solidFill>
-                          <a:effectLst>
-                            <a:outerShdw blurRad="38100" dist="38100" dir="2700000" algn="tl">
-                              <a:srgbClr val="000000">
-                                <a:alpha val="43137"/>
-                              </a:srgbClr>
-                            </a:outerShdw>
-                          </a:effectLst>
-                          <a:latin typeface="+mn-lt"/>
-                          <a:ea typeface="+mn-ea"/>
-                          <a:cs typeface="+mn-cs"/>
-                        </a:rPr>
-                        <a:t>Clerk Office:</a:t>
-                      </a:r>
-                      <a:r>
-                        <a:rPr lang="en-US" sz="1600" u="none" kern="1200" dirty="0" smtClean="0">
-                          <a:solidFill>
-                            <a:schemeClr val="accent5">
-                              <a:lumMod val="75000"/>
-                            </a:schemeClr>
-                          </a:solidFill>
-                          <a:effectLst>
-                            <a:outerShdw blurRad="38100" dist="38100" dir="2700000" algn="tl">
-                              <a:srgbClr val="000000">
-                                <a:alpha val="43137"/>
-                              </a:srgbClr>
-                            </a:outerShdw>
-                          </a:effectLst>
-                          <a:latin typeface="+mn-lt"/>
-                          <a:ea typeface="+mn-ea"/>
-                          <a:cs typeface="+mn-cs"/>
-                        </a:rPr>
-                        <a:t> </a:t>
-                      </a:r>
-                      <a:r>
-                        <a:rPr lang="en-US" sz="1600" dirty="0" smtClean="0"/>
-                        <a:t>Maintains</a:t>
-                      </a:r>
-                      <a:r>
-                        <a:rPr lang="en-US" sz="1600" baseline="0" dirty="0" smtClean="0"/>
-                        <a:t> the docs flow</a:t>
-                      </a:r>
-                    </a:p>
-                    <a:p>
-                      <a:pPr marL="285750" indent="-285750">
-                        <a:buFont typeface="Courier New" pitchFamily="49" charset="0"/>
-                        <a:buChar char="o"/>
-                      </a:pPr>
-                      <a:r>
-                        <a:rPr lang="en-US" sz="1600" u="sng" kern="1200" dirty="0" smtClean="0">
-                          <a:solidFill>
-                            <a:schemeClr val="accent5">
-                              <a:lumMod val="75000"/>
-                            </a:schemeClr>
-                          </a:solidFill>
-                          <a:effectLst>
-                            <a:outerShdw blurRad="38100" dist="38100" dir="2700000" algn="tl">
-                              <a:srgbClr val="000000">
-                                <a:alpha val="43137"/>
-                              </a:srgbClr>
-                            </a:outerShdw>
-                          </a:effectLst>
-                          <a:latin typeface="+mn-lt"/>
-                          <a:ea typeface="+mn-ea"/>
-                          <a:cs typeface="+mn-cs"/>
-                        </a:rPr>
-                        <a:t>Magistrate:</a:t>
-                      </a:r>
-                      <a:r>
-                        <a:rPr lang="en-US" sz="1600" u="none" kern="1200" dirty="0" smtClean="0">
-                          <a:solidFill>
-                            <a:schemeClr val="accent5">
-                              <a:lumMod val="75000"/>
-                            </a:schemeClr>
-                          </a:solidFill>
-                          <a:effectLst>
-                            <a:outerShdw blurRad="38100" dist="38100" dir="2700000" algn="tl">
-                              <a:srgbClr val="000000">
-                                <a:alpha val="43137"/>
-                              </a:srgbClr>
-                            </a:outerShdw>
-                          </a:effectLst>
-                          <a:latin typeface="+mn-lt"/>
-                          <a:ea typeface="+mn-ea"/>
-                          <a:cs typeface="+mn-cs"/>
-                        </a:rPr>
-                        <a:t> </a:t>
-                      </a:r>
-                      <a:r>
-                        <a:rPr lang="en-US" sz="1600" dirty="0" smtClean="0"/>
-                        <a:t>Monitors the cause list</a:t>
-                      </a:r>
-                      <a:endParaRPr lang="en-US" sz="1600" dirty="0"/>
-                    </a:p>
-                  </a:txBody>
-                  <a:tcPr/>
-                </a:tc>
-              </a:tr>
-            </a:tbl>
-          </a:graphicData>
-        </a:graphic>
-      </p:graphicFrame>
-    </p:spTree>
-    <p:extLst>
-      <p:ext uri="{BB962C8B-B14F-4D97-AF65-F5344CB8AC3E}">
-        <p14:creationId xmlns:p14="http://schemas.microsoft.com/office/powerpoint/2010/main" val="326882931"/>
       </p:ext>
     </p:extLst>
   </p:cSld>

</xml_diff>